<commit_message>
Split the slides by section
</commit_message>
<xml_diff>
--- a/ex/02_starting_with_data.pptx
+++ b/ex/02_starting_with_data.pptx
@@ -6,18 +6,11 @@
   </p:sldMasterIdLst>
   <p:sldIdLst>
     <p:sldId id="256" r:id="rId2"/>
-    <p:sldId id="260" r:id="rId3"/>
-    <p:sldId id="257" r:id="rId4"/>
-    <p:sldId id="259" r:id="rId5"/>
-    <p:sldId id="263" r:id="rId6"/>
-    <p:sldId id="264" r:id="rId7"/>
-    <p:sldId id="262" r:id="rId8"/>
-    <p:sldId id="265" r:id="rId9"/>
-    <p:sldId id="266" r:id="rId10"/>
-    <p:sldId id="270" r:id="rId11"/>
-    <p:sldId id="271" r:id="rId12"/>
-    <p:sldId id="272" r:id="rId13"/>
-    <p:sldId id="273" r:id="rId14"/>
+    <p:sldId id="265" r:id="rId3"/>
+    <p:sldId id="266" r:id="rId4"/>
+    <p:sldId id="270" r:id="rId5"/>
+    <p:sldId id="273" r:id="rId6"/>
+    <p:sldId id="272" r:id="rId7"/>
   </p:sldIdLst>
   <p:sldSz cx="12192000" cy="6858000"/>
   <p:notesSz cx="6858000" cy="9144000"/>
@@ -345,7 +338,7 @@
           <a:p>
             <a:fld id="{5FCDCD17-B0B1-A244-9BB5-D7228F76BED7}" type="datetime3">
               <a:rPr lang="en-SG" smtClean="0"/>
-              <a:t>20 February 2023</a:t>
+              <a:t>27 February 2023</a:t>
             </a:fld>
             <a:endParaRPr lang="en-US" dirty="0"/>
           </a:p>
@@ -713,7 +706,7 @@
           <a:p>
             <a:fld id="{ADD28603-00EC-3A4D-B44A-BEF0A0F382C6}" type="datetime3">
               <a:rPr lang="en-SG" smtClean="0"/>
-              <a:t>20 February 2023</a:t>
+              <a:t>27 February 2023</a:t>
             </a:fld>
             <a:endParaRPr lang="en-US"/>
           </a:p>
@@ -1111,7 +1104,7 @@
           <a:p>
             <a:fld id="{E6645DC1-DD2E-5147-813A-145518F6A88E}" type="datetime3">
               <a:rPr lang="en-SG" smtClean="0"/>
-              <a:t>20 February 2023</a:t>
+              <a:t>27 February 2023</a:t>
             </a:fld>
             <a:endParaRPr lang="en-US"/>
           </a:p>
@@ -1412,7 +1405,7 @@
           <a:p>
             <a:fld id="{9CE5D27D-0906-C849-85EF-1698976BF415}" type="datetime3">
               <a:rPr lang="en-SG" smtClean="0"/>
-              <a:t>20 February 2023</a:t>
+              <a:t>27 February 2023</a:t>
             </a:fld>
             <a:endParaRPr lang="en-US"/>
           </a:p>
@@ -1990,7 +1983,7 @@
           <a:p>
             <a:fld id="{B644A007-AED7-CC4E-A6C9-9429041AE4C9}" type="datetime3">
               <a:rPr lang="en-SG" smtClean="0"/>
-              <a:t>20 February 2023</a:t>
+              <a:t>27 February 2023</a:t>
             </a:fld>
             <a:endParaRPr lang="en-US"/>
           </a:p>
@@ -2398,7 +2391,7 @@
           <a:p>
             <a:fld id="{06911E40-0033-E74E-A93D-D0B3F4840C2B}" type="datetime3">
               <a:rPr lang="en-SG" smtClean="0"/>
-              <a:t>20 February 2023</a:t>
+              <a:t>27 February 2023</a:t>
             </a:fld>
             <a:endParaRPr lang="en-US"/>
           </a:p>
@@ -2611,7 +2604,7 @@
           <a:p>
             <a:fld id="{FDD5ADF8-FB30-A140-BC76-B82B3346A618}" type="datetime3">
               <a:rPr lang="en-SG" smtClean="0"/>
-              <a:t>20 February 2023</a:t>
+              <a:t>27 February 2023</a:t>
             </a:fld>
             <a:endParaRPr lang="en-US"/>
           </a:p>
@@ -2954,7 +2947,7 @@
           <a:p>
             <a:fld id="{2EF13291-2998-1E45-BB6C-14491E304C83}" type="datetime3">
               <a:rPr lang="en-SG" smtClean="0"/>
-              <a:t>20 February 2023</a:t>
+              <a:t>27 February 2023</a:t>
             </a:fld>
             <a:endParaRPr lang="en-US"/>
           </a:p>
@@ -3273,7 +3266,7 @@
           <a:p>
             <a:fld id="{7BDC71DE-80FC-B640-A19E-6715081E17F0}" type="datetime3">
               <a:rPr lang="en-SG" smtClean="0"/>
-              <a:t>20 February 2023</a:t>
+              <a:t>27 February 2023</a:t>
             </a:fld>
             <a:endParaRPr lang="en-US"/>
           </a:p>
@@ -3548,7 +3541,7 @@
           <a:p>
             <a:fld id="{39E2CDA4-D7DD-D048-900A-DFEB5E81218B}" type="datetime3">
               <a:rPr lang="en-SG" smtClean="0"/>
-              <a:t>20 February 2023</a:t>
+              <a:t>27 February 2023</a:t>
             </a:fld>
             <a:endParaRPr lang="en-US" dirty="0"/>
           </a:p>
@@ -4097,2339 +4090,7 @@
 </p:sld>
 </file>
 
-<file path=ppt/slides/slide10.xml><?xml version="1.0" encoding="utf-8"?>
-<p:sld xmlns:a="http://schemas.openxmlformats.org/drawingml/2006/main" xmlns:r="http://schemas.openxmlformats.org/officeDocument/2006/relationships" xmlns:p="http://schemas.openxmlformats.org/presentationml/2006/main">
-  <p:cSld>
-    <p:spTree>
-      <p:nvGrpSpPr>
-        <p:cNvPr id="1" name=""/>
-        <p:cNvGrpSpPr/>
-        <p:nvPr/>
-      </p:nvGrpSpPr>
-      <p:grpSpPr>
-        <a:xfrm>
-          <a:off x="0" y="0"/>
-          <a:ext cx="0" cy="0"/>
-          <a:chOff x="0" y="0"/>
-          <a:chExt cx="0" cy="0"/>
-        </a:xfrm>
-      </p:grpSpPr>
-      <p:sp>
-        <p:nvSpPr>
-          <p:cNvPr id="2" name="Title 1">
-            <a:extLst>
-              <a:ext uri="{FF2B5EF4-FFF2-40B4-BE49-F238E27FC236}">
-                <a16:creationId xmlns:a16="http://schemas.microsoft.com/office/drawing/2014/main" id="{203F859C-A883-940D-4E39-209D4D86BE97}"/>
-              </a:ext>
-            </a:extLst>
-          </p:cNvPr>
-          <p:cNvSpPr>
-            <a:spLocks noGrp="1"/>
-          </p:cNvSpPr>
-          <p:nvPr>
-            <p:ph type="title"/>
-          </p:nvPr>
-        </p:nvSpPr>
-        <p:spPr/>
-        <p:txBody>
-          <a:bodyPr/>
-          <a:lstStyle/>
-          <a:p>
-            <a:r>
-              <a:rPr lang="en-US" dirty="0" err="1"/>
-              <a:t>Subsetting</a:t>
-            </a:r>
-            <a:r>
-              <a:rPr lang="en-US" dirty="0"/>
-              <a:t> data frames</a:t>
-            </a:r>
-          </a:p>
-        </p:txBody>
-      </p:sp>
-      <p:sp>
-        <p:nvSpPr>
-          <p:cNvPr id="3" name="Content Placeholder 2">
-            <a:extLst>
-              <a:ext uri="{FF2B5EF4-FFF2-40B4-BE49-F238E27FC236}">
-                <a16:creationId xmlns:a16="http://schemas.microsoft.com/office/drawing/2014/main" id="{06C34019-9D82-E39D-AE68-ACFE3FB3D86A}"/>
-              </a:ext>
-            </a:extLst>
-          </p:cNvPr>
-          <p:cNvSpPr>
-            <a:spLocks noGrp="1"/>
-          </p:cNvSpPr>
-          <p:nvPr>
-            <p:ph idx="1"/>
-          </p:nvPr>
-        </p:nvSpPr>
-        <p:spPr/>
-        <p:txBody>
-          <a:bodyPr/>
-          <a:lstStyle/>
-          <a:p>
-            <a:pPr marL="0" indent="0">
-              <a:buNone/>
-            </a:pPr>
-            <a:r>
-              <a:rPr lang="en-US" dirty="0"/>
-              <a:t>Two ways of </a:t>
-            </a:r>
-            <a:r>
-              <a:rPr lang="en-US" dirty="0" err="1"/>
-              <a:t>subsetting</a:t>
-            </a:r>
-            <a:r>
-              <a:rPr lang="en-US" dirty="0"/>
-              <a:t> a </a:t>
-            </a:r>
-            <a:r>
-              <a:rPr lang="en-US" dirty="0" err="1"/>
-              <a:t>dataframe</a:t>
-            </a:r>
-            <a:r>
-              <a:rPr lang="en-US" dirty="0"/>
-              <a:t>:</a:t>
-            </a:r>
-          </a:p>
-          <a:p>
-            <a:pPr marL="457200" indent="-457200">
-              <a:buFont typeface="+mj-lt"/>
-              <a:buAutoNum type="arabicPeriod"/>
-            </a:pPr>
-            <a:r>
-              <a:rPr lang="en-US" dirty="0"/>
-              <a:t>By indices of rows and columns</a:t>
-            </a:r>
-          </a:p>
-          <a:p>
-            <a:pPr marL="0" indent="0">
-              <a:buNone/>
-            </a:pPr>
-            <a:r>
-              <a:rPr lang="en-US" sz="2000" dirty="0">
-                <a:solidFill>
-                  <a:schemeClr val="accent1"/>
-                </a:solidFill>
-                <a:latin typeface="Fira Code Retina" pitchFamily="49" charset="0"/>
-                <a:ea typeface="Fira Code Retina" pitchFamily="49" charset="0"/>
-                <a:cs typeface="Fira Code Retina" pitchFamily="49" charset="0"/>
-              </a:rPr>
-              <a:t>DF[row, column]</a:t>
-            </a:r>
-          </a:p>
-          <a:p>
-            <a:pPr marL="0" indent="0">
-              <a:buNone/>
-            </a:pPr>
-            <a:endParaRPr lang="en-US" sz="2000" dirty="0">
-              <a:solidFill>
-                <a:schemeClr val="accent1"/>
-              </a:solidFill>
-              <a:latin typeface="Fira Code Retina" pitchFamily="49" charset="0"/>
-              <a:ea typeface="Fira Code Retina" pitchFamily="49" charset="0"/>
-              <a:cs typeface="Fira Code Retina" pitchFamily="49" charset="0"/>
-            </a:endParaRPr>
-          </a:p>
-          <a:p>
-            <a:pPr marL="457200" indent="-457200">
-              <a:buFont typeface="+mj-lt"/>
-              <a:buAutoNum type="arabicPeriod" startAt="2"/>
-            </a:pPr>
-            <a:r>
-              <a:rPr lang="en-US" dirty="0"/>
-              <a:t>Column names</a:t>
-            </a:r>
-          </a:p>
-          <a:p>
-            <a:pPr marL="0" indent="0">
-              <a:buNone/>
-            </a:pPr>
-            <a:r>
-              <a:rPr lang="en-US" sz="2000" dirty="0">
-                <a:solidFill>
-                  <a:schemeClr val="accent1"/>
-                </a:solidFill>
-                <a:latin typeface="Fira Code Retina" pitchFamily="49" charset="0"/>
-                <a:ea typeface="Fira Code Retina" pitchFamily="49" charset="0"/>
-                <a:cs typeface="Fira Code Retina" pitchFamily="49" charset="0"/>
-              </a:rPr>
-              <a:t>surveys[“</a:t>
-            </a:r>
-            <a:r>
-              <a:rPr lang="en-US" sz="2000" dirty="0" err="1">
-                <a:solidFill>
-                  <a:schemeClr val="accent1"/>
-                </a:solidFill>
-                <a:latin typeface="Fira Code Retina" pitchFamily="49" charset="0"/>
-                <a:ea typeface="Fira Code Retina" pitchFamily="49" charset="0"/>
-                <a:cs typeface="Fira Code Retina" pitchFamily="49" charset="0"/>
-              </a:rPr>
-              <a:t>species_id</a:t>
-            </a:r>
-            <a:r>
-              <a:rPr lang="en-US" sz="2000" dirty="0">
-                <a:solidFill>
-                  <a:schemeClr val="accent1"/>
-                </a:solidFill>
-                <a:latin typeface="Fira Code Retina" pitchFamily="49" charset="0"/>
-                <a:ea typeface="Fira Code Retina" pitchFamily="49" charset="0"/>
-                <a:cs typeface="Fira Code Retina" pitchFamily="49" charset="0"/>
-              </a:rPr>
-              <a:t>”]</a:t>
-            </a:r>
-          </a:p>
-          <a:p>
-            <a:pPr marL="0" indent="0">
-              <a:buNone/>
-            </a:pPr>
-            <a:r>
-              <a:rPr lang="en-US" sz="2000" dirty="0">
-                <a:solidFill>
-                  <a:schemeClr val="accent1"/>
-                </a:solidFill>
-                <a:latin typeface="Fira Code Retina" pitchFamily="49" charset="0"/>
-                <a:ea typeface="Fira Code Retina" pitchFamily="49" charset="0"/>
-                <a:cs typeface="Fira Code Retina" pitchFamily="49" charset="0"/>
-              </a:rPr>
-              <a:t>surveys[, “</a:t>
-            </a:r>
-            <a:r>
-              <a:rPr lang="en-US" sz="2000" dirty="0" err="1">
-                <a:solidFill>
-                  <a:schemeClr val="accent1"/>
-                </a:solidFill>
-                <a:latin typeface="Fira Code Retina" pitchFamily="49" charset="0"/>
-                <a:ea typeface="Fira Code Retina" pitchFamily="49" charset="0"/>
-                <a:cs typeface="Fira Code Retina" pitchFamily="49" charset="0"/>
-              </a:rPr>
-              <a:t>species_id</a:t>
-            </a:r>
-            <a:r>
-              <a:rPr lang="en-US" sz="2000" dirty="0">
-                <a:solidFill>
-                  <a:schemeClr val="accent1"/>
-                </a:solidFill>
-                <a:latin typeface="Fira Code Retina" pitchFamily="49" charset="0"/>
-                <a:ea typeface="Fira Code Retina" pitchFamily="49" charset="0"/>
-                <a:cs typeface="Fira Code Retina" pitchFamily="49" charset="0"/>
-              </a:rPr>
-              <a:t>”]</a:t>
-            </a:r>
-          </a:p>
-          <a:p>
-            <a:pPr marL="0" indent="0">
-              <a:buNone/>
-            </a:pPr>
-            <a:r>
-              <a:rPr lang="en-US" sz="2000" dirty="0">
-                <a:solidFill>
-                  <a:schemeClr val="accent1"/>
-                </a:solidFill>
-                <a:latin typeface="Fira Code Retina" pitchFamily="49" charset="0"/>
-                <a:ea typeface="Fira Code Retina" pitchFamily="49" charset="0"/>
-                <a:cs typeface="Fira Code Retina" pitchFamily="49" charset="0"/>
-              </a:rPr>
-              <a:t>surveys[c(“</a:t>
-            </a:r>
-            <a:r>
-              <a:rPr lang="en-US" sz="2000" dirty="0" err="1">
-                <a:solidFill>
-                  <a:schemeClr val="accent1"/>
-                </a:solidFill>
-                <a:latin typeface="Fira Code Retina" pitchFamily="49" charset="0"/>
-                <a:ea typeface="Fira Code Retina" pitchFamily="49" charset="0"/>
-                <a:cs typeface="Fira Code Retina" pitchFamily="49" charset="0"/>
-              </a:rPr>
-              <a:t>species_id</a:t>
-            </a:r>
-            <a:r>
-              <a:rPr lang="en-US" sz="2000" dirty="0">
-                <a:solidFill>
-                  <a:schemeClr val="accent1"/>
-                </a:solidFill>
-                <a:latin typeface="Fira Code Retina" pitchFamily="49" charset="0"/>
-                <a:ea typeface="Fira Code Retina" pitchFamily="49" charset="0"/>
-                <a:cs typeface="Fira Code Retina" pitchFamily="49" charset="0"/>
-              </a:rPr>
-              <a:t>”, “sex”)]</a:t>
-            </a:r>
-          </a:p>
-          <a:p>
-            <a:pPr marL="0" indent="0">
-              <a:buNone/>
-            </a:pPr>
-            <a:r>
-              <a:rPr lang="en-US" sz="2000" dirty="0">
-                <a:solidFill>
-                  <a:schemeClr val="accent1"/>
-                </a:solidFill>
-                <a:latin typeface="Fira Code Retina" pitchFamily="49" charset="0"/>
-                <a:ea typeface="Fira Code Retina" pitchFamily="49" charset="0"/>
-                <a:cs typeface="Fira Code Retina" pitchFamily="49" charset="0"/>
-              </a:rPr>
-              <a:t>surveys[, c(“</a:t>
-            </a:r>
-            <a:r>
-              <a:rPr lang="en-US" sz="2000" dirty="0" err="1">
-                <a:solidFill>
-                  <a:schemeClr val="accent1"/>
-                </a:solidFill>
-                <a:latin typeface="Fira Code Retina" pitchFamily="49" charset="0"/>
-                <a:ea typeface="Fira Code Retina" pitchFamily="49" charset="0"/>
-                <a:cs typeface="Fira Code Retina" pitchFamily="49" charset="0"/>
-              </a:rPr>
-              <a:t>species_id</a:t>
-            </a:r>
-            <a:r>
-              <a:rPr lang="en-US" sz="2000" dirty="0">
-                <a:solidFill>
-                  <a:schemeClr val="accent1"/>
-                </a:solidFill>
-                <a:latin typeface="Fira Code Retina" pitchFamily="49" charset="0"/>
-                <a:ea typeface="Fira Code Retina" pitchFamily="49" charset="0"/>
-                <a:cs typeface="Fira Code Retina" pitchFamily="49" charset="0"/>
-              </a:rPr>
-              <a:t>”, “sex”)]</a:t>
-            </a:r>
-          </a:p>
-          <a:p>
-            <a:pPr marL="0" indent="0">
-              <a:buNone/>
-            </a:pPr>
-            <a:endParaRPr lang="en-US" dirty="0"/>
-          </a:p>
-          <a:p>
-            <a:pPr marL="0" indent="0">
-              <a:buNone/>
-            </a:pPr>
-            <a:endParaRPr lang="en-US" sz="2000" dirty="0">
-              <a:solidFill>
-                <a:schemeClr val="accent1"/>
-              </a:solidFill>
-              <a:latin typeface="Fira Code Retina" pitchFamily="49" charset="0"/>
-              <a:ea typeface="Fira Code Retina" pitchFamily="49" charset="0"/>
-              <a:cs typeface="Fira Code Retina" pitchFamily="49" charset="0"/>
-            </a:endParaRPr>
-          </a:p>
-        </p:txBody>
-      </p:sp>
-    </p:spTree>
-    <p:extLst>
-      <p:ext uri="{BB962C8B-B14F-4D97-AF65-F5344CB8AC3E}">
-        <p14:creationId xmlns:p14="http://schemas.microsoft.com/office/powerpoint/2010/main" val="793165381"/>
-      </p:ext>
-    </p:extLst>
-  </p:cSld>
-  <p:clrMapOvr>
-    <a:masterClrMapping/>
-  </p:clrMapOvr>
-</p:sld>
-</file>
-
-<file path=ppt/slides/slide11.xml><?xml version="1.0" encoding="utf-8"?>
-<p:sld xmlns:a="http://schemas.openxmlformats.org/drawingml/2006/main" xmlns:r="http://schemas.openxmlformats.org/officeDocument/2006/relationships" xmlns:p="http://schemas.openxmlformats.org/presentationml/2006/main">
-  <p:cSld>
-    <p:spTree>
-      <p:nvGrpSpPr>
-        <p:cNvPr id="1" name=""/>
-        <p:cNvGrpSpPr/>
-        <p:nvPr/>
-      </p:nvGrpSpPr>
-      <p:grpSpPr>
-        <a:xfrm>
-          <a:off x="0" y="0"/>
-          <a:ext cx="0" cy="0"/>
-          <a:chOff x="0" y="0"/>
-          <a:chExt cx="0" cy="0"/>
-        </a:xfrm>
-      </p:grpSpPr>
-      <p:sp>
-        <p:nvSpPr>
-          <p:cNvPr id="2" name="Content Placeholder 1">
-            <a:extLst>
-              <a:ext uri="{FF2B5EF4-FFF2-40B4-BE49-F238E27FC236}">
-                <a16:creationId xmlns:a16="http://schemas.microsoft.com/office/drawing/2014/main" id="{8BC4A283-8D7C-2398-546B-9E719F903B16}"/>
-              </a:ext>
-            </a:extLst>
-          </p:cNvPr>
-          <p:cNvSpPr>
-            <a:spLocks noGrp="1"/>
-          </p:cNvSpPr>
-          <p:nvPr>
-            <p:ph sz="half" idx="1"/>
-          </p:nvPr>
-        </p:nvSpPr>
-        <p:spPr/>
-        <p:txBody>
-          <a:bodyPr>
-            <a:normAutofit/>
-          </a:bodyPr>
-          <a:lstStyle/>
-          <a:p>
-            <a:r>
-              <a:rPr lang="en-US" dirty="0"/>
-              <a:t>By indices of rows and columns</a:t>
-            </a:r>
-          </a:p>
-          <a:p>
-            <a:pPr marL="0" indent="0">
-              <a:buNone/>
-            </a:pPr>
-            <a:r>
-              <a:rPr lang="en-US" sz="1800" dirty="0">
-                <a:solidFill>
-                  <a:schemeClr val="accent1"/>
-                </a:solidFill>
-                <a:latin typeface="Fira Code Retina" pitchFamily="49" charset="0"/>
-                <a:ea typeface="Fira Code Retina" pitchFamily="49" charset="0"/>
-                <a:cs typeface="Fira Code Retina" pitchFamily="49" charset="0"/>
-              </a:rPr>
-              <a:t>DF[row, column]</a:t>
-            </a:r>
-          </a:p>
-          <a:p>
-            <a:pPr marL="0" indent="0">
-              <a:buNone/>
-            </a:pPr>
-            <a:endParaRPr lang="en-US" sz="2400" dirty="0">
-              <a:solidFill>
-                <a:schemeClr val="accent1"/>
-              </a:solidFill>
-              <a:latin typeface="Fira Code Retina" pitchFamily="49" charset="0"/>
-              <a:ea typeface="Fira Code Retina" pitchFamily="49" charset="0"/>
-              <a:cs typeface="Fira Code Retina" pitchFamily="49" charset="0"/>
-            </a:endParaRPr>
-          </a:p>
-          <a:p>
-            <a:r>
-              <a:rPr lang="en-US" dirty="0"/>
-              <a:t>Select columns using column names</a:t>
-            </a:r>
-          </a:p>
-          <a:p>
-            <a:pPr marL="0" indent="0">
-              <a:buNone/>
-            </a:pPr>
-            <a:r>
-              <a:rPr lang="en-US" sz="1800" dirty="0">
-                <a:solidFill>
-                  <a:schemeClr val="accent1"/>
-                </a:solidFill>
-                <a:latin typeface="Fira Code Retina" pitchFamily="49" charset="0"/>
-                <a:ea typeface="Fira Code Retina" pitchFamily="49" charset="0"/>
-                <a:cs typeface="Fira Code Retina" pitchFamily="49" charset="0"/>
-              </a:rPr>
-              <a:t>surveys[“</a:t>
-            </a:r>
-            <a:r>
-              <a:rPr lang="en-US" sz="1800" dirty="0" err="1">
-                <a:solidFill>
-                  <a:schemeClr val="accent1"/>
-                </a:solidFill>
-                <a:latin typeface="Fira Code Retina" pitchFamily="49" charset="0"/>
-                <a:ea typeface="Fira Code Retina" pitchFamily="49" charset="0"/>
-                <a:cs typeface="Fira Code Retina" pitchFamily="49" charset="0"/>
-              </a:rPr>
-              <a:t>species_id</a:t>
-            </a:r>
-            <a:r>
-              <a:rPr lang="en-US" sz="1800" dirty="0">
-                <a:solidFill>
-                  <a:schemeClr val="accent1"/>
-                </a:solidFill>
-                <a:latin typeface="Fira Code Retina" pitchFamily="49" charset="0"/>
-                <a:ea typeface="Fira Code Retina" pitchFamily="49" charset="0"/>
-                <a:cs typeface="Fira Code Retina" pitchFamily="49" charset="0"/>
-              </a:rPr>
-              <a:t>”]</a:t>
-            </a:r>
-          </a:p>
-          <a:p>
-            <a:pPr marL="0" indent="0">
-              <a:buNone/>
-            </a:pPr>
-            <a:r>
-              <a:rPr lang="en-US" sz="1800" dirty="0">
-                <a:solidFill>
-                  <a:schemeClr val="accent1"/>
-                </a:solidFill>
-                <a:latin typeface="Fira Code Retina" pitchFamily="49" charset="0"/>
-                <a:ea typeface="Fira Code Retina" pitchFamily="49" charset="0"/>
-                <a:cs typeface="Fira Code Retina" pitchFamily="49" charset="0"/>
-              </a:rPr>
-              <a:t>surveys[, “</a:t>
-            </a:r>
-            <a:r>
-              <a:rPr lang="en-US" sz="1800" dirty="0" err="1">
-                <a:solidFill>
-                  <a:schemeClr val="accent1"/>
-                </a:solidFill>
-                <a:latin typeface="Fira Code Retina" pitchFamily="49" charset="0"/>
-                <a:ea typeface="Fira Code Retina" pitchFamily="49" charset="0"/>
-                <a:cs typeface="Fira Code Retina" pitchFamily="49" charset="0"/>
-              </a:rPr>
-              <a:t>species_id</a:t>
-            </a:r>
-            <a:r>
-              <a:rPr lang="en-US" sz="1800" dirty="0">
-                <a:solidFill>
-                  <a:schemeClr val="accent1"/>
-                </a:solidFill>
-                <a:latin typeface="Fira Code Retina" pitchFamily="49" charset="0"/>
-                <a:ea typeface="Fira Code Retina" pitchFamily="49" charset="0"/>
-                <a:cs typeface="Fira Code Retina" pitchFamily="49" charset="0"/>
-              </a:rPr>
-              <a:t>”]</a:t>
-            </a:r>
-          </a:p>
-          <a:p>
-            <a:pPr marL="0" indent="0">
-              <a:buNone/>
-            </a:pPr>
-            <a:r>
-              <a:rPr lang="en-US" sz="1800" dirty="0">
-                <a:solidFill>
-                  <a:schemeClr val="accent1"/>
-                </a:solidFill>
-                <a:latin typeface="Fira Code Retina" pitchFamily="49" charset="0"/>
-                <a:ea typeface="Fira Code Retina" pitchFamily="49" charset="0"/>
-                <a:cs typeface="Fira Code Retina" pitchFamily="49" charset="0"/>
-              </a:rPr>
-              <a:t>surveys[c(“</a:t>
-            </a:r>
-            <a:r>
-              <a:rPr lang="en-US" sz="1800" dirty="0" err="1">
-                <a:solidFill>
-                  <a:schemeClr val="accent1"/>
-                </a:solidFill>
-                <a:latin typeface="Fira Code Retina" pitchFamily="49" charset="0"/>
-                <a:ea typeface="Fira Code Retina" pitchFamily="49" charset="0"/>
-                <a:cs typeface="Fira Code Retina" pitchFamily="49" charset="0"/>
-              </a:rPr>
-              <a:t>species_id</a:t>
-            </a:r>
-            <a:r>
-              <a:rPr lang="en-US" sz="1800" dirty="0">
-                <a:solidFill>
-                  <a:schemeClr val="accent1"/>
-                </a:solidFill>
-                <a:latin typeface="Fira Code Retina" pitchFamily="49" charset="0"/>
-                <a:ea typeface="Fira Code Retina" pitchFamily="49" charset="0"/>
-                <a:cs typeface="Fira Code Retina" pitchFamily="49" charset="0"/>
-              </a:rPr>
-              <a:t>”, “sex”)]</a:t>
-            </a:r>
-          </a:p>
-          <a:p>
-            <a:pPr marL="0" indent="0">
-              <a:buNone/>
-            </a:pPr>
-            <a:r>
-              <a:rPr lang="en-US" sz="1800" dirty="0">
-                <a:solidFill>
-                  <a:schemeClr val="accent1"/>
-                </a:solidFill>
-                <a:latin typeface="Fira Code Retina" pitchFamily="49" charset="0"/>
-                <a:ea typeface="Fira Code Retina" pitchFamily="49" charset="0"/>
-                <a:cs typeface="Fira Code Retina" pitchFamily="49" charset="0"/>
-              </a:rPr>
-              <a:t>surveys[, c(“</a:t>
-            </a:r>
-            <a:r>
-              <a:rPr lang="en-US" sz="1800" dirty="0" err="1">
-                <a:solidFill>
-                  <a:schemeClr val="accent1"/>
-                </a:solidFill>
-                <a:latin typeface="Fira Code Retina" pitchFamily="49" charset="0"/>
-                <a:ea typeface="Fira Code Retina" pitchFamily="49" charset="0"/>
-                <a:cs typeface="Fira Code Retina" pitchFamily="49" charset="0"/>
-              </a:rPr>
-              <a:t>species_id</a:t>
-            </a:r>
-            <a:r>
-              <a:rPr lang="en-US" sz="1800" dirty="0">
-                <a:solidFill>
-                  <a:schemeClr val="accent1"/>
-                </a:solidFill>
-                <a:latin typeface="Fira Code Retina" pitchFamily="49" charset="0"/>
-                <a:ea typeface="Fira Code Retina" pitchFamily="49" charset="0"/>
-                <a:cs typeface="Fira Code Retina" pitchFamily="49" charset="0"/>
-              </a:rPr>
-              <a:t>”, “sex”)]</a:t>
-            </a:r>
-          </a:p>
-          <a:p>
-            <a:pPr marL="0" indent="0">
-              <a:buNone/>
-            </a:pPr>
-            <a:endParaRPr lang="en-US" sz="1800" dirty="0">
-              <a:solidFill>
-                <a:schemeClr val="accent1"/>
-              </a:solidFill>
-              <a:latin typeface="Fira Code Retina" pitchFamily="49" charset="0"/>
-              <a:ea typeface="Fira Code Retina" pitchFamily="49" charset="0"/>
-              <a:cs typeface="Fira Code Retina" pitchFamily="49" charset="0"/>
-            </a:endParaRPr>
-          </a:p>
-          <a:p>
-            <a:pPr marL="0" indent="0">
-              <a:buNone/>
-            </a:pPr>
-            <a:endParaRPr lang="en-US" sz="1800" dirty="0">
-              <a:solidFill>
-                <a:schemeClr val="accent1"/>
-              </a:solidFill>
-              <a:latin typeface="Fira Code Retina" pitchFamily="49" charset="0"/>
-              <a:ea typeface="Fira Code Retina" pitchFamily="49" charset="0"/>
-              <a:cs typeface="Fira Code Retina" pitchFamily="49" charset="0"/>
-            </a:endParaRPr>
-          </a:p>
-        </p:txBody>
-      </p:sp>
-      <p:sp>
-        <p:nvSpPr>
-          <p:cNvPr id="3" name="Content Placeholder 2">
-            <a:extLst>
-              <a:ext uri="{FF2B5EF4-FFF2-40B4-BE49-F238E27FC236}">
-                <a16:creationId xmlns:a16="http://schemas.microsoft.com/office/drawing/2014/main" id="{3D649EF8-6E5F-0F34-2135-4B29B035A1AD}"/>
-              </a:ext>
-            </a:extLst>
-          </p:cNvPr>
-          <p:cNvSpPr>
-            <a:spLocks noGrp="1"/>
-          </p:cNvSpPr>
-          <p:nvPr>
-            <p:ph sz="half" idx="2"/>
-          </p:nvPr>
-        </p:nvSpPr>
-        <p:spPr/>
-        <p:txBody>
-          <a:bodyPr/>
-          <a:lstStyle/>
-          <a:p>
-            <a:pPr marL="0" indent="0">
-              <a:buNone/>
-            </a:pPr>
-            <a:r>
-              <a:rPr lang="en-US" dirty="0">
-                <a:ea typeface="Fira Code Retina" pitchFamily="49" charset="0"/>
-                <a:cs typeface="Fira Code Retina" pitchFamily="49" charset="0"/>
-              </a:rPr>
-              <a:t>A few </a:t>
-            </a:r>
-            <a:r>
-              <a:rPr lang="en-US" sz="1800" dirty="0" err="1">
-                <a:solidFill>
-                  <a:schemeClr val="accent1"/>
-                </a:solidFill>
-                <a:latin typeface="Fira Code Retina" pitchFamily="49" charset="0"/>
-                <a:ea typeface="Fira Code Retina" pitchFamily="49" charset="0"/>
-                <a:cs typeface="Fira Code Retina" pitchFamily="49" charset="0"/>
-              </a:rPr>
-              <a:t>tibble</a:t>
-            </a:r>
-            <a:r>
-              <a:rPr lang="en-US" dirty="0">
-                <a:ea typeface="Fira Code Retina" pitchFamily="49" charset="0"/>
-                <a:cs typeface="Fira Code Retina" pitchFamily="49" charset="0"/>
-              </a:rPr>
-              <a:t> rules</a:t>
-            </a:r>
-          </a:p>
-          <a:p>
-            <a:r>
-              <a:rPr lang="en-US" sz="1800" dirty="0">
-                <a:solidFill>
-                  <a:schemeClr val="accent1"/>
-                </a:solidFill>
-                <a:latin typeface="Fira Code Retina" pitchFamily="49" charset="0"/>
-                <a:ea typeface="Fira Code Retina" pitchFamily="49" charset="0"/>
-                <a:cs typeface="Fira Code Retina" pitchFamily="49" charset="0"/>
-              </a:rPr>
-              <a:t>DF[“var”] </a:t>
-            </a:r>
-            <a:r>
-              <a:rPr lang="en-US" dirty="0"/>
-              <a:t>single bracket always returns a </a:t>
-            </a:r>
-            <a:r>
-              <a:rPr lang="en-US" dirty="0" err="1"/>
-              <a:t>dataframe</a:t>
-            </a:r>
-            <a:endParaRPr lang="en-US" dirty="0"/>
-          </a:p>
-          <a:p>
-            <a:r>
-              <a:rPr lang="en-US" sz="1800" dirty="0">
-                <a:solidFill>
-                  <a:schemeClr val="accent1"/>
-                </a:solidFill>
-                <a:latin typeface="Fira Code Retina" pitchFamily="49" charset="0"/>
-                <a:ea typeface="Fira Code Retina" pitchFamily="49" charset="0"/>
-                <a:cs typeface="Fira Code Retina" pitchFamily="49" charset="0"/>
-              </a:rPr>
-              <a:t>DF[[“var”]] </a:t>
-            </a:r>
-            <a:r>
-              <a:rPr lang="en-US" dirty="0"/>
-              <a:t>double brackets always return a vector</a:t>
-            </a:r>
-          </a:p>
-          <a:p>
-            <a:r>
-              <a:rPr lang="en-US" sz="1800" dirty="0" err="1">
-                <a:solidFill>
-                  <a:schemeClr val="accent1"/>
-                </a:solidFill>
-                <a:latin typeface="Fira Code Retina" pitchFamily="49" charset="0"/>
-                <a:ea typeface="Fira Code Retina" pitchFamily="49" charset="0"/>
-                <a:cs typeface="Fira Code Retina" pitchFamily="49" charset="0"/>
-              </a:rPr>
-              <a:t>DF$var</a:t>
-            </a:r>
-            <a:r>
-              <a:rPr lang="en-US" sz="1800" dirty="0">
-                <a:solidFill>
-                  <a:schemeClr val="accent1"/>
-                </a:solidFill>
-                <a:latin typeface="Fira Code Retina" pitchFamily="49" charset="0"/>
-                <a:ea typeface="Fira Code Retina" pitchFamily="49" charset="0"/>
-                <a:cs typeface="Fira Code Retina" pitchFamily="49" charset="0"/>
-              </a:rPr>
-              <a:t> </a:t>
-            </a:r>
-            <a:r>
-              <a:rPr lang="en-US" dirty="0"/>
-              <a:t>returns a vector</a:t>
-            </a:r>
-          </a:p>
-          <a:p>
-            <a:endParaRPr lang="en-US" dirty="0"/>
-          </a:p>
-        </p:txBody>
-      </p:sp>
-      <p:sp>
-        <p:nvSpPr>
-          <p:cNvPr id="4" name="Title 3">
-            <a:extLst>
-              <a:ext uri="{FF2B5EF4-FFF2-40B4-BE49-F238E27FC236}">
-                <a16:creationId xmlns:a16="http://schemas.microsoft.com/office/drawing/2014/main" id="{E654B934-C0D6-5774-03A9-ECEE614DED79}"/>
-              </a:ext>
-            </a:extLst>
-          </p:cNvPr>
-          <p:cNvSpPr>
-            <a:spLocks noGrp="1"/>
-          </p:cNvSpPr>
-          <p:nvPr>
-            <p:ph type="title"/>
-          </p:nvPr>
-        </p:nvSpPr>
-        <p:spPr/>
-        <p:txBody>
-          <a:bodyPr/>
-          <a:lstStyle/>
-          <a:p>
-            <a:r>
-              <a:rPr lang="en-US" dirty="0" err="1"/>
-              <a:t>Subsetting</a:t>
-            </a:r>
-            <a:r>
-              <a:rPr lang="en-US" dirty="0"/>
-              <a:t> data frames</a:t>
-            </a:r>
-          </a:p>
-        </p:txBody>
-      </p:sp>
-    </p:spTree>
-    <p:extLst>
-      <p:ext uri="{BB962C8B-B14F-4D97-AF65-F5344CB8AC3E}">
-        <p14:creationId xmlns:p14="http://schemas.microsoft.com/office/powerpoint/2010/main" val="251870385"/>
-      </p:ext>
-    </p:extLst>
-  </p:cSld>
-  <p:clrMapOvr>
-    <a:masterClrMapping/>
-  </p:clrMapOvr>
-</p:sld>
-</file>
-
-<file path=ppt/slides/slide12.xml><?xml version="1.0" encoding="utf-8"?>
-<p:sld xmlns:a="http://schemas.openxmlformats.org/drawingml/2006/main" xmlns:r="http://schemas.openxmlformats.org/officeDocument/2006/relationships" xmlns:p="http://schemas.openxmlformats.org/presentationml/2006/main">
-  <p:cSld>
-    <p:spTree>
-      <p:nvGrpSpPr>
-        <p:cNvPr id="1" name=""/>
-        <p:cNvGrpSpPr/>
-        <p:nvPr/>
-      </p:nvGrpSpPr>
-      <p:grpSpPr>
-        <a:xfrm>
-          <a:off x="0" y="0"/>
-          <a:ext cx="0" cy="0"/>
-          <a:chOff x="0" y="0"/>
-          <a:chExt cx="0" cy="0"/>
-        </a:xfrm>
-      </p:grpSpPr>
-      <p:sp>
-        <p:nvSpPr>
-          <p:cNvPr id="2" name="Title 1">
-            <a:extLst>
-              <a:ext uri="{FF2B5EF4-FFF2-40B4-BE49-F238E27FC236}">
-                <a16:creationId xmlns:a16="http://schemas.microsoft.com/office/drawing/2014/main" id="{1B23EF58-7254-A6FB-FEA9-6505FA903B69}"/>
-              </a:ext>
-            </a:extLst>
-          </p:cNvPr>
-          <p:cNvSpPr>
-            <a:spLocks noGrp="1"/>
-          </p:cNvSpPr>
-          <p:nvPr>
-            <p:ph type="title"/>
-          </p:nvPr>
-        </p:nvSpPr>
-        <p:spPr/>
-        <p:txBody>
-          <a:bodyPr/>
-          <a:lstStyle/>
-          <a:p>
-            <a:r>
-              <a:rPr lang="en-US" dirty="0"/>
-              <a:t>Factors</a:t>
-            </a:r>
-          </a:p>
-        </p:txBody>
-      </p:sp>
-      <p:sp>
-        <p:nvSpPr>
-          <p:cNvPr id="3" name="Content Placeholder 2">
-            <a:extLst>
-              <a:ext uri="{FF2B5EF4-FFF2-40B4-BE49-F238E27FC236}">
-                <a16:creationId xmlns:a16="http://schemas.microsoft.com/office/drawing/2014/main" id="{B386768B-D0AD-D2E7-6F35-C5C48956668D}"/>
-              </a:ext>
-            </a:extLst>
-          </p:cNvPr>
-          <p:cNvSpPr>
-            <a:spLocks noGrp="1"/>
-          </p:cNvSpPr>
-          <p:nvPr>
-            <p:ph idx="1"/>
-          </p:nvPr>
-        </p:nvSpPr>
-        <p:spPr/>
-        <p:txBody>
-          <a:bodyPr/>
-          <a:lstStyle/>
-          <a:p>
-            <a:r>
-              <a:rPr lang="en-US" dirty="0"/>
-              <a:t>A special class for working with categorical data</a:t>
-            </a:r>
-          </a:p>
-          <a:p>
-            <a:r>
-              <a:rPr lang="en-US" dirty="0"/>
-              <a:t>Contain a pre-defined set of values: levels</a:t>
-            </a:r>
-          </a:p>
-          <a:p>
-            <a:r>
-              <a:rPr lang="en-US" dirty="0"/>
-              <a:t>Levels are integers attached with labels</a:t>
-            </a:r>
-          </a:p>
-          <a:p>
-            <a:r>
-              <a:rPr lang="en-US" dirty="0"/>
-              <a:t>While behave like character vector, R treats factors as integer</a:t>
-            </a:r>
-          </a:p>
-          <a:p>
-            <a:r>
-              <a:rPr lang="en-US" dirty="0"/>
-              <a:t>Can specify the order of the categories in a variable</a:t>
-            </a:r>
-          </a:p>
-          <a:p>
-            <a:pPr lvl="1"/>
-            <a:r>
-              <a:rPr lang="en-US" dirty="0"/>
-              <a:t>R sorts character vectors in alphabetical order (e.g., during plotting)</a:t>
-            </a:r>
-          </a:p>
-          <a:p>
-            <a:r>
-              <a:rPr lang="en-US" dirty="0"/>
-              <a:t>Use </a:t>
-            </a:r>
-            <a:r>
-              <a:rPr lang="en-US" sz="2000" dirty="0">
-                <a:solidFill>
-                  <a:schemeClr val="accent1"/>
-                </a:solidFill>
-                <a:latin typeface="Fira Code Retina" pitchFamily="49" charset="0"/>
-                <a:ea typeface="Fira Code Retina" pitchFamily="49" charset="0"/>
-                <a:cs typeface="Fira Code Retina" pitchFamily="49" charset="0"/>
-              </a:rPr>
-              <a:t>factor() </a:t>
-            </a:r>
-            <a:r>
-              <a:rPr lang="en-US" dirty="0"/>
-              <a:t>to convert to </a:t>
-            </a:r>
-            <a:r>
-              <a:rPr lang="en-US" sz="2000" dirty="0">
-                <a:solidFill>
-                  <a:schemeClr val="accent1"/>
-                </a:solidFill>
-                <a:latin typeface="Fira Code Retina" pitchFamily="49" charset="0"/>
-                <a:ea typeface="Fira Code Retina" pitchFamily="49" charset="0"/>
-                <a:cs typeface="Fira Code Retina" pitchFamily="49" charset="0"/>
-              </a:rPr>
-              <a:t>factor</a:t>
-            </a:r>
-            <a:r>
-              <a:rPr lang="en-US" dirty="0"/>
-              <a:t> data type</a:t>
-            </a:r>
-          </a:p>
-        </p:txBody>
-      </p:sp>
-    </p:spTree>
-    <p:extLst>
-      <p:ext uri="{BB962C8B-B14F-4D97-AF65-F5344CB8AC3E}">
-        <p14:creationId xmlns:p14="http://schemas.microsoft.com/office/powerpoint/2010/main" val="1466937768"/>
-      </p:ext>
-    </p:extLst>
-  </p:cSld>
-  <p:clrMapOvr>
-    <a:masterClrMapping/>
-  </p:clrMapOvr>
-</p:sld>
-</file>
-
-<file path=ppt/slides/slide13.xml><?xml version="1.0" encoding="utf-8"?>
-<p:sld xmlns:a="http://schemas.openxmlformats.org/drawingml/2006/main" xmlns:r="http://schemas.openxmlformats.org/officeDocument/2006/relationships" xmlns:p="http://schemas.openxmlformats.org/presentationml/2006/main">
-  <p:cSld>
-    <p:spTree>
-      <p:nvGrpSpPr>
-        <p:cNvPr id="1" name=""/>
-        <p:cNvGrpSpPr/>
-        <p:nvPr/>
-      </p:nvGrpSpPr>
-      <p:grpSpPr>
-        <a:xfrm>
-          <a:off x="0" y="0"/>
-          <a:ext cx="0" cy="0"/>
-          <a:chOff x="0" y="0"/>
-          <a:chExt cx="0" cy="0"/>
-        </a:xfrm>
-      </p:grpSpPr>
-      <p:sp>
-        <p:nvSpPr>
-          <p:cNvPr id="2" name="Title 1">
-            <a:extLst>
-              <a:ext uri="{FF2B5EF4-FFF2-40B4-BE49-F238E27FC236}">
-                <a16:creationId xmlns:a16="http://schemas.microsoft.com/office/drawing/2014/main" id="{D387C49B-A029-4FD0-09AD-145E3A8A7C2E}"/>
-              </a:ext>
-            </a:extLst>
-          </p:cNvPr>
-          <p:cNvSpPr>
-            <a:spLocks noGrp="1"/>
-          </p:cNvSpPr>
-          <p:nvPr>
-            <p:ph type="title"/>
-          </p:nvPr>
-        </p:nvSpPr>
-        <p:spPr/>
-        <p:txBody>
-          <a:bodyPr/>
-          <a:lstStyle/>
-          <a:p>
-            <a:r>
-              <a:rPr lang="en-US" dirty="0"/>
-              <a:t>Formatting dates</a:t>
-            </a:r>
-          </a:p>
-        </p:txBody>
-      </p:sp>
-      <p:sp>
-        <p:nvSpPr>
-          <p:cNvPr id="3" name="Content Placeholder 2">
-            <a:extLst>
-              <a:ext uri="{FF2B5EF4-FFF2-40B4-BE49-F238E27FC236}">
-                <a16:creationId xmlns:a16="http://schemas.microsoft.com/office/drawing/2014/main" id="{667130D3-9BC5-FEBB-DC58-8D306D442EF1}"/>
-              </a:ext>
-            </a:extLst>
-          </p:cNvPr>
-          <p:cNvSpPr>
-            <a:spLocks noGrp="1"/>
-          </p:cNvSpPr>
-          <p:nvPr>
-            <p:ph idx="1"/>
-          </p:nvPr>
-        </p:nvSpPr>
-        <p:spPr/>
-        <p:txBody>
-          <a:bodyPr/>
-          <a:lstStyle/>
-          <a:p>
-            <a:r>
-              <a:rPr lang="en-US" dirty="0"/>
-              <a:t>R stores dates in “YYYY-MM-DD” format by default</a:t>
-            </a:r>
-          </a:p>
-          <a:p>
-            <a:r>
-              <a:rPr lang="en-US" dirty="0"/>
-              <a:t>Use </a:t>
-            </a:r>
-            <a:r>
-              <a:rPr lang="en-US" sz="2000" dirty="0">
-                <a:solidFill>
-                  <a:schemeClr val="accent1"/>
-                </a:solidFill>
-                <a:latin typeface="Fira Code Retina" pitchFamily="49" charset="0"/>
-                <a:ea typeface="Fira Code Retina" pitchFamily="49" charset="0"/>
-                <a:cs typeface="Fira Code Retina" pitchFamily="49" charset="0"/>
-              </a:rPr>
-              <a:t>str() </a:t>
-            </a:r>
-            <a:r>
-              <a:rPr lang="en-US" dirty="0"/>
-              <a:t>or </a:t>
-            </a:r>
-            <a:r>
-              <a:rPr lang="en-US" sz="2000" dirty="0">
-                <a:solidFill>
-                  <a:schemeClr val="accent1"/>
-                </a:solidFill>
-                <a:latin typeface="Fira Code Retina" pitchFamily="49" charset="0"/>
-                <a:ea typeface="Fira Code Retina" pitchFamily="49" charset="0"/>
-                <a:cs typeface="Fira Code Retina" pitchFamily="49" charset="0"/>
-              </a:rPr>
-              <a:t>class() </a:t>
-            </a:r>
-            <a:r>
-              <a:rPr lang="en-US" dirty="0"/>
-              <a:t>to check whether a vector is a date</a:t>
-            </a:r>
-          </a:p>
-          <a:p>
-            <a:r>
-              <a:rPr lang="en-US" dirty="0"/>
-              <a:t>Use </a:t>
-            </a:r>
-            <a:r>
-              <a:rPr lang="en-US" dirty="0" err="1"/>
-              <a:t>lubridate</a:t>
-            </a:r>
-            <a:r>
-              <a:rPr lang="en-US" dirty="0"/>
-              <a:t> package</a:t>
-            </a:r>
-          </a:p>
-          <a:p>
-            <a:pPr lvl="1"/>
-            <a:r>
-              <a:rPr lang="en-US" dirty="0"/>
-              <a:t>Installed as part of </a:t>
-            </a:r>
-            <a:r>
-              <a:rPr lang="en-US" dirty="0" err="1"/>
-              <a:t>tidyverse</a:t>
-            </a:r>
-            <a:endParaRPr lang="en-US" dirty="0"/>
-          </a:p>
-          <a:p>
-            <a:pPr lvl="1"/>
-            <a:r>
-              <a:rPr lang="en-US" dirty="0"/>
-              <a:t>We will use </a:t>
-            </a:r>
-            <a:r>
-              <a:rPr lang="en-US" dirty="0" err="1">
-                <a:solidFill>
-                  <a:schemeClr val="accent1"/>
-                </a:solidFill>
-                <a:latin typeface="Fira Code Retina" pitchFamily="49" charset="0"/>
-                <a:ea typeface="Fira Code Retina" pitchFamily="49" charset="0"/>
-                <a:cs typeface="Fira Code Retina" pitchFamily="49" charset="0"/>
-              </a:rPr>
-              <a:t>ymd</a:t>
-            </a:r>
-            <a:r>
-              <a:rPr lang="en-US" dirty="0">
-                <a:solidFill>
-                  <a:schemeClr val="accent1"/>
-                </a:solidFill>
-                <a:latin typeface="Fira Code Retina" pitchFamily="49" charset="0"/>
-                <a:ea typeface="Fira Code Retina" pitchFamily="49" charset="0"/>
-                <a:cs typeface="Fira Code Retina" pitchFamily="49" charset="0"/>
-              </a:rPr>
-              <a:t>()</a:t>
-            </a:r>
-            <a:r>
-              <a:rPr lang="en-US" dirty="0"/>
-              <a:t> for today’s exercise</a:t>
-            </a:r>
-          </a:p>
-        </p:txBody>
-      </p:sp>
-    </p:spTree>
-    <p:extLst>
-      <p:ext uri="{BB962C8B-B14F-4D97-AF65-F5344CB8AC3E}">
-        <p14:creationId xmlns:p14="http://schemas.microsoft.com/office/powerpoint/2010/main" val="4089039740"/>
-      </p:ext>
-    </p:extLst>
-  </p:cSld>
-  <p:clrMapOvr>
-    <a:masterClrMapping/>
-  </p:clrMapOvr>
-</p:sld>
-</file>
-
 <file path=ppt/slides/slide2.xml><?xml version="1.0" encoding="utf-8"?>
-<p:sld xmlns:a="http://schemas.openxmlformats.org/drawingml/2006/main" xmlns:r="http://schemas.openxmlformats.org/officeDocument/2006/relationships" xmlns:p="http://schemas.openxmlformats.org/presentationml/2006/main">
-  <p:cSld>
-    <p:spTree>
-      <p:nvGrpSpPr>
-        <p:cNvPr id="1" name=""/>
-        <p:cNvGrpSpPr/>
-        <p:nvPr/>
-      </p:nvGrpSpPr>
-      <p:grpSpPr>
-        <a:xfrm>
-          <a:off x="0" y="0"/>
-          <a:ext cx="0" cy="0"/>
-          <a:chOff x="0" y="0"/>
-          <a:chExt cx="0" cy="0"/>
-        </a:xfrm>
-      </p:grpSpPr>
-      <p:sp>
-        <p:nvSpPr>
-          <p:cNvPr id="2" name="Title 1">
-            <a:extLst>
-              <a:ext uri="{FF2B5EF4-FFF2-40B4-BE49-F238E27FC236}">
-                <a16:creationId xmlns:a16="http://schemas.microsoft.com/office/drawing/2014/main" id="{FA4FE955-1908-117D-D3CD-481C65C5BA9A}"/>
-              </a:ext>
-            </a:extLst>
-          </p:cNvPr>
-          <p:cNvSpPr>
-            <a:spLocks noGrp="1"/>
-          </p:cNvSpPr>
-          <p:nvPr>
-            <p:ph type="title"/>
-          </p:nvPr>
-        </p:nvSpPr>
-        <p:spPr/>
-        <p:txBody>
-          <a:bodyPr/>
-          <a:lstStyle/>
-          <a:p>
-            <a:r>
-              <a:rPr lang="en-US" dirty="0"/>
-              <a:t>Intro to R (leftover from previous session)</a:t>
-            </a:r>
-          </a:p>
-        </p:txBody>
-      </p:sp>
-      <p:sp>
-        <p:nvSpPr>
-          <p:cNvPr id="3" name="Text Placeholder 2">
-            <a:extLst>
-              <a:ext uri="{FF2B5EF4-FFF2-40B4-BE49-F238E27FC236}">
-                <a16:creationId xmlns:a16="http://schemas.microsoft.com/office/drawing/2014/main" id="{93AF016C-8754-479F-5BA5-BBB399660498}"/>
-              </a:ext>
-            </a:extLst>
-          </p:cNvPr>
-          <p:cNvSpPr>
-            <a:spLocks noGrp="1"/>
-          </p:cNvSpPr>
-          <p:nvPr>
-            <p:ph type="body" idx="1"/>
-          </p:nvPr>
-        </p:nvSpPr>
-        <p:spPr/>
-        <p:txBody>
-          <a:bodyPr/>
-          <a:lstStyle/>
-          <a:p>
-            <a:endParaRPr lang="en-US"/>
-          </a:p>
-        </p:txBody>
-      </p:sp>
-    </p:spTree>
-    <p:extLst>
-      <p:ext uri="{BB962C8B-B14F-4D97-AF65-F5344CB8AC3E}">
-        <p14:creationId xmlns:p14="http://schemas.microsoft.com/office/powerpoint/2010/main" val="3182852064"/>
-      </p:ext>
-    </p:extLst>
-  </p:cSld>
-  <p:clrMapOvr>
-    <a:masterClrMapping/>
-  </p:clrMapOvr>
-</p:sld>
-</file>
-
-<file path=ppt/slides/slide3.xml><?xml version="1.0" encoding="utf-8"?>
-<p:sld xmlns:a="http://schemas.openxmlformats.org/drawingml/2006/main" xmlns:r="http://schemas.openxmlformats.org/officeDocument/2006/relationships" xmlns:p="http://schemas.openxmlformats.org/presentationml/2006/main">
-  <p:cSld>
-    <p:spTree>
-      <p:nvGrpSpPr>
-        <p:cNvPr id="1" name=""/>
-        <p:cNvGrpSpPr/>
-        <p:nvPr/>
-      </p:nvGrpSpPr>
-      <p:grpSpPr>
-        <a:xfrm>
-          <a:off x="0" y="0"/>
-          <a:ext cx="0" cy="0"/>
-          <a:chOff x="0" y="0"/>
-          <a:chExt cx="0" cy="0"/>
-        </a:xfrm>
-      </p:grpSpPr>
-      <p:sp>
-        <p:nvSpPr>
-          <p:cNvPr id="2" name="Title 1">
-            <a:extLst>
-              <a:ext uri="{FF2B5EF4-FFF2-40B4-BE49-F238E27FC236}">
-                <a16:creationId xmlns:a16="http://schemas.microsoft.com/office/drawing/2014/main" id="{38F0976D-9BB7-F9BF-45AA-FADA690359F4}"/>
-              </a:ext>
-            </a:extLst>
-          </p:cNvPr>
-          <p:cNvSpPr>
-            <a:spLocks noGrp="1"/>
-          </p:cNvSpPr>
-          <p:nvPr>
-            <p:ph type="title"/>
-          </p:nvPr>
-        </p:nvSpPr>
-        <p:spPr>
-          <a:xfrm>
-            <a:off x="838200" y="365125"/>
-            <a:ext cx="9152752" cy="995221"/>
-          </a:xfrm>
-        </p:spPr>
-        <p:txBody>
-          <a:bodyPr/>
-          <a:lstStyle/>
-          <a:p>
-            <a:pPr marL="0" lvl="0" indent="0">
-              <a:buNone/>
-            </a:pPr>
-            <a:r>
-              <a:rPr dirty="0"/>
-              <a:t>Vectors and data types</a:t>
-            </a:r>
-          </a:p>
-        </p:txBody>
-      </p:sp>
-      <p:sp>
-        <p:nvSpPr>
-          <p:cNvPr id="3" name="Content Placeholder 2">
-            <a:extLst>
-              <a:ext uri="{FF2B5EF4-FFF2-40B4-BE49-F238E27FC236}">
-                <a16:creationId xmlns:a16="http://schemas.microsoft.com/office/drawing/2014/main" id="{49752B89-85F3-5DE8-AB98-7BFB09D2A4DD}"/>
-              </a:ext>
-            </a:extLst>
-          </p:cNvPr>
-          <p:cNvSpPr>
-            <a:spLocks noGrp="1"/>
-          </p:cNvSpPr>
-          <p:nvPr>
-            <p:ph idx="1"/>
-          </p:nvPr>
-        </p:nvSpPr>
-        <p:spPr/>
-        <p:txBody>
-          <a:bodyPr/>
-          <a:lstStyle/>
-          <a:p>
-            <a:pPr lvl="0"/>
-            <a:r>
-              <a:rPr dirty="0"/>
-              <a:t>Basic data type in R</a:t>
-            </a:r>
-          </a:p>
-          <a:p>
-            <a:pPr lvl="0"/>
-            <a:r>
-              <a:rPr dirty="0"/>
-              <a:t>Types</a:t>
-            </a:r>
-          </a:p>
-          <a:p>
-            <a:pPr lvl="1"/>
-            <a:r>
-              <a:rPr dirty="0"/>
-              <a:t>Logical: </a:t>
-            </a:r>
-            <a:r>
-              <a:rPr dirty="0">
-                <a:solidFill>
-                  <a:schemeClr val="accent1"/>
-                </a:solidFill>
-                <a:latin typeface="Fira Code Retina" pitchFamily="49" charset="0"/>
-                <a:ea typeface="Fira Code Retina" pitchFamily="49" charset="0"/>
-                <a:cs typeface="Fira Code Retina" pitchFamily="49" charset="0"/>
-              </a:rPr>
-              <a:t>TRUE</a:t>
-            </a:r>
-            <a:r>
-              <a:rPr dirty="0"/>
-              <a:t> or </a:t>
-            </a:r>
-            <a:r>
-              <a:rPr dirty="0">
-                <a:solidFill>
-                  <a:schemeClr val="accent1"/>
-                </a:solidFill>
-                <a:latin typeface="Fira Code Retina" pitchFamily="49" charset="0"/>
-                <a:ea typeface="Fira Code Retina" pitchFamily="49" charset="0"/>
-                <a:cs typeface="Fira Code Retina" pitchFamily="49" charset="0"/>
-              </a:rPr>
-              <a:t>FASLE</a:t>
-            </a:r>
-          </a:p>
-          <a:p>
-            <a:pPr lvl="1"/>
-            <a:r>
-              <a:rPr dirty="0"/>
-              <a:t>Numeric: Either integer or double (real)</a:t>
-            </a:r>
-          </a:p>
-          <a:p>
-            <a:pPr lvl="1"/>
-            <a:r>
-              <a:rPr dirty="0"/>
-              <a:t>Character (add double quote </a:t>
-            </a:r>
-            <a:r>
-              <a:rPr dirty="0">
-                <a:solidFill>
-                  <a:schemeClr val="accent1"/>
-                </a:solidFill>
-                <a:latin typeface="Fira Code Retina" pitchFamily="49" charset="0"/>
-                <a:ea typeface="Fira Code Retina" pitchFamily="49" charset="0"/>
-                <a:cs typeface="Fira Code Retina" pitchFamily="49" charset="0"/>
-              </a:rPr>
-              <a:t>"dog"</a:t>
-            </a:r>
-            <a:r>
-              <a:rPr lang="en-US" dirty="0">
-                <a:solidFill>
-                  <a:schemeClr val="accent1"/>
-                </a:solidFill>
-              </a:rPr>
-              <a:t> </a:t>
-            </a:r>
-            <a:r>
-              <a:rPr lang="en-US" dirty="0"/>
-              <a:t>(</a:t>
-            </a:r>
-            <a:r>
-              <a:rPr dirty="0"/>
-              <a:t>more common) or single quote </a:t>
-            </a:r>
-            <a:r>
-              <a:rPr dirty="0">
-                <a:solidFill>
-                  <a:schemeClr val="accent1"/>
-                </a:solidFill>
-                <a:latin typeface="Fira Code Retina" pitchFamily="49" charset="0"/>
-                <a:ea typeface="Fira Code Retina" pitchFamily="49" charset="0"/>
-                <a:cs typeface="Fira Code Retina" pitchFamily="49" charset="0"/>
-              </a:rPr>
-              <a:t>'dog'</a:t>
-            </a:r>
-            <a:r>
-              <a:rPr dirty="0">
-                <a:latin typeface="Courier"/>
-              </a:rPr>
-              <a:t>)</a:t>
-            </a:r>
-          </a:p>
-          <a:p>
-            <a:pPr lvl="1"/>
-            <a:r>
-              <a:rPr dirty="0"/>
-              <a:t>Complex</a:t>
-            </a:r>
-          </a:p>
-          <a:p>
-            <a:pPr lvl="1"/>
-            <a:r>
-              <a:rPr dirty="0"/>
-              <a:t>Raw</a:t>
-            </a:r>
-          </a:p>
-          <a:p>
-            <a:pPr marL="0" lvl="0" indent="0">
-              <a:buNone/>
-            </a:pPr>
-            <a:endParaRPr dirty="0"/>
-          </a:p>
-        </p:txBody>
-      </p:sp>
-    </p:spTree>
-  </p:cSld>
-  <p:clrMapOvr>
-    <a:masterClrMapping/>
-  </p:clrMapOvr>
-</p:sld>
-</file>
-
-<file path=ppt/slides/slide4.xml><?xml version="1.0" encoding="utf-8"?>
-<p:sld xmlns:a="http://schemas.openxmlformats.org/drawingml/2006/main" xmlns:r="http://schemas.openxmlformats.org/officeDocument/2006/relationships" xmlns:p="http://schemas.openxmlformats.org/presentationml/2006/main">
-  <p:cSld>
-    <p:spTree>
-      <p:nvGrpSpPr>
-        <p:cNvPr id="1" name=""/>
-        <p:cNvGrpSpPr/>
-        <p:nvPr/>
-      </p:nvGrpSpPr>
-      <p:grpSpPr>
-        <a:xfrm>
-          <a:off x="0" y="0"/>
-          <a:ext cx="0" cy="0"/>
-          <a:chOff x="0" y="0"/>
-          <a:chExt cx="0" cy="0"/>
-        </a:xfrm>
-      </p:grpSpPr>
-      <p:sp>
-        <p:nvSpPr>
-          <p:cNvPr id="2" name="Title 1">
-            <a:extLst>
-              <a:ext uri="{FF2B5EF4-FFF2-40B4-BE49-F238E27FC236}">
-                <a16:creationId xmlns:a16="http://schemas.microsoft.com/office/drawing/2014/main" id="{DE4178AD-BE9F-2932-FDDF-C013D6CC21FB}"/>
-              </a:ext>
-            </a:extLst>
-          </p:cNvPr>
-          <p:cNvSpPr>
-            <a:spLocks noGrp="1"/>
-          </p:cNvSpPr>
-          <p:nvPr>
-            <p:ph type="title"/>
-          </p:nvPr>
-        </p:nvSpPr>
-        <p:spPr/>
-        <p:txBody>
-          <a:bodyPr/>
-          <a:lstStyle/>
-          <a:p>
-            <a:r>
-              <a:rPr lang="en-SG" dirty="0"/>
-              <a:t>Vectors and data types</a:t>
-            </a:r>
-            <a:endParaRPr lang="en-US" dirty="0"/>
-          </a:p>
-        </p:txBody>
-      </p:sp>
-      <p:sp>
-        <p:nvSpPr>
-          <p:cNvPr id="3" name="Content Placeholder 2">
-            <a:extLst>
-              <a:ext uri="{FF2B5EF4-FFF2-40B4-BE49-F238E27FC236}">
-                <a16:creationId xmlns:a16="http://schemas.microsoft.com/office/drawing/2014/main" id="{5627D125-AFE7-7663-A2B9-BA3A0ADEE149}"/>
-              </a:ext>
-            </a:extLst>
-          </p:cNvPr>
-          <p:cNvSpPr>
-            <a:spLocks noGrp="1"/>
-          </p:cNvSpPr>
-          <p:nvPr>
-            <p:ph idx="1"/>
-          </p:nvPr>
-        </p:nvSpPr>
-        <p:spPr>
-          <a:xfrm>
-            <a:off x="838200" y="1825624"/>
-            <a:ext cx="10515600" cy="4552597"/>
-          </a:xfrm>
-        </p:spPr>
-        <p:txBody>
-          <a:bodyPr>
-            <a:normAutofit fontScale="92500" lnSpcReduction="20000"/>
-          </a:bodyPr>
-          <a:lstStyle/>
-          <a:p>
-            <a:r>
-              <a:rPr lang="en-US" dirty="0"/>
-              <a:t>Functions for vectors</a:t>
-            </a:r>
-          </a:p>
-          <a:p>
-            <a:pPr lvl="1"/>
-            <a:r>
-              <a:rPr lang="en-US" dirty="0"/>
-              <a:t>Attributes</a:t>
-            </a:r>
-          </a:p>
-          <a:p>
-            <a:pPr lvl="2"/>
-            <a:r>
-              <a:rPr lang="en-US" dirty="0">
-                <a:solidFill>
-                  <a:schemeClr val="accent1"/>
-                </a:solidFill>
-                <a:latin typeface="Fira Code Retina" pitchFamily="49" charset="0"/>
-                <a:ea typeface="Fira Code Retina" pitchFamily="49" charset="0"/>
-                <a:cs typeface="Fira Code Retina" pitchFamily="49" charset="0"/>
-              </a:rPr>
-              <a:t>length(), class(), str(), </a:t>
-            </a:r>
-            <a:r>
-              <a:rPr lang="en-US" dirty="0" err="1">
-                <a:solidFill>
-                  <a:schemeClr val="accent1"/>
-                </a:solidFill>
-                <a:latin typeface="Fira Code Retina" pitchFamily="49" charset="0"/>
-                <a:ea typeface="Fira Code Retina" pitchFamily="49" charset="0"/>
-                <a:cs typeface="Fira Code Retina" pitchFamily="49" charset="0"/>
-              </a:rPr>
-              <a:t>typeof</a:t>
-            </a:r>
-            <a:r>
-              <a:rPr lang="en-US" dirty="0">
-                <a:solidFill>
-                  <a:schemeClr val="accent1"/>
-                </a:solidFill>
-                <a:latin typeface="Fira Code Retina" pitchFamily="49" charset="0"/>
-                <a:ea typeface="Fira Code Retina" pitchFamily="49" charset="0"/>
-                <a:cs typeface="Fira Code Retina" pitchFamily="49" charset="0"/>
-              </a:rPr>
-              <a:t>()</a:t>
-            </a:r>
-          </a:p>
-          <a:p>
-            <a:pPr lvl="1"/>
-            <a:r>
-              <a:rPr lang="en-US" dirty="0">
-                <a:ea typeface="Fira Code Retina" pitchFamily="49" charset="0"/>
-                <a:cs typeface="Cambay Devanagari" pitchFamily="2" charset="77"/>
-              </a:rPr>
-              <a:t>Add more elements using </a:t>
-            </a:r>
-            <a:r>
-              <a:rPr lang="en-US" dirty="0">
-                <a:solidFill>
-                  <a:schemeClr val="accent1"/>
-                </a:solidFill>
-                <a:latin typeface="Fira Code Retina" pitchFamily="49" charset="0"/>
-                <a:ea typeface="Fira Code Retina" pitchFamily="49" charset="0"/>
-                <a:cs typeface="Fira Code Retina" pitchFamily="49" charset="0"/>
-              </a:rPr>
-              <a:t>c()</a:t>
-            </a:r>
-          </a:p>
-          <a:p>
-            <a:pPr lvl="1"/>
-            <a:r>
-              <a:rPr lang="en-US" dirty="0">
-                <a:ea typeface="Fira Code Retina" pitchFamily="49" charset="0"/>
-              </a:rPr>
-              <a:t>Manually convert variable types</a:t>
-            </a:r>
-          </a:p>
-          <a:p>
-            <a:pPr lvl="2">
-              <a:lnSpc>
-                <a:spcPct val="110000"/>
-              </a:lnSpc>
-            </a:pPr>
-            <a:r>
-              <a:rPr lang="en-US" dirty="0" err="1">
-                <a:solidFill>
-                  <a:schemeClr val="accent1"/>
-                </a:solidFill>
-                <a:latin typeface="Fira Code Retina" pitchFamily="49" charset="0"/>
-                <a:ea typeface="Fira Code Retina" pitchFamily="49" charset="0"/>
-                <a:cs typeface="Fira Code Retina" pitchFamily="49" charset="0"/>
-              </a:rPr>
-              <a:t>as.logical</a:t>
-            </a:r>
-            <a:r>
-              <a:rPr lang="en-US" dirty="0">
-                <a:solidFill>
-                  <a:schemeClr val="accent1"/>
-                </a:solidFill>
-                <a:latin typeface="Fira Code Retina" pitchFamily="49" charset="0"/>
-                <a:ea typeface="Fira Code Retina" pitchFamily="49" charset="0"/>
-                <a:cs typeface="Fira Code Retina" pitchFamily="49" charset="0"/>
-              </a:rPr>
-              <a:t>(), </a:t>
-            </a:r>
-            <a:r>
-              <a:rPr lang="en-US" dirty="0" err="1">
-                <a:solidFill>
-                  <a:schemeClr val="accent1"/>
-                </a:solidFill>
-                <a:latin typeface="Fira Code Retina" pitchFamily="49" charset="0"/>
-                <a:ea typeface="Fira Code Retina" pitchFamily="49" charset="0"/>
-                <a:cs typeface="Fira Code Retina" pitchFamily="49" charset="0"/>
-              </a:rPr>
-              <a:t>as.numeric</a:t>
-            </a:r>
-            <a:r>
-              <a:rPr lang="en-US" dirty="0">
-                <a:solidFill>
-                  <a:schemeClr val="accent1"/>
-                </a:solidFill>
-                <a:latin typeface="Fira Code Retina" pitchFamily="49" charset="0"/>
-                <a:ea typeface="Fira Code Retina" pitchFamily="49" charset="0"/>
-                <a:cs typeface="Fira Code Retina" pitchFamily="49" charset="0"/>
-              </a:rPr>
-              <a:t>(), </a:t>
-            </a:r>
-            <a:r>
-              <a:rPr lang="en-US" dirty="0" err="1">
-                <a:solidFill>
-                  <a:schemeClr val="accent1"/>
-                </a:solidFill>
-                <a:latin typeface="Fira Code Retina" pitchFamily="49" charset="0"/>
-                <a:ea typeface="Fira Code Retina" pitchFamily="49" charset="0"/>
-                <a:cs typeface="Fira Code Retina" pitchFamily="49" charset="0"/>
-              </a:rPr>
-              <a:t>as.double</a:t>
-            </a:r>
-            <a:r>
-              <a:rPr lang="en-US" dirty="0">
-                <a:solidFill>
-                  <a:schemeClr val="accent1"/>
-                </a:solidFill>
-                <a:latin typeface="Fira Code Retina" pitchFamily="49" charset="0"/>
-                <a:ea typeface="Fira Code Retina" pitchFamily="49" charset="0"/>
-                <a:cs typeface="Fira Code Retina" pitchFamily="49" charset="0"/>
-              </a:rPr>
-              <a:t>(), </a:t>
-            </a:r>
-            <a:r>
-              <a:rPr lang="en-US" dirty="0" err="1">
-                <a:solidFill>
-                  <a:schemeClr val="accent1"/>
-                </a:solidFill>
-                <a:latin typeface="Fira Code Retina" pitchFamily="49" charset="0"/>
-                <a:ea typeface="Fira Code Retina" pitchFamily="49" charset="0"/>
-                <a:cs typeface="Fira Code Retina" pitchFamily="49" charset="0"/>
-              </a:rPr>
-              <a:t>as.integer</a:t>
-            </a:r>
-            <a:r>
-              <a:rPr lang="en-US" dirty="0">
-                <a:solidFill>
-                  <a:schemeClr val="accent1"/>
-                </a:solidFill>
-                <a:latin typeface="Fira Code Retina" pitchFamily="49" charset="0"/>
-                <a:ea typeface="Fira Code Retina" pitchFamily="49" charset="0"/>
-                <a:cs typeface="Fira Code Retina" pitchFamily="49" charset="0"/>
-              </a:rPr>
-              <a:t>(), </a:t>
-            </a:r>
-            <a:r>
-              <a:rPr lang="en-US" dirty="0" err="1">
-                <a:solidFill>
-                  <a:schemeClr val="accent1"/>
-                </a:solidFill>
-                <a:latin typeface="Fira Code Retina" pitchFamily="49" charset="0"/>
-                <a:ea typeface="Fira Code Retina" pitchFamily="49" charset="0"/>
-                <a:cs typeface="Fira Code Retina" pitchFamily="49" charset="0"/>
-              </a:rPr>
-              <a:t>as.character</a:t>
-            </a:r>
-            <a:r>
-              <a:rPr lang="en-US" dirty="0">
-                <a:solidFill>
-                  <a:schemeClr val="accent1"/>
-                </a:solidFill>
-                <a:latin typeface="Fira Code Retina" pitchFamily="49" charset="0"/>
-                <a:ea typeface="Fira Code Retina" pitchFamily="49" charset="0"/>
-                <a:cs typeface="Fira Code Retina" pitchFamily="49" charset="0"/>
-              </a:rPr>
-              <a:t>()</a:t>
-            </a:r>
-          </a:p>
-          <a:p>
-            <a:pPr lvl="1"/>
-            <a:endParaRPr lang="en-US" dirty="0">
-              <a:latin typeface="Fira Code Retina" pitchFamily="49" charset="0"/>
-              <a:ea typeface="Fira Code Retina" pitchFamily="49" charset="0"/>
-              <a:cs typeface="Fira Code Retina" pitchFamily="49" charset="0"/>
-            </a:endParaRPr>
-          </a:p>
-          <a:p>
-            <a:r>
-              <a:rPr lang="en-US" dirty="0">
-                <a:ea typeface="Fira Code Retina" pitchFamily="49" charset="0"/>
-                <a:cs typeface="Fira Code Retina" pitchFamily="49" charset="0"/>
-              </a:rPr>
-              <a:t>Other data structures</a:t>
-            </a:r>
-          </a:p>
-          <a:p>
-            <a:pPr lvl="1"/>
-            <a:r>
-              <a:rPr lang="en-US" dirty="0">
-                <a:ea typeface="Fira Code Retina" pitchFamily="49" charset="0"/>
-                <a:cs typeface="Fira Code Retina" pitchFamily="49" charset="0"/>
-              </a:rPr>
-              <a:t>Lists</a:t>
-            </a:r>
-          </a:p>
-          <a:p>
-            <a:pPr lvl="1"/>
-            <a:r>
-              <a:rPr lang="en-US" dirty="0">
-                <a:ea typeface="Fira Code Retina" pitchFamily="49" charset="0"/>
-                <a:cs typeface="Fira Code Retina" pitchFamily="49" charset="0"/>
-              </a:rPr>
-              <a:t>Matrices</a:t>
-            </a:r>
-          </a:p>
-          <a:p>
-            <a:pPr lvl="1"/>
-            <a:r>
-              <a:rPr lang="en-US" dirty="0">
-                <a:ea typeface="Fira Code Retina" pitchFamily="49" charset="0"/>
-                <a:cs typeface="Fira Code Retina" pitchFamily="49" charset="0"/>
-              </a:rPr>
-              <a:t>Data frames</a:t>
-            </a:r>
-          </a:p>
-          <a:p>
-            <a:pPr lvl="1"/>
-            <a:r>
-              <a:rPr lang="en-US" dirty="0">
-                <a:ea typeface="Fira Code Retina" pitchFamily="49" charset="0"/>
-                <a:cs typeface="Fira Code Retina" pitchFamily="49" charset="0"/>
-              </a:rPr>
-              <a:t>Factors</a:t>
-            </a:r>
-          </a:p>
-          <a:p>
-            <a:pPr lvl="1"/>
-            <a:r>
-              <a:rPr lang="en-US" dirty="0">
-                <a:ea typeface="Fira Code Retina" pitchFamily="49" charset="0"/>
-                <a:cs typeface="Fira Code Retina" pitchFamily="49" charset="0"/>
-              </a:rPr>
-              <a:t>Arrays</a:t>
-            </a:r>
-          </a:p>
-        </p:txBody>
-      </p:sp>
-    </p:spTree>
-    <p:extLst>
-      <p:ext uri="{BB962C8B-B14F-4D97-AF65-F5344CB8AC3E}">
-        <p14:creationId xmlns:p14="http://schemas.microsoft.com/office/powerpoint/2010/main" val="287049191"/>
-      </p:ext>
-    </p:extLst>
-  </p:cSld>
-  <p:clrMapOvr>
-    <a:masterClrMapping/>
-  </p:clrMapOvr>
-</p:sld>
-</file>
-
-<file path=ppt/slides/slide5.xml><?xml version="1.0" encoding="utf-8"?>
-<p:sld xmlns:a="http://schemas.openxmlformats.org/drawingml/2006/main" xmlns:r="http://schemas.openxmlformats.org/officeDocument/2006/relationships" xmlns:p="http://schemas.openxmlformats.org/presentationml/2006/main">
-  <p:cSld>
-    <p:spTree>
-      <p:nvGrpSpPr>
-        <p:cNvPr id="1" name=""/>
-        <p:cNvGrpSpPr/>
-        <p:nvPr/>
-      </p:nvGrpSpPr>
-      <p:grpSpPr>
-        <a:xfrm>
-          <a:off x="0" y="0"/>
-          <a:ext cx="0" cy="0"/>
-          <a:chOff x="0" y="0"/>
-          <a:chExt cx="0" cy="0"/>
-        </a:xfrm>
-      </p:grpSpPr>
-      <p:sp>
-        <p:nvSpPr>
-          <p:cNvPr id="2" name="Title 1">
-            <a:extLst>
-              <a:ext uri="{FF2B5EF4-FFF2-40B4-BE49-F238E27FC236}">
-                <a16:creationId xmlns:a16="http://schemas.microsoft.com/office/drawing/2014/main" id="{E90CCBB2-BDA4-161D-FC5F-5E57177B4C84}"/>
-              </a:ext>
-            </a:extLst>
-          </p:cNvPr>
-          <p:cNvSpPr>
-            <a:spLocks noGrp="1"/>
-          </p:cNvSpPr>
-          <p:nvPr>
-            <p:ph type="title"/>
-          </p:nvPr>
-        </p:nvSpPr>
-        <p:spPr/>
-        <p:txBody>
-          <a:bodyPr/>
-          <a:lstStyle/>
-          <a:p>
-            <a:r>
-              <a:rPr lang="en-US" dirty="0" err="1"/>
-              <a:t>Subsetting</a:t>
-            </a:r>
-            <a:r>
-              <a:rPr lang="en-US" dirty="0"/>
-              <a:t> vectors</a:t>
-            </a:r>
-          </a:p>
-        </p:txBody>
-      </p:sp>
-      <p:sp>
-        <p:nvSpPr>
-          <p:cNvPr id="3" name="Content Placeholder 2">
-            <a:extLst>
-              <a:ext uri="{FF2B5EF4-FFF2-40B4-BE49-F238E27FC236}">
-                <a16:creationId xmlns:a16="http://schemas.microsoft.com/office/drawing/2014/main" id="{7024D2EB-95B2-A304-6CE0-6F7B02FA3E0E}"/>
-              </a:ext>
-            </a:extLst>
-          </p:cNvPr>
-          <p:cNvSpPr>
-            <a:spLocks noGrp="1"/>
-          </p:cNvSpPr>
-          <p:nvPr>
-            <p:ph idx="1"/>
-          </p:nvPr>
-        </p:nvSpPr>
-        <p:spPr/>
-        <p:txBody>
-          <a:bodyPr/>
-          <a:lstStyle/>
-          <a:p>
-            <a:r>
-              <a:rPr lang="en-US" dirty="0"/>
-              <a:t>Means extracting elements and use them create a new vector</a:t>
-            </a:r>
-          </a:p>
-          <a:p>
-            <a:r>
-              <a:rPr lang="en-US" dirty="0"/>
-              <a:t>Two ways to subset a vector</a:t>
-            </a:r>
-          </a:p>
-          <a:p>
-            <a:endParaRPr lang="en-US" dirty="0"/>
-          </a:p>
-          <a:p>
-            <a:pPr marL="457200" indent="-457200">
-              <a:buFont typeface="+mj-lt"/>
-              <a:buAutoNum type="arabicPeriod"/>
-            </a:pPr>
-            <a:r>
-              <a:rPr lang="en-US" dirty="0"/>
-              <a:t>Use indices: sequence of elements in a vector</a:t>
-            </a:r>
-          </a:p>
-          <a:p>
-            <a:pPr lvl="1"/>
-            <a:r>
-              <a:rPr lang="en-US" dirty="0"/>
-              <a:t>Indices always start at 1</a:t>
-            </a:r>
-          </a:p>
-          <a:p>
-            <a:pPr marL="0" indent="0">
-              <a:buNone/>
-            </a:pPr>
-            <a:r>
-              <a:rPr lang="en-SG" sz="1800" dirty="0">
-                <a:solidFill>
-                  <a:schemeClr val="tx1"/>
-                </a:solidFill>
-                <a:latin typeface="Fira Code Retina" pitchFamily="49" charset="0"/>
-                <a:ea typeface="Fira Code Retina" pitchFamily="49" charset="0"/>
-                <a:cs typeface="Fira Code Retina" pitchFamily="49" charset="0"/>
-              </a:rPr>
-              <a:t>	</a:t>
-            </a:r>
-            <a:r>
-              <a:rPr lang="en-SG" sz="1800" dirty="0">
-                <a:solidFill>
-                  <a:schemeClr val="accent1"/>
-                </a:solidFill>
-                <a:latin typeface="Fira Code Retina" pitchFamily="49" charset="0"/>
-                <a:ea typeface="Fira Code Retina" pitchFamily="49" charset="0"/>
-                <a:cs typeface="Fira Code Retina" pitchFamily="49" charset="0"/>
-              </a:rPr>
-              <a:t>animals &lt;- </a:t>
-            </a:r>
-            <a:r>
-              <a:rPr lang="en-SG" sz="1800" b="1" dirty="0">
-                <a:solidFill>
-                  <a:schemeClr val="accent1"/>
-                </a:solidFill>
-                <a:latin typeface="Fira Code Retina" pitchFamily="49" charset="0"/>
-                <a:ea typeface="Fira Code Retina" pitchFamily="49" charset="0"/>
-                <a:cs typeface="Fira Code Retina" pitchFamily="49" charset="0"/>
-              </a:rPr>
-              <a:t>c</a:t>
-            </a:r>
-            <a:r>
-              <a:rPr lang="en-SG" sz="1800" dirty="0">
-                <a:solidFill>
-                  <a:schemeClr val="accent1"/>
-                </a:solidFill>
-                <a:latin typeface="Fira Code Retina" pitchFamily="49" charset="0"/>
-                <a:ea typeface="Fira Code Retina" pitchFamily="49" charset="0"/>
-                <a:cs typeface="Fira Code Retina" pitchFamily="49" charset="0"/>
-              </a:rPr>
-              <a:t>("mouse", "rat", "dog", "cat")</a:t>
-            </a:r>
-          </a:p>
-          <a:p>
-            <a:pPr marL="0" indent="0">
-              <a:buNone/>
-            </a:pPr>
-            <a:r>
-              <a:rPr lang="en-SG" sz="1800" dirty="0">
-                <a:solidFill>
-                  <a:schemeClr val="tx1"/>
-                </a:solidFill>
-                <a:latin typeface="Fira Code Retina" pitchFamily="49" charset="0"/>
-                <a:ea typeface="Fira Code Retina" pitchFamily="49" charset="0"/>
-                <a:cs typeface="Fira Code Retina" pitchFamily="49" charset="0"/>
-              </a:rPr>
-              <a:t>	                </a:t>
-            </a:r>
-            <a:r>
-              <a:rPr lang="en-SG" sz="1800" dirty="0">
-                <a:solidFill>
-                  <a:srgbClr val="FF0000"/>
-                </a:solidFill>
-                <a:latin typeface="Fira Code Retina" pitchFamily="49" charset="0"/>
-                <a:ea typeface="Fira Code Retina" pitchFamily="49" charset="0"/>
-                <a:cs typeface="Fira Code Retina" pitchFamily="49" charset="0"/>
-              </a:rPr>
-              <a:t>1       2      3      4</a:t>
-            </a:r>
-            <a:endParaRPr lang="en-US" sz="1800" dirty="0">
-              <a:solidFill>
-                <a:srgbClr val="FF0000"/>
-              </a:solidFill>
-              <a:latin typeface="Fira Code Retina" pitchFamily="49" charset="0"/>
-              <a:ea typeface="Fira Code Retina" pitchFamily="49" charset="0"/>
-              <a:cs typeface="Fira Code Retina" pitchFamily="49" charset="0"/>
-            </a:endParaRPr>
-          </a:p>
-          <a:p>
-            <a:pPr marL="457200" indent="-457200">
-              <a:buFont typeface="+mj-lt"/>
-              <a:buAutoNum type="arabicPeriod" startAt="2"/>
-            </a:pPr>
-            <a:r>
-              <a:rPr lang="en-US" dirty="0"/>
-              <a:t>Use logical vector</a:t>
-            </a:r>
-          </a:p>
-          <a:p>
-            <a:pPr lvl="1"/>
-            <a:r>
-              <a:rPr lang="en-US" dirty="0"/>
-              <a:t>Can manually define a logical vector</a:t>
-            </a:r>
-          </a:p>
-          <a:p>
-            <a:pPr lvl="1"/>
-            <a:r>
-              <a:rPr lang="en-US" dirty="0"/>
-              <a:t>More commonly, create the vector from logical tests</a:t>
-            </a:r>
-          </a:p>
-          <a:p>
-            <a:pPr marL="0" indent="0">
-              <a:buNone/>
-            </a:pPr>
-            <a:endParaRPr lang="en-US" dirty="0"/>
-          </a:p>
-        </p:txBody>
-      </p:sp>
-    </p:spTree>
-    <p:extLst>
-      <p:ext uri="{BB962C8B-B14F-4D97-AF65-F5344CB8AC3E}">
-        <p14:creationId xmlns:p14="http://schemas.microsoft.com/office/powerpoint/2010/main" val="3705624173"/>
-      </p:ext>
-    </p:extLst>
-  </p:cSld>
-  <p:clrMapOvr>
-    <a:masterClrMapping/>
-  </p:clrMapOvr>
-</p:sld>
-</file>
-
-<file path=ppt/slides/slide6.xml><?xml version="1.0" encoding="utf-8"?>
-<p:sld xmlns:a="http://schemas.openxmlformats.org/drawingml/2006/main" xmlns:r="http://schemas.openxmlformats.org/officeDocument/2006/relationships" xmlns:p="http://schemas.openxmlformats.org/presentationml/2006/main">
-  <p:cSld>
-    <p:spTree>
-      <p:nvGrpSpPr>
-        <p:cNvPr id="1" name=""/>
-        <p:cNvGrpSpPr/>
-        <p:nvPr/>
-      </p:nvGrpSpPr>
-      <p:grpSpPr>
-        <a:xfrm>
-          <a:off x="0" y="0"/>
-          <a:ext cx="0" cy="0"/>
-          <a:chOff x="0" y="0"/>
-          <a:chExt cx="0" cy="0"/>
-        </a:xfrm>
-      </p:grpSpPr>
-      <p:sp>
-        <p:nvSpPr>
-          <p:cNvPr id="2" name="Title 1">
-            <a:extLst>
-              <a:ext uri="{FF2B5EF4-FFF2-40B4-BE49-F238E27FC236}">
-                <a16:creationId xmlns:a16="http://schemas.microsoft.com/office/drawing/2014/main" id="{D5627017-214D-13FD-02A3-8F8EA17595B7}"/>
-              </a:ext>
-            </a:extLst>
-          </p:cNvPr>
-          <p:cNvSpPr>
-            <a:spLocks noGrp="1"/>
-          </p:cNvSpPr>
-          <p:nvPr>
-            <p:ph type="title"/>
-          </p:nvPr>
-        </p:nvSpPr>
-        <p:spPr/>
-        <p:txBody>
-          <a:bodyPr/>
-          <a:lstStyle/>
-          <a:p>
-            <a:r>
-              <a:rPr lang="en-US" dirty="0"/>
-              <a:t>Missing data</a:t>
-            </a:r>
-          </a:p>
-        </p:txBody>
-      </p:sp>
-      <p:sp>
-        <p:nvSpPr>
-          <p:cNvPr id="3" name="Content Placeholder 2">
-            <a:extLst>
-              <a:ext uri="{FF2B5EF4-FFF2-40B4-BE49-F238E27FC236}">
-                <a16:creationId xmlns:a16="http://schemas.microsoft.com/office/drawing/2014/main" id="{F1BB47E6-15AB-E55E-B22F-3FB439FB553D}"/>
-              </a:ext>
-            </a:extLst>
-          </p:cNvPr>
-          <p:cNvSpPr>
-            <a:spLocks noGrp="1"/>
-          </p:cNvSpPr>
-          <p:nvPr>
-            <p:ph idx="1"/>
-          </p:nvPr>
-        </p:nvSpPr>
-        <p:spPr/>
-        <p:txBody>
-          <a:bodyPr/>
-          <a:lstStyle/>
-          <a:p>
-            <a:r>
-              <a:rPr lang="en-US" dirty="0"/>
-              <a:t>Represented as </a:t>
-            </a:r>
-            <a:r>
-              <a:rPr lang="en-US" sz="2000" dirty="0">
-                <a:solidFill>
-                  <a:schemeClr val="accent1"/>
-                </a:solidFill>
-                <a:latin typeface="Fira Code Retina" pitchFamily="49" charset="0"/>
-                <a:ea typeface="Fira Code Retina" pitchFamily="49" charset="0"/>
-                <a:cs typeface="Fira Code Retina" pitchFamily="49" charset="0"/>
-              </a:rPr>
-              <a:t>NA</a:t>
-            </a:r>
-            <a:endParaRPr lang="en-US" dirty="0">
-              <a:solidFill>
-                <a:schemeClr val="accent1"/>
-              </a:solidFill>
-              <a:latin typeface="Fira Code Retina" pitchFamily="49" charset="0"/>
-              <a:ea typeface="Fira Code Retina" pitchFamily="49" charset="0"/>
-              <a:cs typeface="Fira Code Retina" pitchFamily="49" charset="0"/>
-            </a:endParaRPr>
-          </a:p>
-          <a:p>
-            <a:r>
-              <a:rPr lang="en-US" dirty="0"/>
-              <a:t>Feeding vectors with </a:t>
-            </a:r>
-            <a:r>
-              <a:rPr lang="en-US" sz="2000" dirty="0">
-                <a:solidFill>
-                  <a:schemeClr val="accent1"/>
-                </a:solidFill>
-                <a:latin typeface="Fira Code Retina" pitchFamily="49" charset="0"/>
-                <a:ea typeface="Fira Code Retina" pitchFamily="49" charset="0"/>
-                <a:cs typeface="Fira Code Retina" pitchFamily="49" charset="0"/>
-              </a:rPr>
-              <a:t>NA</a:t>
-            </a:r>
-            <a:r>
-              <a:rPr lang="en-US" dirty="0"/>
-              <a:t>s to most functions will return </a:t>
-            </a:r>
-            <a:r>
-              <a:rPr lang="en-US" sz="2000" dirty="0">
-                <a:solidFill>
-                  <a:schemeClr val="accent1"/>
-                </a:solidFill>
-                <a:latin typeface="Fira Code Retina" pitchFamily="49" charset="0"/>
-                <a:ea typeface="Fira Code Retina" pitchFamily="49" charset="0"/>
-                <a:cs typeface="Fira Code Retina" pitchFamily="49" charset="0"/>
-              </a:rPr>
-              <a:t>NA</a:t>
-            </a:r>
-            <a:r>
-              <a:rPr lang="en-US" dirty="0"/>
-              <a:t> making the user consciously remove the </a:t>
-            </a:r>
-            <a:r>
-              <a:rPr lang="en-US" sz="2000" dirty="0">
-                <a:solidFill>
-                  <a:schemeClr val="accent1"/>
-                </a:solidFill>
-                <a:latin typeface="Fira Code Retina" pitchFamily="49" charset="0"/>
-                <a:ea typeface="Fira Code Retina" pitchFamily="49" charset="0"/>
-                <a:cs typeface="Fira Code Retina" pitchFamily="49" charset="0"/>
-              </a:rPr>
-              <a:t>NA</a:t>
-            </a:r>
-            <a:r>
-              <a:rPr lang="en-US" dirty="0"/>
-              <a:t>s (by adding argument </a:t>
-            </a:r>
-            <a:r>
-              <a:rPr lang="en-US" sz="2000" dirty="0" err="1">
-                <a:solidFill>
-                  <a:schemeClr val="accent1"/>
-                </a:solidFill>
-                <a:latin typeface="Fira Code Retina" pitchFamily="49" charset="0"/>
-                <a:ea typeface="Fira Code Retina" pitchFamily="49" charset="0"/>
-                <a:cs typeface="Fira Code Retina" pitchFamily="49" charset="0"/>
-              </a:rPr>
-              <a:t>na.rm</a:t>
-            </a:r>
-            <a:r>
-              <a:rPr lang="en-US" sz="2000" dirty="0">
-                <a:solidFill>
-                  <a:schemeClr val="accent1"/>
-                </a:solidFill>
-                <a:latin typeface="Fira Code Retina" pitchFamily="49" charset="0"/>
-                <a:ea typeface="Fira Code Retina" pitchFamily="49" charset="0"/>
-                <a:cs typeface="Fira Code Retina" pitchFamily="49" charset="0"/>
-              </a:rPr>
-              <a:t> = TRUE</a:t>
-            </a:r>
-            <a:r>
-              <a:rPr lang="en-US" dirty="0"/>
-              <a:t>) in their operations.</a:t>
-            </a:r>
-          </a:p>
-          <a:p>
-            <a:r>
-              <a:rPr lang="en-US" dirty="0"/>
-              <a:t>Functions worth remembering when dealing with </a:t>
-            </a:r>
-            <a:r>
-              <a:rPr lang="en-US" dirty="0">
-                <a:solidFill>
-                  <a:schemeClr val="accent1"/>
-                </a:solidFill>
-                <a:latin typeface="Fira Code Retina" pitchFamily="49" charset="0"/>
-                <a:ea typeface="Fira Code Retina" pitchFamily="49" charset="0"/>
-                <a:cs typeface="Fira Code Retina" pitchFamily="49" charset="0"/>
-              </a:rPr>
-              <a:t>NA</a:t>
-            </a:r>
-            <a:r>
-              <a:rPr lang="en-US" dirty="0"/>
-              <a:t>s.</a:t>
-            </a:r>
-          </a:p>
-          <a:p>
-            <a:endParaRPr lang="en-US" dirty="0"/>
-          </a:p>
-          <a:p>
-            <a:pPr marL="0" indent="0">
-              <a:buNone/>
-            </a:pPr>
-            <a:r>
-              <a:rPr lang="en-US" sz="2000" dirty="0" err="1">
-                <a:solidFill>
-                  <a:schemeClr val="accent1"/>
-                </a:solidFill>
-                <a:latin typeface="Fira Code Retina" pitchFamily="49" charset="0"/>
-                <a:ea typeface="Fira Code Retina" pitchFamily="49" charset="0"/>
-                <a:cs typeface="Fira Code Retina" pitchFamily="49" charset="0"/>
-              </a:rPr>
-              <a:t>is.na</a:t>
-            </a:r>
-            <a:r>
-              <a:rPr lang="en-US" sz="2000" dirty="0">
-                <a:solidFill>
-                  <a:schemeClr val="accent1"/>
-                </a:solidFill>
-                <a:latin typeface="Fira Code Retina" pitchFamily="49" charset="0"/>
-                <a:ea typeface="Fira Code Retina" pitchFamily="49" charset="0"/>
-                <a:cs typeface="Fira Code Retina" pitchFamily="49" charset="0"/>
-              </a:rPr>
-              <a:t>()</a:t>
-            </a:r>
-          </a:p>
-          <a:p>
-            <a:pPr marL="0" indent="0">
-              <a:buNone/>
-            </a:pPr>
-            <a:r>
-              <a:rPr lang="en-US" sz="2000" dirty="0" err="1">
-                <a:solidFill>
-                  <a:schemeClr val="accent1"/>
-                </a:solidFill>
-                <a:latin typeface="Fira Code Retina" pitchFamily="49" charset="0"/>
-                <a:ea typeface="Fira Code Retina" pitchFamily="49" charset="0"/>
-                <a:cs typeface="Fira Code Retina" pitchFamily="49" charset="0"/>
-              </a:rPr>
-              <a:t>na.omit</a:t>
-            </a:r>
-            <a:r>
-              <a:rPr lang="en-US" sz="2000" dirty="0">
-                <a:solidFill>
-                  <a:schemeClr val="accent1"/>
-                </a:solidFill>
-                <a:latin typeface="Fira Code Retina" pitchFamily="49" charset="0"/>
-                <a:ea typeface="Fira Code Retina" pitchFamily="49" charset="0"/>
-                <a:cs typeface="Fira Code Retina" pitchFamily="49" charset="0"/>
-              </a:rPr>
-              <a:t>()</a:t>
-            </a:r>
-          </a:p>
-          <a:p>
-            <a:pPr marL="0" indent="0">
-              <a:buNone/>
-            </a:pPr>
-            <a:r>
-              <a:rPr lang="en-US" sz="2000" dirty="0" err="1">
-                <a:solidFill>
-                  <a:schemeClr val="accent1"/>
-                </a:solidFill>
-                <a:latin typeface="Fira Code Retina" pitchFamily="49" charset="0"/>
-                <a:ea typeface="Fira Code Retina" pitchFamily="49" charset="0"/>
-                <a:cs typeface="Fira Code Retina" pitchFamily="49" charset="0"/>
-              </a:rPr>
-              <a:t>complete.cases</a:t>
-            </a:r>
-            <a:r>
-              <a:rPr lang="en-US" sz="2000" dirty="0">
-                <a:solidFill>
-                  <a:schemeClr val="accent1"/>
-                </a:solidFill>
-                <a:latin typeface="Fira Code Retina" pitchFamily="49" charset="0"/>
-                <a:ea typeface="Fira Code Retina" pitchFamily="49" charset="0"/>
-                <a:cs typeface="Fira Code Retina" pitchFamily="49" charset="0"/>
-              </a:rPr>
-              <a:t>()</a:t>
-            </a:r>
-          </a:p>
-        </p:txBody>
-      </p:sp>
-    </p:spTree>
-    <p:extLst>
-      <p:ext uri="{BB962C8B-B14F-4D97-AF65-F5344CB8AC3E}">
-        <p14:creationId xmlns:p14="http://schemas.microsoft.com/office/powerpoint/2010/main" val="629535913"/>
-      </p:ext>
-    </p:extLst>
-  </p:cSld>
-  <p:clrMapOvr>
-    <a:masterClrMapping/>
-  </p:clrMapOvr>
-</p:sld>
-</file>
-
-<file path=ppt/slides/slide7.xml><?xml version="1.0" encoding="utf-8"?>
-<p:sld xmlns:a="http://schemas.openxmlformats.org/drawingml/2006/main" xmlns:r="http://schemas.openxmlformats.org/officeDocument/2006/relationships" xmlns:p="http://schemas.openxmlformats.org/presentationml/2006/main">
-  <p:cSld>
-    <p:spTree>
-      <p:nvGrpSpPr>
-        <p:cNvPr id="1" name=""/>
-        <p:cNvGrpSpPr/>
-        <p:nvPr/>
-      </p:nvGrpSpPr>
-      <p:grpSpPr>
-        <a:xfrm>
-          <a:off x="0" y="0"/>
-          <a:ext cx="0" cy="0"/>
-          <a:chOff x="0" y="0"/>
-          <a:chExt cx="0" cy="0"/>
-        </a:xfrm>
-      </p:grpSpPr>
-      <p:sp>
-        <p:nvSpPr>
-          <p:cNvPr id="2" name="Title 1">
-            <a:extLst>
-              <a:ext uri="{FF2B5EF4-FFF2-40B4-BE49-F238E27FC236}">
-                <a16:creationId xmlns:a16="http://schemas.microsoft.com/office/drawing/2014/main" id="{95DFE16F-6B0A-91C6-B2C9-AA3CC83F31A4}"/>
-              </a:ext>
-            </a:extLst>
-          </p:cNvPr>
-          <p:cNvSpPr>
-            <a:spLocks noGrp="1"/>
-          </p:cNvSpPr>
-          <p:nvPr>
-            <p:ph type="title"/>
-          </p:nvPr>
-        </p:nvSpPr>
-        <p:spPr/>
-        <p:txBody>
-          <a:bodyPr/>
-          <a:lstStyle/>
-          <a:p>
-            <a:r>
-              <a:rPr lang="en-US" dirty="0"/>
-              <a:t>Starting with data</a:t>
-            </a:r>
-          </a:p>
-        </p:txBody>
-      </p:sp>
-      <p:sp>
-        <p:nvSpPr>
-          <p:cNvPr id="3" name="Text Placeholder 2">
-            <a:extLst>
-              <a:ext uri="{FF2B5EF4-FFF2-40B4-BE49-F238E27FC236}">
-                <a16:creationId xmlns:a16="http://schemas.microsoft.com/office/drawing/2014/main" id="{DB7F21B4-0E6C-D776-D78B-020DDBC9C107}"/>
-              </a:ext>
-            </a:extLst>
-          </p:cNvPr>
-          <p:cNvSpPr>
-            <a:spLocks noGrp="1"/>
-          </p:cNvSpPr>
-          <p:nvPr>
-            <p:ph type="body" idx="1"/>
-          </p:nvPr>
-        </p:nvSpPr>
-        <p:spPr/>
-        <p:txBody>
-          <a:bodyPr/>
-          <a:lstStyle/>
-          <a:p>
-            <a:endParaRPr lang="en-US"/>
-          </a:p>
-        </p:txBody>
-      </p:sp>
-    </p:spTree>
-    <p:extLst>
-      <p:ext uri="{BB962C8B-B14F-4D97-AF65-F5344CB8AC3E}">
-        <p14:creationId xmlns:p14="http://schemas.microsoft.com/office/powerpoint/2010/main" val="1167958488"/>
-      </p:ext>
-    </p:extLst>
-  </p:cSld>
-  <p:clrMapOvr>
-    <a:masterClrMapping/>
-  </p:clrMapOvr>
-</p:sld>
-</file>
-
-<file path=ppt/slides/slide8.xml><?xml version="1.0" encoding="utf-8"?>
 <p:sld xmlns:a="http://schemas.openxmlformats.org/drawingml/2006/main" xmlns:r="http://schemas.openxmlformats.org/officeDocument/2006/relationships" xmlns:p="http://schemas.openxmlformats.org/presentationml/2006/main">
   <p:cSld>
     <p:spTree>
@@ -6605,7 +4266,7 @@
 </p:sld>
 </file>
 
-<file path=ppt/slides/slide9.xml><?xml version="1.0" encoding="utf-8"?>
+<file path=ppt/slides/slide3.xml><?xml version="1.0" encoding="utf-8"?>
 <p:sld xmlns:a="http://schemas.openxmlformats.org/drawingml/2006/main" xmlns:r="http://schemas.openxmlformats.org/officeDocument/2006/relationships" xmlns:p="http://schemas.openxmlformats.org/presentationml/2006/main">
   <p:cSld>
     <p:spTree>
@@ -6766,6 +4427,976 @@
     <p:extLst>
       <p:ext uri="{BB962C8B-B14F-4D97-AF65-F5344CB8AC3E}">
         <p14:creationId xmlns:p14="http://schemas.microsoft.com/office/powerpoint/2010/main" val="3506141904"/>
+      </p:ext>
+    </p:extLst>
+  </p:cSld>
+  <p:clrMapOvr>
+    <a:masterClrMapping/>
+  </p:clrMapOvr>
+</p:sld>
+</file>
+
+<file path=ppt/slides/slide4.xml><?xml version="1.0" encoding="utf-8"?>
+<p:sld xmlns:a="http://schemas.openxmlformats.org/drawingml/2006/main" xmlns:r="http://schemas.openxmlformats.org/officeDocument/2006/relationships" xmlns:p="http://schemas.openxmlformats.org/presentationml/2006/main">
+  <p:cSld>
+    <p:spTree>
+      <p:nvGrpSpPr>
+        <p:cNvPr id="1" name=""/>
+        <p:cNvGrpSpPr/>
+        <p:nvPr/>
+      </p:nvGrpSpPr>
+      <p:grpSpPr>
+        <a:xfrm>
+          <a:off x="0" y="0"/>
+          <a:ext cx="0" cy="0"/>
+          <a:chOff x="0" y="0"/>
+          <a:chExt cx="0" cy="0"/>
+        </a:xfrm>
+      </p:grpSpPr>
+      <p:sp>
+        <p:nvSpPr>
+          <p:cNvPr id="2" name="Title 1">
+            <a:extLst>
+              <a:ext uri="{FF2B5EF4-FFF2-40B4-BE49-F238E27FC236}">
+                <a16:creationId xmlns:a16="http://schemas.microsoft.com/office/drawing/2014/main" id="{203F859C-A883-940D-4E39-209D4D86BE97}"/>
+              </a:ext>
+            </a:extLst>
+          </p:cNvPr>
+          <p:cNvSpPr>
+            <a:spLocks noGrp="1"/>
+          </p:cNvSpPr>
+          <p:nvPr>
+            <p:ph type="title"/>
+          </p:nvPr>
+        </p:nvSpPr>
+        <p:spPr/>
+        <p:txBody>
+          <a:bodyPr/>
+          <a:lstStyle/>
+          <a:p>
+            <a:r>
+              <a:rPr lang="en-US" dirty="0" err="1"/>
+              <a:t>Subsetting</a:t>
+            </a:r>
+            <a:r>
+              <a:rPr lang="en-US" dirty="0"/>
+              <a:t> data frames</a:t>
+            </a:r>
+          </a:p>
+        </p:txBody>
+      </p:sp>
+      <p:sp>
+        <p:nvSpPr>
+          <p:cNvPr id="3" name="Content Placeholder 2">
+            <a:extLst>
+              <a:ext uri="{FF2B5EF4-FFF2-40B4-BE49-F238E27FC236}">
+                <a16:creationId xmlns:a16="http://schemas.microsoft.com/office/drawing/2014/main" id="{06C34019-9D82-E39D-AE68-ACFE3FB3D86A}"/>
+              </a:ext>
+            </a:extLst>
+          </p:cNvPr>
+          <p:cNvSpPr>
+            <a:spLocks noGrp="1"/>
+          </p:cNvSpPr>
+          <p:nvPr>
+            <p:ph idx="1"/>
+          </p:nvPr>
+        </p:nvSpPr>
+        <p:spPr/>
+        <p:txBody>
+          <a:bodyPr/>
+          <a:lstStyle/>
+          <a:p>
+            <a:pPr marL="0" indent="0">
+              <a:buNone/>
+            </a:pPr>
+            <a:r>
+              <a:rPr lang="en-US" dirty="0"/>
+              <a:t>Two ways of </a:t>
+            </a:r>
+            <a:r>
+              <a:rPr lang="en-US" dirty="0" err="1"/>
+              <a:t>subsetting</a:t>
+            </a:r>
+            <a:r>
+              <a:rPr lang="en-US" dirty="0"/>
+              <a:t> a </a:t>
+            </a:r>
+            <a:r>
+              <a:rPr lang="en-US" dirty="0" err="1"/>
+              <a:t>dataframe</a:t>
+            </a:r>
+            <a:r>
+              <a:rPr lang="en-US" dirty="0"/>
+              <a:t>:</a:t>
+            </a:r>
+          </a:p>
+          <a:p>
+            <a:pPr marL="457200" indent="-457200">
+              <a:buFont typeface="+mj-lt"/>
+              <a:buAutoNum type="arabicPeriod"/>
+            </a:pPr>
+            <a:r>
+              <a:rPr lang="en-US" dirty="0"/>
+              <a:t>By indices of rows and columns</a:t>
+            </a:r>
+          </a:p>
+          <a:p>
+            <a:pPr marL="0" indent="0">
+              <a:buNone/>
+            </a:pPr>
+            <a:r>
+              <a:rPr lang="en-US" sz="1800" dirty="0">
+                <a:solidFill>
+                  <a:schemeClr val="accent1"/>
+                </a:solidFill>
+                <a:latin typeface="Fira Code Retina" pitchFamily="49" charset="0"/>
+                <a:ea typeface="Fira Code Retina" pitchFamily="49" charset="0"/>
+                <a:cs typeface="Fira Code Retina" pitchFamily="49" charset="0"/>
+              </a:rPr>
+              <a:t>DF[row, column]</a:t>
+            </a:r>
+          </a:p>
+          <a:p>
+            <a:pPr marL="0" indent="0">
+              <a:buNone/>
+            </a:pPr>
+            <a:endParaRPr lang="en-US" sz="2000" dirty="0">
+              <a:solidFill>
+                <a:schemeClr val="accent1"/>
+              </a:solidFill>
+              <a:latin typeface="Fira Code Retina" pitchFamily="49" charset="0"/>
+              <a:ea typeface="Fira Code Retina" pitchFamily="49" charset="0"/>
+              <a:cs typeface="Fira Code Retina" pitchFamily="49" charset="0"/>
+            </a:endParaRPr>
+          </a:p>
+          <a:p>
+            <a:pPr marL="457200" indent="-457200">
+              <a:buFont typeface="+mj-lt"/>
+              <a:buAutoNum type="arabicPeriod" startAt="2"/>
+            </a:pPr>
+            <a:r>
+              <a:rPr lang="en-US" dirty="0"/>
+              <a:t>Column names</a:t>
+            </a:r>
+          </a:p>
+          <a:p>
+            <a:pPr marL="0" indent="0">
+              <a:buNone/>
+            </a:pPr>
+            <a:r>
+              <a:rPr lang="en-US" sz="1800" dirty="0">
+                <a:solidFill>
+                  <a:schemeClr val="accent1"/>
+                </a:solidFill>
+                <a:latin typeface="Fira Code Retina" pitchFamily="49" charset="0"/>
+                <a:ea typeface="Fira Code Retina" pitchFamily="49" charset="0"/>
+                <a:cs typeface="Fira Code Retina" pitchFamily="49" charset="0"/>
+              </a:rPr>
+              <a:t>surveys[“</a:t>
+            </a:r>
+            <a:r>
+              <a:rPr lang="en-US" sz="1800" dirty="0" err="1">
+                <a:solidFill>
+                  <a:schemeClr val="accent1"/>
+                </a:solidFill>
+                <a:latin typeface="Fira Code Retina" pitchFamily="49" charset="0"/>
+                <a:ea typeface="Fira Code Retina" pitchFamily="49" charset="0"/>
+                <a:cs typeface="Fira Code Retina" pitchFamily="49" charset="0"/>
+              </a:rPr>
+              <a:t>species_id</a:t>
+            </a:r>
+            <a:r>
+              <a:rPr lang="en-US" sz="1800" dirty="0">
+                <a:solidFill>
+                  <a:schemeClr val="accent1"/>
+                </a:solidFill>
+                <a:latin typeface="Fira Code Retina" pitchFamily="49" charset="0"/>
+                <a:ea typeface="Fira Code Retina" pitchFamily="49" charset="0"/>
+                <a:cs typeface="Fira Code Retina" pitchFamily="49" charset="0"/>
+              </a:rPr>
+              <a:t>”]</a:t>
+            </a:r>
+          </a:p>
+          <a:p>
+            <a:pPr marL="0" indent="0">
+              <a:buNone/>
+            </a:pPr>
+            <a:r>
+              <a:rPr lang="en-US" sz="1800" dirty="0">
+                <a:solidFill>
+                  <a:schemeClr val="accent1"/>
+                </a:solidFill>
+                <a:latin typeface="Fira Code Retina" pitchFamily="49" charset="0"/>
+                <a:ea typeface="Fira Code Retina" pitchFamily="49" charset="0"/>
+                <a:cs typeface="Fira Code Retina" pitchFamily="49" charset="0"/>
+              </a:rPr>
+              <a:t>surveys[, “</a:t>
+            </a:r>
+            <a:r>
+              <a:rPr lang="en-US" sz="1800" dirty="0" err="1">
+                <a:solidFill>
+                  <a:schemeClr val="accent1"/>
+                </a:solidFill>
+                <a:latin typeface="Fira Code Retina" pitchFamily="49" charset="0"/>
+                <a:ea typeface="Fira Code Retina" pitchFamily="49" charset="0"/>
+                <a:cs typeface="Fira Code Retina" pitchFamily="49" charset="0"/>
+              </a:rPr>
+              <a:t>species_id</a:t>
+            </a:r>
+            <a:r>
+              <a:rPr lang="en-US" sz="1800" dirty="0">
+                <a:solidFill>
+                  <a:schemeClr val="accent1"/>
+                </a:solidFill>
+                <a:latin typeface="Fira Code Retina" pitchFamily="49" charset="0"/>
+                <a:ea typeface="Fira Code Retina" pitchFamily="49" charset="0"/>
+                <a:cs typeface="Fira Code Retina" pitchFamily="49" charset="0"/>
+              </a:rPr>
+              <a:t>”]</a:t>
+            </a:r>
+          </a:p>
+          <a:p>
+            <a:pPr marL="0" indent="0">
+              <a:buNone/>
+            </a:pPr>
+            <a:r>
+              <a:rPr lang="en-US" sz="1800" dirty="0">
+                <a:solidFill>
+                  <a:schemeClr val="accent1"/>
+                </a:solidFill>
+                <a:latin typeface="Fira Code Retina" pitchFamily="49" charset="0"/>
+                <a:ea typeface="Fira Code Retina" pitchFamily="49" charset="0"/>
+                <a:cs typeface="Fira Code Retina" pitchFamily="49" charset="0"/>
+              </a:rPr>
+              <a:t>surveys[c(“</a:t>
+            </a:r>
+            <a:r>
+              <a:rPr lang="en-US" sz="1800" dirty="0" err="1">
+                <a:solidFill>
+                  <a:schemeClr val="accent1"/>
+                </a:solidFill>
+                <a:latin typeface="Fira Code Retina" pitchFamily="49" charset="0"/>
+                <a:ea typeface="Fira Code Retina" pitchFamily="49" charset="0"/>
+                <a:cs typeface="Fira Code Retina" pitchFamily="49" charset="0"/>
+              </a:rPr>
+              <a:t>species_id</a:t>
+            </a:r>
+            <a:r>
+              <a:rPr lang="en-US" sz="1800" dirty="0">
+                <a:solidFill>
+                  <a:schemeClr val="accent1"/>
+                </a:solidFill>
+                <a:latin typeface="Fira Code Retina" pitchFamily="49" charset="0"/>
+                <a:ea typeface="Fira Code Retina" pitchFamily="49" charset="0"/>
+                <a:cs typeface="Fira Code Retina" pitchFamily="49" charset="0"/>
+              </a:rPr>
+              <a:t>”, “sex”)]</a:t>
+            </a:r>
+          </a:p>
+          <a:p>
+            <a:pPr marL="0" indent="0">
+              <a:buNone/>
+            </a:pPr>
+            <a:r>
+              <a:rPr lang="en-US" sz="1800" dirty="0">
+                <a:solidFill>
+                  <a:schemeClr val="accent1"/>
+                </a:solidFill>
+                <a:latin typeface="Fira Code Retina" pitchFamily="49" charset="0"/>
+                <a:ea typeface="Fira Code Retina" pitchFamily="49" charset="0"/>
+                <a:cs typeface="Fira Code Retina" pitchFamily="49" charset="0"/>
+              </a:rPr>
+              <a:t>surveys[, c(“</a:t>
+            </a:r>
+            <a:r>
+              <a:rPr lang="en-US" sz="1800" dirty="0" err="1">
+                <a:solidFill>
+                  <a:schemeClr val="accent1"/>
+                </a:solidFill>
+                <a:latin typeface="Fira Code Retina" pitchFamily="49" charset="0"/>
+                <a:ea typeface="Fira Code Retina" pitchFamily="49" charset="0"/>
+                <a:cs typeface="Fira Code Retina" pitchFamily="49" charset="0"/>
+              </a:rPr>
+              <a:t>species_id</a:t>
+            </a:r>
+            <a:r>
+              <a:rPr lang="en-US" sz="1800" dirty="0">
+                <a:solidFill>
+                  <a:schemeClr val="accent1"/>
+                </a:solidFill>
+                <a:latin typeface="Fira Code Retina" pitchFamily="49" charset="0"/>
+                <a:ea typeface="Fira Code Retina" pitchFamily="49" charset="0"/>
+                <a:cs typeface="Fira Code Retina" pitchFamily="49" charset="0"/>
+              </a:rPr>
+              <a:t>”, “sex”)]</a:t>
+            </a:r>
+          </a:p>
+          <a:p>
+            <a:pPr marL="0" indent="0">
+              <a:buNone/>
+            </a:pPr>
+            <a:endParaRPr lang="en-US" dirty="0"/>
+          </a:p>
+          <a:p>
+            <a:pPr marL="0" indent="0">
+              <a:buNone/>
+            </a:pPr>
+            <a:endParaRPr lang="en-US" sz="2000" dirty="0">
+              <a:solidFill>
+                <a:schemeClr val="accent1"/>
+              </a:solidFill>
+              <a:latin typeface="Fira Code Retina" pitchFamily="49" charset="0"/>
+              <a:ea typeface="Fira Code Retina" pitchFamily="49" charset="0"/>
+              <a:cs typeface="Fira Code Retina" pitchFamily="49" charset="0"/>
+            </a:endParaRPr>
+          </a:p>
+        </p:txBody>
+      </p:sp>
+      <p:sp>
+        <p:nvSpPr>
+          <p:cNvPr id="4" name="Content Placeholder 2">
+            <a:extLst>
+              <a:ext uri="{FF2B5EF4-FFF2-40B4-BE49-F238E27FC236}">
+                <a16:creationId xmlns:a16="http://schemas.microsoft.com/office/drawing/2014/main" id="{D7D17D75-8498-CB64-33E3-833394E36BA5}"/>
+              </a:ext>
+            </a:extLst>
+          </p:cNvPr>
+          <p:cNvSpPr txBox="1">
+            <a:spLocks/>
+          </p:cNvSpPr>
+          <p:nvPr/>
+        </p:nvSpPr>
+        <p:spPr>
+          <a:xfrm>
+            <a:off x="6172200" y="1825625"/>
+            <a:ext cx="5181600" cy="4351338"/>
+          </a:xfrm>
+          <a:prstGeom prst="rect">
+            <a:avLst/>
+          </a:prstGeom>
+        </p:spPr>
+        <p:txBody>
+          <a:bodyPr/>
+          <a:lstStyle>
+            <a:lvl1pPr marL="228600" indent="-228600" algn="l" defTabSz="914400" rtl="0" eaLnBrk="1" latinLnBrk="0" hangingPunct="1">
+              <a:lnSpc>
+                <a:spcPct val="100000"/>
+              </a:lnSpc>
+              <a:spcBef>
+                <a:spcPts val="1000"/>
+              </a:spcBef>
+              <a:buFont typeface="Arial" panose="020B0604020202020204" pitchFamily="34" charset="0"/>
+              <a:buChar char="•"/>
+              <a:defRPr sz="2400" kern="1200">
+                <a:solidFill>
+                  <a:schemeClr val="tx1">
+                    <a:lumMod val="75000"/>
+                    <a:lumOff val="25000"/>
+                  </a:schemeClr>
+                </a:solidFill>
+                <a:latin typeface="Cambria" panose="02040503050406030204" pitchFamily="18" charset="0"/>
+                <a:ea typeface="+mn-ea"/>
+                <a:cs typeface="+mn-cs"/>
+              </a:defRPr>
+            </a:lvl1pPr>
+            <a:lvl2pPr marL="685800" indent="-228600" algn="l" defTabSz="914400" rtl="0" eaLnBrk="1" latinLnBrk="0" hangingPunct="1">
+              <a:lnSpc>
+                <a:spcPct val="100000"/>
+              </a:lnSpc>
+              <a:spcBef>
+                <a:spcPts val="500"/>
+              </a:spcBef>
+              <a:buFont typeface="Arial" panose="020B0604020202020204" pitchFamily="34" charset="0"/>
+              <a:buChar char="•"/>
+              <a:defRPr sz="2000" kern="1200">
+                <a:solidFill>
+                  <a:schemeClr val="tx1">
+                    <a:lumMod val="75000"/>
+                    <a:lumOff val="25000"/>
+                  </a:schemeClr>
+                </a:solidFill>
+                <a:latin typeface="Cambria" panose="02040503050406030204" pitchFamily="18" charset="0"/>
+                <a:ea typeface="+mn-ea"/>
+                <a:cs typeface="+mn-cs"/>
+              </a:defRPr>
+            </a:lvl2pPr>
+            <a:lvl3pPr marL="1143000" indent="-228600" algn="l" defTabSz="914400" rtl="0" eaLnBrk="1" latinLnBrk="0" hangingPunct="1">
+              <a:lnSpc>
+                <a:spcPct val="100000"/>
+              </a:lnSpc>
+              <a:spcBef>
+                <a:spcPts val="500"/>
+              </a:spcBef>
+              <a:buFont typeface="Arial" panose="020B0604020202020204" pitchFamily="34" charset="0"/>
+              <a:buChar char="•"/>
+              <a:defRPr sz="1800" kern="1200">
+                <a:solidFill>
+                  <a:schemeClr val="tx1">
+                    <a:lumMod val="75000"/>
+                    <a:lumOff val="25000"/>
+                  </a:schemeClr>
+                </a:solidFill>
+                <a:latin typeface="Cambria" panose="02040503050406030204" pitchFamily="18" charset="0"/>
+                <a:ea typeface="+mn-ea"/>
+                <a:cs typeface="+mn-cs"/>
+              </a:defRPr>
+            </a:lvl3pPr>
+            <a:lvl4pPr marL="1600200" indent="-228600" algn="l" defTabSz="914400" rtl="0" eaLnBrk="1" latinLnBrk="0" hangingPunct="1">
+              <a:lnSpc>
+                <a:spcPct val="100000"/>
+              </a:lnSpc>
+              <a:spcBef>
+                <a:spcPts val="500"/>
+              </a:spcBef>
+              <a:buFont typeface="Arial" panose="020B0604020202020204" pitchFamily="34" charset="0"/>
+              <a:buChar char="•"/>
+              <a:defRPr sz="1600" kern="1200">
+                <a:solidFill>
+                  <a:schemeClr val="tx1">
+                    <a:lumMod val="75000"/>
+                    <a:lumOff val="25000"/>
+                  </a:schemeClr>
+                </a:solidFill>
+                <a:latin typeface="Cambria" panose="02040503050406030204" pitchFamily="18" charset="0"/>
+                <a:ea typeface="+mn-ea"/>
+                <a:cs typeface="+mn-cs"/>
+              </a:defRPr>
+            </a:lvl4pPr>
+            <a:lvl5pPr marL="2057400" indent="-228600" algn="l" defTabSz="914400" rtl="0" eaLnBrk="1" latinLnBrk="0" hangingPunct="1">
+              <a:lnSpc>
+                <a:spcPct val="100000"/>
+              </a:lnSpc>
+              <a:spcBef>
+                <a:spcPts val="500"/>
+              </a:spcBef>
+              <a:buFont typeface="Arial" panose="020B0604020202020204" pitchFamily="34" charset="0"/>
+              <a:buChar char="•"/>
+              <a:defRPr sz="1600" kern="1200">
+                <a:solidFill>
+                  <a:schemeClr val="tx1">
+                    <a:lumMod val="75000"/>
+                    <a:lumOff val="25000"/>
+                  </a:schemeClr>
+                </a:solidFill>
+                <a:latin typeface="Cambria" panose="02040503050406030204" pitchFamily="18" charset="0"/>
+                <a:ea typeface="+mn-ea"/>
+                <a:cs typeface="+mn-cs"/>
+              </a:defRPr>
+            </a:lvl5pPr>
+            <a:lvl6pPr marL="2514600" indent="-228600" algn="l" defTabSz="914400" rtl="0" eaLnBrk="1" latinLnBrk="0" hangingPunct="1">
+              <a:lnSpc>
+                <a:spcPct val="90000"/>
+              </a:lnSpc>
+              <a:spcBef>
+                <a:spcPts val="500"/>
+              </a:spcBef>
+              <a:buFont typeface="Arial" panose="020B0604020202020204" pitchFamily="34" charset="0"/>
+              <a:buChar char="•"/>
+              <a:defRPr sz="1800" kern="1200">
+                <a:solidFill>
+                  <a:schemeClr val="tx1"/>
+                </a:solidFill>
+                <a:latin typeface="+mn-lt"/>
+                <a:ea typeface="+mn-ea"/>
+                <a:cs typeface="+mn-cs"/>
+              </a:defRPr>
+            </a:lvl6pPr>
+            <a:lvl7pPr marL="2971800" indent="-228600" algn="l" defTabSz="914400" rtl="0" eaLnBrk="1" latinLnBrk="0" hangingPunct="1">
+              <a:lnSpc>
+                <a:spcPct val="90000"/>
+              </a:lnSpc>
+              <a:spcBef>
+                <a:spcPts val="500"/>
+              </a:spcBef>
+              <a:buFont typeface="Arial" panose="020B0604020202020204" pitchFamily="34" charset="0"/>
+              <a:buChar char="•"/>
+              <a:defRPr sz="1800" kern="1200">
+                <a:solidFill>
+                  <a:schemeClr val="tx1"/>
+                </a:solidFill>
+                <a:latin typeface="+mn-lt"/>
+                <a:ea typeface="+mn-ea"/>
+                <a:cs typeface="+mn-cs"/>
+              </a:defRPr>
+            </a:lvl7pPr>
+            <a:lvl8pPr marL="3429000" indent="-228600" algn="l" defTabSz="914400" rtl="0" eaLnBrk="1" latinLnBrk="0" hangingPunct="1">
+              <a:lnSpc>
+                <a:spcPct val="90000"/>
+              </a:lnSpc>
+              <a:spcBef>
+                <a:spcPts val="500"/>
+              </a:spcBef>
+              <a:buFont typeface="Arial" panose="020B0604020202020204" pitchFamily="34" charset="0"/>
+              <a:buChar char="•"/>
+              <a:defRPr sz="1800" kern="1200">
+                <a:solidFill>
+                  <a:schemeClr val="tx1"/>
+                </a:solidFill>
+                <a:latin typeface="+mn-lt"/>
+                <a:ea typeface="+mn-ea"/>
+                <a:cs typeface="+mn-cs"/>
+              </a:defRPr>
+            </a:lvl8pPr>
+            <a:lvl9pPr marL="3886200" indent="-228600" algn="l" defTabSz="914400" rtl="0" eaLnBrk="1" latinLnBrk="0" hangingPunct="1">
+              <a:lnSpc>
+                <a:spcPct val="90000"/>
+              </a:lnSpc>
+              <a:spcBef>
+                <a:spcPts val="500"/>
+              </a:spcBef>
+              <a:buFont typeface="Arial" panose="020B0604020202020204" pitchFamily="34" charset="0"/>
+              <a:buChar char="•"/>
+              <a:defRPr sz="1800" kern="1200">
+                <a:solidFill>
+                  <a:schemeClr val="tx1"/>
+                </a:solidFill>
+                <a:latin typeface="+mn-lt"/>
+                <a:ea typeface="+mn-ea"/>
+                <a:cs typeface="+mn-cs"/>
+              </a:defRPr>
+            </a:lvl9pPr>
+          </a:lstStyle>
+          <a:p>
+            <a:pPr marL="0" indent="0">
+              <a:buFont typeface="Arial" panose="020B0604020202020204" pitchFamily="34" charset="0"/>
+              <a:buNone/>
+            </a:pPr>
+            <a:r>
+              <a:rPr lang="en-US" dirty="0">
+                <a:ea typeface="Fira Code Retina" pitchFamily="49" charset="0"/>
+                <a:cs typeface="Fira Code Retina" pitchFamily="49" charset="0"/>
+              </a:rPr>
+              <a:t>A few </a:t>
+            </a:r>
+            <a:r>
+              <a:rPr lang="en-US" sz="1800" dirty="0" err="1">
+                <a:solidFill>
+                  <a:schemeClr val="accent1"/>
+                </a:solidFill>
+                <a:latin typeface="Fira Code Retina" pitchFamily="49" charset="0"/>
+                <a:ea typeface="Fira Code Retina" pitchFamily="49" charset="0"/>
+                <a:cs typeface="Fira Code Retina" pitchFamily="49" charset="0"/>
+              </a:rPr>
+              <a:t>tibble</a:t>
+            </a:r>
+            <a:r>
+              <a:rPr lang="en-US" dirty="0">
+                <a:ea typeface="Fira Code Retina" pitchFamily="49" charset="0"/>
+                <a:cs typeface="Fira Code Retina" pitchFamily="49" charset="0"/>
+              </a:rPr>
+              <a:t> rules</a:t>
+            </a:r>
+          </a:p>
+          <a:p>
+            <a:r>
+              <a:rPr lang="en-US" sz="1800" dirty="0">
+                <a:solidFill>
+                  <a:schemeClr val="accent1"/>
+                </a:solidFill>
+                <a:latin typeface="Fira Code Retina" pitchFamily="49" charset="0"/>
+                <a:ea typeface="Fira Code Retina" pitchFamily="49" charset="0"/>
+                <a:cs typeface="Fira Code Retina" pitchFamily="49" charset="0"/>
+              </a:rPr>
+              <a:t>DF[“var”] </a:t>
+            </a:r>
+            <a:r>
+              <a:rPr lang="en-US" dirty="0"/>
+              <a:t>single bracket always returns a </a:t>
+            </a:r>
+            <a:r>
+              <a:rPr lang="en-US" dirty="0" err="1"/>
+              <a:t>dataframe</a:t>
+            </a:r>
+            <a:endParaRPr lang="en-US" dirty="0"/>
+          </a:p>
+          <a:p>
+            <a:r>
+              <a:rPr lang="en-US" sz="1800" dirty="0">
+                <a:solidFill>
+                  <a:schemeClr val="accent1"/>
+                </a:solidFill>
+                <a:latin typeface="Fira Code Retina" pitchFamily="49" charset="0"/>
+                <a:ea typeface="Fira Code Retina" pitchFamily="49" charset="0"/>
+                <a:cs typeface="Fira Code Retina" pitchFamily="49" charset="0"/>
+              </a:rPr>
+              <a:t>DF[[“var”]] </a:t>
+            </a:r>
+            <a:r>
+              <a:rPr lang="en-US" dirty="0"/>
+              <a:t>double brackets always return a vector</a:t>
+            </a:r>
+          </a:p>
+          <a:p>
+            <a:r>
+              <a:rPr lang="en-US" sz="1800" dirty="0" err="1">
+                <a:solidFill>
+                  <a:schemeClr val="accent1"/>
+                </a:solidFill>
+                <a:latin typeface="Fira Code Retina" pitchFamily="49" charset="0"/>
+                <a:ea typeface="Fira Code Retina" pitchFamily="49" charset="0"/>
+                <a:cs typeface="Fira Code Retina" pitchFamily="49" charset="0"/>
+              </a:rPr>
+              <a:t>DF$var</a:t>
+            </a:r>
+            <a:r>
+              <a:rPr lang="en-US" sz="1800" dirty="0">
+                <a:solidFill>
+                  <a:schemeClr val="accent1"/>
+                </a:solidFill>
+                <a:latin typeface="Fira Code Retina" pitchFamily="49" charset="0"/>
+                <a:ea typeface="Fira Code Retina" pitchFamily="49" charset="0"/>
+                <a:cs typeface="Fira Code Retina" pitchFamily="49" charset="0"/>
+              </a:rPr>
+              <a:t> </a:t>
+            </a:r>
+            <a:r>
+              <a:rPr lang="en-US" dirty="0"/>
+              <a:t>returns a vector</a:t>
+            </a:r>
+          </a:p>
+          <a:p>
+            <a:endParaRPr lang="en-US" dirty="0"/>
+          </a:p>
+        </p:txBody>
+      </p:sp>
+    </p:spTree>
+    <p:extLst>
+      <p:ext uri="{BB962C8B-B14F-4D97-AF65-F5344CB8AC3E}">
+        <p14:creationId xmlns:p14="http://schemas.microsoft.com/office/powerpoint/2010/main" val="793165381"/>
+      </p:ext>
+    </p:extLst>
+  </p:cSld>
+  <p:clrMapOvr>
+    <a:masterClrMapping/>
+  </p:clrMapOvr>
+</p:sld>
+</file>
+
+<file path=ppt/slides/slide5.xml><?xml version="1.0" encoding="utf-8"?>
+<p:sld xmlns:a="http://schemas.openxmlformats.org/drawingml/2006/main" xmlns:r="http://schemas.openxmlformats.org/officeDocument/2006/relationships" xmlns:p="http://schemas.openxmlformats.org/presentationml/2006/main">
+  <p:cSld>
+    <p:spTree>
+      <p:nvGrpSpPr>
+        <p:cNvPr id="1" name=""/>
+        <p:cNvGrpSpPr/>
+        <p:nvPr/>
+      </p:nvGrpSpPr>
+      <p:grpSpPr>
+        <a:xfrm>
+          <a:off x="0" y="0"/>
+          <a:ext cx="0" cy="0"/>
+          <a:chOff x="0" y="0"/>
+          <a:chExt cx="0" cy="0"/>
+        </a:xfrm>
+      </p:grpSpPr>
+      <p:sp>
+        <p:nvSpPr>
+          <p:cNvPr id="2" name="Title 1">
+            <a:extLst>
+              <a:ext uri="{FF2B5EF4-FFF2-40B4-BE49-F238E27FC236}">
+                <a16:creationId xmlns:a16="http://schemas.microsoft.com/office/drawing/2014/main" id="{D387C49B-A029-4FD0-09AD-145E3A8A7C2E}"/>
+              </a:ext>
+            </a:extLst>
+          </p:cNvPr>
+          <p:cNvSpPr>
+            <a:spLocks noGrp="1"/>
+          </p:cNvSpPr>
+          <p:nvPr>
+            <p:ph type="title"/>
+          </p:nvPr>
+        </p:nvSpPr>
+        <p:spPr/>
+        <p:txBody>
+          <a:bodyPr/>
+          <a:lstStyle/>
+          <a:p>
+            <a:r>
+              <a:rPr lang="en-US" dirty="0"/>
+              <a:t>Formatting dates</a:t>
+            </a:r>
+          </a:p>
+        </p:txBody>
+      </p:sp>
+      <p:sp>
+        <p:nvSpPr>
+          <p:cNvPr id="3" name="Content Placeholder 2">
+            <a:extLst>
+              <a:ext uri="{FF2B5EF4-FFF2-40B4-BE49-F238E27FC236}">
+                <a16:creationId xmlns:a16="http://schemas.microsoft.com/office/drawing/2014/main" id="{667130D3-9BC5-FEBB-DC58-8D306D442EF1}"/>
+              </a:ext>
+            </a:extLst>
+          </p:cNvPr>
+          <p:cNvSpPr>
+            <a:spLocks noGrp="1"/>
+          </p:cNvSpPr>
+          <p:nvPr>
+            <p:ph idx="1"/>
+          </p:nvPr>
+        </p:nvSpPr>
+        <p:spPr/>
+        <p:txBody>
+          <a:bodyPr/>
+          <a:lstStyle/>
+          <a:p>
+            <a:r>
+              <a:rPr lang="en-US" dirty="0"/>
+              <a:t>R stores dates in “YYYY-MM-DD” format by default</a:t>
+            </a:r>
+          </a:p>
+          <a:p>
+            <a:r>
+              <a:rPr lang="en-US" dirty="0"/>
+              <a:t>Use </a:t>
+            </a:r>
+            <a:r>
+              <a:rPr lang="en-US" sz="2000" dirty="0">
+                <a:solidFill>
+                  <a:schemeClr val="accent1"/>
+                </a:solidFill>
+                <a:latin typeface="Fira Code Retina" pitchFamily="49" charset="0"/>
+                <a:ea typeface="Fira Code Retina" pitchFamily="49" charset="0"/>
+                <a:cs typeface="Fira Code Retina" pitchFamily="49" charset="0"/>
+              </a:rPr>
+              <a:t>str() </a:t>
+            </a:r>
+            <a:r>
+              <a:rPr lang="en-US" dirty="0"/>
+              <a:t>or </a:t>
+            </a:r>
+            <a:r>
+              <a:rPr lang="en-US" sz="2000" dirty="0">
+                <a:solidFill>
+                  <a:schemeClr val="accent1"/>
+                </a:solidFill>
+                <a:latin typeface="Fira Code Retina" pitchFamily="49" charset="0"/>
+                <a:ea typeface="Fira Code Retina" pitchFamily="49" charset="0"/>
+                <a:cs typeface="Fira Code Retina" pitchFamily="49" charset="0"/>
+              </a:rPr>
+              <a:t>class() </a:t>
+            </a:r>
+            <a:r>
+              <a:rPr lang="en-US" dirty="0"/>
+              <a:t>to check whether a vector is a date</a:t>
+            </a:r>
+          </a:p>
+          <a:p>
+            <a:r>
+              <a:rPr lang="en-US" dirty="0"/>
+              <a:t>Use </a:t>
+            </a:r>
+            <a:r>
+              <a:rPr lang="en-US" dirty="0" err="1"/>
+              <a:t>lubridate</a:t>
+            </a:r>
+            <a:r>
+              <a:rPr lang="en-US" dirty="0"/>
+              <a:t> package</a:t>
+            </a:r>
+          </a:p>
+          <a:p>
+            <a:pPr lvl="1"/>
+            <a:r>
+              <a:rPr lang="en-US" dirty="0"/>
+              <a:t>Installed as part of </a:t>
+            </a:r>
+            <a:r>
+              <a:rPr lang="en-US" dirty="0" err="1"/>
+              <a:t>tidyverse</a:t>
+            </a:r>
+            <a:endParaRPr lang="en-US" dirty="0"/>
+          </a:p>
+          <a:p>
+            <a:pPr lvl="1"/>
+            <a:r>
+              <a:rPr lang="en-US" dirty="0"/>
+              <a:t>We will use </a:t>
+            </a:r>
+            <a:r>
+              <a:rPr lang="en-US" dirty="0" err="1">
+                <a:solidFill>
+                  <a:schemeClr val="accent1"/>
+                </a:solidFill>
+                <a:latin typeface="Fira Code Retina" pitchFamily="49" charset="0"/>
+                <a:ea typeface="Fira Code Retina" pitchFamily="49" charset="0"/>
+                <a:cs typeface="Fira Code Retina" pitchFamily="49" charset="0"/>
+              </a:rPr>
+              <a:t>ymd</a:t>
+            </a:r>
+            <a:r>
+              <a:rPr lang="en-US" dirty="0">
+                <a:solidFill>
+                  <a:schemeClr val="accent1"/>
+                </a:solidFill>
+                <a:latin typeface="Fira Code Retina" pitchFamily="49" charset="0"/>
+                <a:ea typeface="Fira Code Retina" pitchFamily="49" charset="0"/>
+                <a:cs typeface="Fira Code Retina" pitchFamily="49" charset="0"/>
+              </a:rPr>
+              <a:t>()</a:t>
+            </a:r>
+            <a:r>
+              <a:rPr lang="en-US" dirty="0"/>
+              <a:t> for today’s exercise</a:t>
+            </a:r>
+          </a:p>
+        </p:txBody>
+      </p:sp>
+    </p:spTree>
+    <p:extLst>
+      <p:ext uri="{BB962C8B-B14F-4D97-AF65-F5344CB8AC3E}">
+        <p14:creationId xmlns:p14="http://schemas.microsoft.com/office/powerpoint/2010/main" val="4089039740"/>
+      </p:ext>
+    </p:extLst>
+  </p:cSld>
+  <p:clrMapOvr>
+    <a:masterClrMapping/>
+  </p:clrMapOvr>
+</p:sld>
+</file>
+
+<file path=ppt/slides/slide6.xml><?xml version="1.0" encoding="utf-8"?>
+<p:sld xmlns:a="http://schemas.openxmlformats.org/drawingml/2006/main" xmlns:r="http://schemas.openxmlformats.org/officeDocument/2006/relationships" xmlns:p="http://schemas.openxmlformats.org/presentationml/2006/main">
+  <p:cSld>
+    <p:spTree>
+      <p:nvGrpSpPr>
+        <p:cNvPr id="1" name=""/>
+        <p:cNvGrpSpPr/>
+        <p:nvPr/>
+      </p:nvGrpSpPr>
+      <p:grpSpPr>
+        <a:xfrm>
+          <a:off x="0" y="0"/>
+          <a:ext cx="0" cy="0"/>
+          <a:chOff x="0" y="0"/>
+          <a:chExt cx="0" cy="0"/>
+        </a:xfrm>
+      </p:grpSpPr>
+      <p:sp>
+        <p:nvSpPr>
+          <p:cNvPr id="2" name="Title 1">
+            <a:extLst>
+              <a:ext uri="{FF2B5EF4-FFF2-40B4-BE49-F238E27FC236}">
+                <a16:creationId xmlns:a16="http://schemas.microsoft.com/office/drawing/2014/main" id="{1B23EF58-7254-A6FB-FEA9-6505FA903B69}"/>
+              </a:ext>
+            </a:extLst>
+          </p:cNvPr>
+          <p:cNvSpPr>
+            <a:spLocks noGrp="1"/>
+          </p:cNvSpPr>
+          <p:nvPr>
+            <p:ph type="title"/>
+          </p:nvPr>
+        </p:nvSpPr>
+        <p:spPr/>
+        <p:txBody>
+          <a:bodyPr/>
+          <a:lstStyle/>
+          <a:p>
+            <a:r>
+              <a:rPr lang="en-US" dirty="0"/>
+              <a:t>Factors</a:t>
+            </a:r>
+          </a:p>
+        </p:txBody>
+      </p:sp>
+      <p:sp>
+        <p:nvSpPr>
+          <p:cNvPr id="3" name="Content Placeholder 2">
+            <a:extLst>
+              <a:ext uri="{FF2B5EF4-FFF2-40B4-BE49-F238E27FC236}">
+                <a16:creationId xmlns:a16="http://schemas.microsoft.com/office/drawing/2014/main" id="{B386768B-D0AD-D2E7-6F35-C5C48956668D}"/>
+              </a:ext>
+            </a:extLst>
+          </p:cNvPr>
+          <p:cNvSpPr>
+            <a:spLocks noGrp="1"/>
+          </p:cNvSpPr>
+          <p:nvPr>
+            <p:ph idx="1"/>
+          </p:nvPr>
+        </p:nvSpPr>
+        <p:spPr/>
+        <p:txBody>
+          <a:bodyPr/>
+          <a:lstStyle/>
+          <a:p>
+            <a:r>
+              <a:rPr lang="en-US" dirty="0"/>
+              <a:t>A special class for working with categorical data</a:t>
+            </a:r>
+          </a:p>
+          <a:p>
+            <a:r>
+              <a:rPr lang="en-US" dirty="0"/>
+              <a:t>Contain a pre-defined set of values: levels</a:t>
+            </a:r>
+          </a:p>
+          <a:p>
+            <a:r>
+              <a:rPr lang="en-US" dirty="0"/>
+              <a:t>Levels are integers attached with labels</a:t>
+            </a:r>
+          </a:p>
+          <a:p>
+            <a:r>
+              <a:rPr lang="en-US" dirty="0"/>
+              <a:t>While behave like character vector, R treats factors as integer</a:t>
+            </a:r>
+          </a:p>
+          <a:p>
+            <a:r>
+              <a:rPr lang="en-US" dirty="0"/>
+              <a:t>Can specify the order of the categories in a variable</a:t>
+            </a:r>
+          </a:p>
+          <a:p>
+            <a:pPr lvl="1"/>
+            <a:r>
+              <a:rPr lang="en-US" dirty="0"/>
+              <a:t>R sorts character vectors in alphabetical order (e.g., during plotting)</a:t>
+            </a:r>
+          </a:p>
+          <a:p>
+            <a:r>
+              <a:rPr lang="en-US" dirty="0"/>
+              <a:t>Use </a:t>
+            </a:r>
+            <a:r>
+              <a:rPr lang="en-US" sz="2000" dirty="0">
+                <a:solidFill>
+                  <a:schemeClr val="accent1"/>
+                </a:solidFill>
+                <a:latin typeface="Fira Code Retina" pitchFamily="49" charset="0"/>
+                <a:ea typeface="Fira Code Retina" pitchFamily="49" charset="0"/>
+                <a:cs typeface="Fira Code Retina" pitchFamily="49" charset="0"/>
+              </a:rPr>
+              <a:t>factor() </a:t>
+            </a:r>
+            <a:r>
+              <a:rPr lang="en-US" dirty="0"/>
+              <a:t>to convert to </a:t>
+            </a:r>
+            <a:r>
+              <a:rPr lang="en-US" sz="2000" dirty="0">
+                <a:solidFill>
+                  <a:schemeClr val="accent1"/>
+                </a:solidFill>
+                <a:latin typeface="Fira Code Retina" pitchFamily="49" charset="0"/>
+                <a:ea typeface="Fira Code Retina" pitchFamily="49" charset="0"/>
+                <a:cs typeface="Fira Code Retina" pitchFamily="49" charset="0"/>
+              </a:rPr>
+              <a:t>factor</a:t>
+            </a:r>
+            <a:r>
+              <a:rPr lang="en-US" dirty="0"/>
+              <a:t> data type</a:t>
+            </a:r>
+          </a:p>
+        </p:txBody>
+      </p:sp>
+    </p:spTree>
+    <p:extLst>
+      <p:ext uri="{BB962C8B-B14F-4D97-AF65-F5344CB8AC3E}">
+        <p14:creationId xmlns:p14="http://schemas.microsoft.com/office/powerpoint/2010/main" val="1466937768"/>
       </p:ext>
     </p:extLst>
   </p:cSld>

</xml_diff>

<commit_message>
add details to 03_manipulating_data.pptx
</commit_message>
<xml_diff>
--- a/ex/02_starting_with_data.pptx
+++ b/ex/02_starting_with_data.pptx
@@ -6,11 +6,12 @@
   </p:sldMasterIdLst>
   <p:sldIdLst>
     <p:sldId id="256" r:id="rId2"/>
-    <p:sldId id="265" r:id="rId3"/>
-    <p:sldId id="266" r:id="rId4"/>
-    <p:sldId id="270" r:id="rId5"/>
-    <p:sldId id="273" r:id="rId6"/>
-    <p:sldId id="272" r:id="rId7"/>
+    <p:sldId id="275" r:id="rId3"/>
+    <p:sldId id="274" r:id="rId4"/>
+    <p:sldId id="266" r:id="rId5"/>
+    <p:sldId id="270" r:id="rId6"/>
+    <p:sldId id="273" r:id="rId7"/>
+    <p:sldId id="272" r:id="rId8"/>
   </p:sldIdLst>
   <p:sldSz cx="12192000" cy="6858000"/>
   <p:notesSz cx="6858000" cy="9144000"/>
@@ -4109,96 +4110,10 @@
       </p:grpSpPr>
       <p:sp>
         <p:nvSpPr>
-          <p:cNvPr id="2" name="Content Placeholder 1">
-            <a:extLst>
-              <a:ext uri="{FF2B5EF4-FFF2-40B4-BE49-F238E27FC236}">
-                <a16:creationId xmlns:a16="http://schemas.microsoft.com/office/drawing/2014/main" id="{A5D34626-0B89-5E95-00B9-0A00A73B6A5A}"/>
-              </a:ext>
-            </a:extLst>
-          </p:cNvPr>
-          <p:cNvSpPr>
-            <a:spLocks noGrp="1"/>
-          </p:cNvSpPr>
-          <p:nvPr>
-            <p:ph sz="half" idx="1"/>
-          </p:nvPr>
-        </p:nvSpPr>
-        <p:spPr/>
-        <p:txBody>
-          <a:bodyPr>
-            <a:normAutofit/>
-          </a:bodyPr>
-          <a:lstStyle/>
-          <a:p>
-            <a:r>
-              <a:rPr lang="en-US" dirty="0"/>
-              <a:t>Download: </a:t>
-            </a:r>
-            <a:r>
-              <a:rPr lang="en-US" dirty="0" err="1">
-                <a:solidFill>
-                  <a:schemeClr val="accent1"/>
-                </a:solidFill>
-                <a:latin typeface="Fira Code Retina" pitchFamily="49" charset="0"/>
-                <a:ea typeface="Fira Code Retina" pitchFamily="49" charset="0"/>
-                <a:cs typeface="Fira Code Retina" pitchFamily="49" charset="0"/>
-              </a:rPr>
-              <a:t>download.file</a:t>
-            </a:r>
-            <a:r>
-              <a:rPr lang="en-US" dirty="0">
-                <a:solidFill>
-                  <a:schemeClr val="accent1"/>
-                </a:solidFill>
-                <a:latin typeface="Fira Code Retina" pitchFamily="49" charset="0"/>
-                <a:ea typeface="Fira Code Retina" pitchFamily="49" charset="0"/>
-                <a:cs typeface="Fira Code Retina" pitchFamily="49" charset="0"/>
-              </a:rPr>
-              <a:t>()</a:t>
-            </a:r>
-          </a:p>
-          <a:p>
-            <a:r>
-              <a:rPr lang="en-US" dirty="0"/>
-              <a:t>Read file: </a:t>
-            </a:r>
-            <a:r>
-              <a:rPr lang="en-US" dirty="0" err="1">
-                <a:solidFill>
-                  <a:schemeClr val="accent1"/>
-                </a:solidFill>
-                <a:latin typeface="Fira Code Retina" pitchFamily="49" charset="0"/>
-                <a:ea typeface="Fira Code Retina" pitchFamily="49" charset="0"/>
-                <a:cs typeface="Fira Code Retina" pitchFamily="49" charset="0"/>
-              </a:rPr>
-              <a:t>read_csv</a:t>
-            </a:r>
-            <a:r>
-              <a:rPr lang="en-US" dirty="0">
-                <a:solidFill>
-                  <a:schemeClr val="accent1"/>
-                </a:solidFill>
-                <a:latin typeface="Fira Code Retina" pitchFamily="49" charset="0"/>
-                <a:ea typeface="Fira Code Retina" pitchFamily="49" charset="0"/>
-                <a:cs typeface="Fira Code Retina" pitchFamily="49" charset="0"/>
-              </a:rPr>
-              <a:t>()</a:t>
-            </a:r>
-          </a:p>
-          <a:p>
-            <a:r>
-              <a:rPr lang="en-US" dirty="0"/>
-              <a:t>View data</a:t>
-            </a:r>
-          </a:p>
-        </p:txBody>
-      </p:sp>
-      <p:sp>
-        <p:nvSpPr>
-          <p:cNvPr id="4" name="Title 3">
-            <a:extLst>
-              <a:ext uri="{FF2B5EF4-FFF2-40B4-BE49-F238E27FC236}">
-                <a16:creationId xmlns:a16="http://schemas.microsoft.com/office/drawing/2014/main" id="{AB6C96B3-3E7B-874F-0A8F-83968CABF453}"/>
+          <p:cNvPr id="2" name="Title 1">
+            <a:extLst>
+              <a:ext uri="{FF2B5EF4-FFF2-40B4-BE49-F238E27FC236}">
+                <a16:creationId xmlns:a16="http://schemas.microsoft.com/office/drawing/2014/main" id="{4FFF80FD-E82B-AAF4-206E-C14F628D4D07}"/>
               </a:ext>
             </a:extLst>
           </p:cNvPr>
@@ -4216,47 +4131,62 @@
           <a:p>
             <a:r>
               <a:rPr lang="en-US" dirty="0"/>
-              <a:t>Example dataset</a:t>
+              <a:t>Data analysis workflow</a:t>
             </a:r>
           </a:p>
         </p:txBody>
       </p:sp>
       <p:pic>
         <p:nvPicPr>
-          <p:cNvPr id="5" name="Content Placeholder 4">
-            <a:extLst>
-              <a:ext uri="{FF2B5EF4-FFF2-40B4-BE49-F238E27FC236}">
-                <a16:creationId xmlns:a16="http://schemas.microsoft.com/office/drawing/2014/main" id="{0B108F38-A0E9-659F-5F80-7817A1613E87}"/>
+          <p:cNvPr id="1026" name="Picture 2">
+            <a:extLst>
+              <a:ext uri="{FF2B5EF4-FFF2-40B4-BE49-F238E27FC236}">
+                <a16:creationId xmlns:a16="http://schemas.microsoft.com/office/drawing/2014/main" id="{2F29DCF3-AF72-445E-ECDD-F655A12A3227}"/>
               </a:ext>
             </a:extLst>
           </p:cNvPr>
           <p:cNvPicPr>
-            <a:picLocks noGrp="1" noChangeAspect="1"/>
+            <a:picLocks noGrp="1" noChangeAspect="1" noChangeArrowheads="1"/>
           </p:cNvPicPr>
           <p:nvPr>
-            <p:ph sz="half" idx="2"/>
+            <p:ph idx="1"/>
           </p:nvPr>
         </p:nvPicPr>
-        <p:blipFill>
-          <a:blip r:embed="rId2"/>
-          <a:stretch>
-            <a:fillRect/>
-          </a:stretch>
+        <p:blipFill rotWithShape="1">
+          <a:blip r:embed="rId2">
+            <a:extLst>
+              <a:ext uri="{28A0092B-C50C-407E-A947-70E740481C1C}">
+                <a14:useLocalDpi xmlns:a14="http://schemas.microsoft.com/office/drawing/2010/main" val="0"/>
+              </a:ext>
+            </a:extLst>
+          </a:blip>
+          <a:srcRect l="1338" t="3317" r="2145" b="12604"/>
+          <a:stretch/>
         </p:blipFill>
-        <p:spPr>
+        <p:spPr bwMode="auto">
           <a:xfrm>
-            <a:off x="6404462" y="1825625"/>
-            <a:ext cx="4717075" cy="4351338"/>
+            <a:off x="2090928" y="2523744"/>
+            <a:ext cx="8010144" cy="2560320"/>
           </a:xfrm>
           <a:prstGeom prst="rect">
             <a:avLst/>
           </a:prstGeom>
+          <a:noFill/>
+          <a:extLst>
+            <a:ext uri="{909E8E84-426E-40DD-AFC4-6F175D3DCCD1}">
+              <a14:hiddenFill xmlns:a14="http://schemas.microsoft.com/office/drawing/2010/main">
+                <a:solidFill>
+                  <a:srgbClr val="FFFFFF"/>
+                </a:solidFill>
+              </a14:hiddenFill>
+            </a:ext>
+          </a:extLst>
         </p:spPr>
       </p:pic>
     </p:spTree>
     <p:extLst>
       <p:ext uri="{BB962C8B-B14F-4D97-AF65-F5344CB8AC3E}">
-        <p14:creationId xmlns:p14="http://schemas.microsoft.com/office/powerpoint/2010/main" val="1771962084"/>
+        <p14:creationId xmlns:p14="http://schemas.microsoft.com/office/powerpoint/2010/main" val="1821942059"/>
       </p:ext>
     </p:extLst>
   </p:cSld>
@@ -4288,7 +4218,7 @@
           <p:cNvPr id="2" name="Content Placeholder 1">
             <a:extLst>
               <a:ext uri="{FF2B5EF4-FFF2-40B4-BE49-F238E27FC236}">
-                <a16:creationId xmlns:a16="http://schemas.microsoft.com/office/drawing/2014/main" id="{154CCD07-8CAF-65F7-CD5C-6CB4003F6301}"/>
+                <a16:creationId xmlns:a16="http://schemas.microsoft.com/office/drawing/2014/main" id="{A5D34626-0B89-5E95-00B9-0A00A73B6A5A}"/>
               </a:ext>
             </a:extLst>
           </p:cNvPr>
@@ -4301,11 +4231,45 @@
         </p:nvSpPr>
         <p:spPr/>
         <p:txBody>
-          <a:bodyPr/>
+          <a:bodyPr>
+            <a:normAutofit/>
+          </a:bodyPr>
           <a:lstStyle/>
           <a:p>
             <a:r>
-              <a:rPr lang="en-US" sz="2000" dirty="0" err="1">
+              <a:rPr lang="en-US" dirty="0"/>
+              <a:t>Download: </a:t>
+            </a:r>
+            <a:r>
+              <a:rPr lang="en-US" sz="1800" dirty="0" err="1">
+                <a:solidFill>
+                  <a:schemeClr val="accent1"/>
+                </a:solidFill>
+                <a:latin typeface="Fira Code Retina" pitchFamily="49" charset="0"/>
+                <a:ea typeface="Fira Code Retina" pitchFamily="49" charset="0"/>
+                <a:cs typeface="Fira Code Retina" pitchFamily="49" charset="0"/>
+              </a:rPr>
+              <a:t>download.file</a:t>
+            </a:r>
+            <a:r>
+              <a:rPr lang="en-US" sz="1800" dirty="0">
+                <a:solidFill>
+                  <a:schemeClr val="accent1"/>
+                </a:solidFill>
+                <a:latin typeface="Fira Code Retina" pitchFamily="49" charset="0"/>
+                <a:ea typeface="Fira Code Retina" pitchFamily="49" charset="0"/>
+                <a:cs typeface="Fira Code Retina" pitchFamily="49" charset="0"/>
+              </a:rPr>
+              <a:t>()</a:t>
+            </a:r>
+          </a:p>
+          <a:p>
+            <a:r>
+              <a:rPr lang="en-US" dirty="0"/>
+              <a:t>Read file: </a:t>
+            </a:r>
+            <a:r>
+              <a:rPr lang="en-US" sz="1800" dirty="0" err="1">
                 <a:solidFill>
                   <a:schemeClr val="accent1"/>
                 </a:solidFill>
@@ -4316,7 +4280,7 @@
               <a:t>read_csv</a:t>
             </a:r>
             <a:r>
-              <a:rPr lang="en-US" sz="2000" dirty="0">
+              <a:rPr lang="en-US" sz="1800" dirty="0">
                 <a:solidFill>
                   <a:schemeClr val="accent1"/>
                 </a:solidFill>
@@ -4324,14 +4288,19 @@
                 <a:ea typeface="Fira Code Retina" pitchFamily="49" charset="0"/>
                 <a:cs typeface="Fira Code Retina" pitchFamily="49" charset="0"/>
               </a:rPr>
-              <a:t>() </a:t>
-            </a:r>
+              <a:t>()</a:t>
+            </a:r>
+          </a:p>
+          <a:p>
             <a:r>
               <a:rPr lang="en-US" dirty="0"/>
-              <a:t>stores data as </a:t>
-            </a:r>
-            <a:r>
-              <a:rPr lang="en-US" sz="2000" dirty="0" err="1">
+              <a:t>View data:</a:t>
+            </a:r>
+          </a:p>
+          <a:p>
+            <a:pPr lvl="1"/>
+            <a:r>
+              <a:rPr lang="en-US" sz="1800" dirty="0">
                 <a:solidFill>
                   <a:schemeClr val="accent1"/>
                 </a:solidFill>
@@ -4339,39 +4308,60 @@
                 <a:ea typeface="Fira Code Retina" pitchFamily="49" charset="0"/>
                 <a:cs typeface="Fira Code Retina" pitchFamily="49" charset="0"/>
               </a:rPr>
-              <a:t>tibble</a:t>
-            </a:r>
+              <a:t>view()</a:t>
+            </a:r>
+          </a:p>
+          <a:p>
+            <a:pPr lvl="1"/>
             <a:r>
               <a:rPr lang="en-US" dirty="0"/>
-              <a:t>, a special kind of data frame</a:t>
-            </a:r>
-          </a:p>
-          <a:p>
+              <a:t>Place mouse cursor on the </a:t>
+            </a:r>
+            <a:r>
+              <a:rPr lang="en-US" dirty="0" err="1"/>
+              <a:t>dataframe</a:t>
+            </a:r>
             <a:r>
               <a:rPr lang="en-US" dirty="0"/>
-              <a:t>De facto data structure for most tabular data</a:t>
-            </a:r>
-          </a:p>
+              <a:t> name and press F2</a:t>
+            </a:r>
+          </a:p>
+        </p:txBody>
+      </p:sp>
+      <p:sp>
+        <p:nvSpPr>
+          <p:cNvPr id="4" name="Title 3">
+            <a:extLst>
+              <a:ext uri="{FF2B5EF4-FFF2-40B4-BE49-F238E27FC236}">
+                <a16:creationId xmlns:a16="http://schemas.microsoft.com/office/drawing/2014/main" id="{AB6C96B3-3E7B-874F-0A8F-83968CABF453}"/>
+              </a:ext>
+            </a:extLst>
+          </p:cNvPr>
+          <p:cNvSpPr>
+            <a:spLocks noGrp="1"/>
+          </p:cNvSpPr>
+          <p:nvPr>
+            <p:ph type="title"/>
+          </p:nvPr>
+        </p:nvSpPr>
+        <p:spPr/>
+        <p:txBody>
+          <a:bodyPr/>
+          <a:lstStyle/>
           <a:p>
             <a:r>
               <a:rPr lang="en-US" dirty="0"/>
-              <a:t>Columns are vectors (logical, numeric, character)</a:t>
-            </a:r>
-          </a:p>
-          <a:p>
-            <a:r>
-              <a:rPr lang="en-US" dirty="0"/>
-              <a:t>All vectors have the same length</a:t>
+              <a:t>Example dataset</a:t>
             </a:r>
           </a:p>
         </p:txBody>
       </p:sp>
       <p:pic>
         <p:nvPicPr>
-          <p:cNvPr id="8" name="Content Placeholder 7">
-            <a:extLst>
-              <a:ext uri="{FF2B5EF4-FFF2-40B4-BE49-F238E27FC236}">
-                <a16:creationId xmlns:a16="http://schemas.microsoft.com/office/drawing/2014/main" id="{C00179DF-4262-AF64-ED46-CFABE682950E}"/>
+          <p:cNvPr id="5" name="Content Placeholder 4">
+            <a:extLst>
+              <a:ext uri="{FF2B5EF4-FFF2-40B4-BE49-F238E27FC236}">
+                <a16:creationId xmlns:a16="http://schemas.microsoft.com/office/drawing/2014/main" id="{0B108F38-A0E9-659F-5F80-7817A1613E87}"/>
               </a:ext>
             </a:extLst>
           </p:cNvPr>
@@ -4390,43 +4380,50 @@
         </p:blipFill>
         <p:spPr>
           <a:xfrm>
-            <a:off x="6725264" y="2122912"/>
-            <a:ext cx="4628535" cy="2673109"/>
+            <a:off x="6404462" y="1825625"/>
+            <a:ext cx="4717075" cy="4351338"/>
           </a:xfrm>
+          <a:prstGeom prst="rect">
+            <a:avLst/>
+          </a:prstGeom>
         </p:spPr>
       </p:pic>
       <p:sp>
         <p:nvSpPr>
-          <p:cNvPr id="4" name="Title 3">
-            <a:extLst>
-              <a:ext uri="{FF2B5EF4-FFF2-40B4-BE49-F238E27FC236}">
-                <a16:creationId xmlns:a16="http://schemas.microsoft.com/office/drawing/2014/main" id="{639C6A56-4CBA-CF73-584D-A7946BFF0FEB}"/>
-              </a:ext>
-            </a:extLst>
-          </p:cNvPr>
-          <p:cNvSpPr>
-            <a:spLocks noGrp="1"/>
-          </p:cNvSpPr>
-          <p:nvPr>
-            <p:ph type="title"/>
-          </p:nvPr>
-        </p:nvSpPr>
-        <p:spPr/>
-        <p:txBody>
-          <a:bodyPr/>
+          <p:cNvPr id="3" name="TextBox 2">
+            <a:extLst>
+              <a:ext uri="{FF2B5EF4-FFF2-40B4-BE49-F238E27FC236}">
+                <a16:creationId xmlns:a16="http://schemas.microsoft.com/office/drawing/2014/main" id="{7DD0A2F6-3314-EC63-9A6A-488556587F0A}"/>
+              </a:ext>
+            </a:extLst>
+          </p:cNvPr>
+          <p:cNvSpPr txBox="1"/>
+          <p:nvPr/>
+        </p:nvSpPr>
+        <p:spPr>
+          <a:xfrm>
+            <a:off x="3479800" y="-1117600"/>
+            <a:ext cx="184731" cy="369332"/>
+          </a:xfrm>
+          <a:prstGeom prst="rect">
+            <a:avLst/>
+          </a:prstGeom>
+          <a:noFill/>
+        </p:spPr>
+        <p:txBody>
+          <a:bodyPr wrap="none" rtlCol="0">
+            <a:spAutoFit/>
+          </a:bodyPr>
           <a:lstStyle/>
           <a:p>
-            <a:r>
-              <a:rPr lang="en-US" dirty="0"/>
-              <a:t>Data frames</a:t>
-            </a:r>
+            <a:endParaRPr lang="en-US" dirty="0"/>
           </a:p>
         </p:txBody>
       </p:sp>
     </p:spTree>
     <p:extLst>
       <p:ext uri="{BB962C8B-B14F-4D97-AF65-F5344CB8AC3E}">
-        <p14:creationId xmlns:p14="http://schemas.microsoft.com/office/powerpoint/2010/main" val="3506141904"/>
+        <p14:creationId xmlns:p14="http://schemas.microsoft.com/office/powerpoint/2010/main" val="3771051855"/>
       </p:ext>
     </p:extLst>
   </p:cSld>
@@ -4455,18 +4452,18 @@
       </p:grpSpPr>
       <p:sp>
         <p:nvSpPr>
-          <p:cNvPr id="2" name="Title 1">
-            <a:extLst>
-              <a:ext uri="{FF2B5EF4-FFF2-40B4-BE49-F238E27FC236}">
-                <a16:creationId xmlns:a16="http://schemas.microsoft.com/office/drawing/2014/main" id="{203F859C-A883-940D-4E39-209D4D86BE97}"/>
-              </a:ext>
-            </a:extLst>
-          </p:cNvPr>
-          <p:cNvSpPr>
-            <a:spLocks noGrp="1"/>
-          </p:cNvSpPr>
-          <p:nvPr>
-            <p:ph type="title"/>
+          <p:cNvPr id="2" name="Content Placeholder 1">
+            <a:extLst>
+              <a:ext uri="{FF2B5EF4-FFF2-40B4-BE49-F238E27FC236}">
+                <a16:creationId xmlns:a16="http://schemas.microsoft.com/office/drawing/2014/main" id="{154CCD07-8CAF-65F7-CD5C-6CB4003F6301}"/>
+              </a:ext>
+            </a:extLst>
+          </p:cNvPr>
+          <p:cNvSpPr>
+            <a:spLocks noGrp="1"/>
+          </p:cNvSpPr>
+          <p:nvPr>
+            <p:ph sz="half" idx="1"/>
           </p:nvPr>
         </p:nvSpPr>
         <p:spPr/>
@@ -4475,77 +4472,7 @@
           <a:lstStyle/>
           <a:p>
             <a:r>
-              <a:rPr lang="en-US" dirty="0" err="1"/>
-              <a:t>Subsetting</a:t>
-            </a:r>
-            <a:r>
-              <a:rPr lang="en-US" dirty="0"/>
-              <a:t> data frames</a:t>
-            </a:r>
-          </a:p>
-        </p:txBody>
-      </p:sp>
-      <p:sp>
-        <p:nvSpPr>
-          <p:cNvPr id="3" name="Content Placeholder 2">
-            <a:extLst>
-              <a:ext uri="{FF2B5EF4-FFF2-40B4-BE49-F238E27FC236}">
-                <a16:creationId xmlns:a16="http://schemas.microsoft.com/office/drawing/2014/main" id="{06C34019-9D82-E39D-AE68-ACFE3FB3D86A}"/>
-              </a:ext>
-            </a:extLst>
-          </p:cNvPr>
-          <p:cNvSpPr>
-            <a:spLocks noGrp="1"/>
-          </p:cNvSpPr>
-          <p:nvPr>
-            <p:ph idx="1"/>
-          </p:nvPr>
-        </p:nvSpPr>
-        <p:spPr/>
-        <p:txBody>
-          <a:bodyPr/>
-          <a:lstStyle/>
-          <a:p>
-            <a:pPr marL="0" indent="0">
-              <a:buNone/>
-            </a:pPr>
-            <a:r>
-              <a:rPr lang="en-US" dirty="0"/>
-              <a:t>Two ways of </a:t>
-            </a:r>
-            <a:r>
-              <a:rPr lang="en-US" dirty="0" err="1"/>
-              <a:t>subsetting</a:t>
-            </a:r>
-            <a:r>
-              <a:rPr lang="en-US" dirty="0"/>
-              <a:t> a </a:t>
-            </a:r>
-            <a:r>
-              <a:rPr lang="en-US" dirty="0" err="1"/>
-              <a:t>dataframe</a:t>
-            </a:r>
-            <a:r>
-              <a:rPr lang="en-US" dirty="0"/>
-              <a:t>:</a:t>
-            </a:r>
-          </a:p>
-          <a:p>
-            <a:pPr marL="457200" indent="-457200">
-              <a:buFont typeface="+mj-lt"/>
-              <a:buAutoNum type="arabicPeriod"/>
-            </a:pPr>
-            <a:r>
-              <a:rPr lang="en-US" dirty="0"/>
-              <a:t>By indices of rows and columns</a:t>
-            </a:r>
-          </a:p>
-          <a:p>
-            <a:pPr marL="0" indent="0">
-              <a:buNone/>
-            </a:pPr>
-            <a:r>
-              <a:rPr lang="en-US" sz="1800" dirty="0">
+              <a:rPr lang="en-US" sz="2000" dirty="0" err="1">
                 <a:solidFill>
                   <a:schemeClr val="accent1"/>
                 </a:solidFill>
@@ -4553,38 +4480,10 @@
                 <a:ea typeface="Fira Code Retina" pitchFamily="49" charset="0"/>
                 <a:cs typeface="Fira Code Retina" pitchFamily="49" charset="0"/>
               </a:rPr>
-              <a:t>DF[row, column]</a:t>
-            </a:r>
-          </a:p>
-          <a:p>
-            <a:pPr marL="0" indent="0">
-              <a:buNone/>
-            </a:pPr>
-            <a:endParaRPr lang="en-US" sz="2000" dirty="0">
-              <a:solidFill>
-                <a:schemeClr val="accent1"/>
-              </a:solidFill>
-              <a:latin typeface="Fira Code Retina" pitchFamily="49" charset="0"/>
-              <a:ea typeface="Fira Code Retina" pitchFamily="49" charset="0"/>
-              <a:cs typeface="Fira Code Retina" pitchFamily="49" charset="0"/>
-            </a:endParaRPr>
-          </a:p>
-          <a:p>
-            <a:pPr marL="457200" indent="-457200">
-              <a:buFont typeface="+mj-lt"/>
-              <a:buAutoNum type="arabicPeriod" startAt="2"/>
-            </a:pPr>
-            <a:r>
-              <a:rPr lang="en-US" dirty="0"/>
-              <a:t>Column names</a:t>
-            </a:r>
-          </a:p>
-          <a:p>
-            <a:pPr marL="0" indent="0">
-              <a:buNone/>
-            </a:pPr>
-            <a:r>
-              <a:rPr lang="en-US" sz="1800" dirty="0">
+              <a:t>read_csv</a:t>
+            </a:r>
+            <a:r>
+              <a:rPr lang="en-US" sz="2000" dirty="0">
                 <a:solidFill>
                   <a:schemeClr val="accent1"/>
                 </a:solidFill>
@@ -4592,384 +4491,14 @@
                 <a:ea typeface="Fira Code Retina" pitchFamily="49" charset="0"/>
                 <a:cs typeface="Fira Code Retina" pitchFamily="49" charset="0"/>
               </a:rPr>
-              <a:t>surveys[“</a:t>
-            </a:r>
-            <a:r>
-              <a:rPr lang="en-US" sz="1800" dirty="0" err="1">
-                <a:solidFill>
-                  <a:schemeClr val="accent1"/>
-                </a:solidFill>
-                <a:latin typeface="Fira Code Retina" pitchFamily="49" charset="0"/>
-                <a:ea typeface="Fira Code Retina" pitchFamily="49" charset="0"/>
-                <a:cs typeface="Fira Code Retina" pitchFamily="49" charset="0"/>
-              </a:rPr>
-              <a:t>species_id</a:t>
-            </a:r>
-            <a:r>
-              <a:rPr lang="en-US" sz="1800" dirty="0">
-                <a:solidFill>
-                  <a:schemeClr val="accent1"/>
-                </a:solidFill>
-                <a:latin typeface="Fira Code Retina" pitchFamily="49" charset="0"/>
-                <a:ea typeface="Fira Code Retina" pitchFamily="49" charset="0"/>
-                <a:cs typeface="Fira Code Retina" pitchFamily="49" charset="0"/>
-              </a:rPr>
-              <a:t>”]</a:t>
-            </a:r>
-          </a:p>
-          <a:p>
-            <a:pPr marL="0" indent="0">
-              <a:buNone/>
-            </a:pPr>
-            <a:r>
-              <a:rPr lang="en-US" sz="1800" dirty="0">
-                <a:solidFill>
-                  <a:schemeClr val="accent1"/>
-                </a:solidFill>
-                <a:latin typeface="Fira Code Retina" pitchFamily="49" charset="0"/>
-                <a:ea typeface="Fira Code Retina" pitchFamily="49" charset="0"/>
-                <a:cs typeface="Fira Code Retina" pitchFamily="49" charset="0"/>
-              </a:rPr>
-              <a:t>surveys[, “</a:t>
-            </a:r>
-            <a:r>
-              <a:rPr lang="en-US" sz="1800" dirty="0" err="1">
-                <a:solidFill>
-                  <a:schemeClr val="accent1"/>
-                </a:solidFill>
-                <a:latin typeface="Fira Code Retina" pitchFamily="49" charset="0"/>
-                <a:ea typeface="Fira Code Retina" pitchFamily="49" charset="0"/>
-                <a:cs typeface="Fira Code Retina" pitchFamily="49" charset="0"/>
-              </a:rPr>
-              <a:t>species_id</a:t>
-            </a:r>
-            <a:r>
-              <a:rPr lang="en-US" sz="1800" dirty="0">
-                <a:solidFill>
-                  <a:schemeClr val="accent1"/>
-                </a:solidFill>
-                <a:latin typeface="Fira Code Retina" pitchFamily="49" charset="0"/>
-                <a:ea typeface="Fira Code Retina" pitchFamily="49" charset="0"/>
-                <a:cs typeface="Fira Code Retina" pitchFamily="49" charset="0"/>
-              </a:rPr>
-              <a:t>”]</a:t>
-            </a:r>
-          </a:p>
-          <a:p>
-            <a:pPr marL="0" indent="0">
-              <a:buNone/>
-            </a:pPr>
-            <a:r>
-              <a:rPr lang="en-US" sz="1800" dirty="0">
-                <a:solidFill>
-                  <a:schemeClr val="accent1"/>
-                </a:solidFill>
-                <a:latin typeface="Fira Code Retina" pitchFamily="49" charset="0"/>
-                <a:ea typeface="Fira Code Retina" pitchFamily="49" charset="0"/>
-                <a:cs typeface="Fira Code Retina" pitchFamily="49" charset="0"/>
-              </a:rPr>
-              <a:t>surveys[c(“</a:t>
-            </a:r>
-            <a:r>
-              <a:rPr lang="en-US" sz="1800" dirty="0" err="1">
-                <a:solidFill>
-                  <a:schemeClr val="accent1"/>
-                </a:solidFill>
-                <a:latin typeface="Fira Code Retina" pitchFamily="49" charset="0"/>
-                <a:ea typeface="Fira Code Retina" pitchFamily="49" charset="0"/>
-                <a:cs typeface="Fira Code Retina" pitchFamily="49" charset="0"/>
-              </a:rPr>
-              <a:t>species_id</a:t>
-            </a:r>
-            <a:r>
-              <a:rPr lang="en-US" sz="1800" dirty="0">
-                <a:solidFill>
-                  <a:schemeClr val="accent1"/>
-                </a:solidFill>
-                <a:latin typeface="Fira Code Retina" pitchFamily="49" charset="0"/>
-                <a:ea typeface="Fira Code Retina" pitchFamily="49" charset="0"/>
-                <a:cs typeface="Fira Code Retina" pitchFamily="49" charset="0"/>
-              </a:rPr>
-              <a:t>”, “sex”)]</a:t>
-            </a:r>
-          </a:p>
-          <a:p>
-            <a:pPr marL="0" indent="0">
-              <a:buNone/>
-            </a:pPr>
-            <a:r>
-              <a:rPr lang="en-US" sz="1800" dirty="0">
-                <a:solidFill>
-                  <a:schemeClr val="accent1"/>
-                </a:solidFill>
-                <a:latin typeface="Fira Code Retina" pitchFamily="49" charset="0"/>
-                <a:ea typeface="Fira Code Retina" pitchFamily="49" charset="0"/>
-                <a:cs typeface="Fira Code Retina" pitchFamily="49" charset="0"/>
-              </a:rPr>
-              <a:t>surveys[, c(“</a:t>
-            </a:r>
-            <a:r>
-              <a:rPr lang="en-US" sz="1800" dirty="0" err="1">
-                <a:solidFill>
-                  <a:schemeClr val="accent1"/>
-                </a:solidFill>
-                <a:latin typeface="Fira Code Retina" pitchFamily="49" charset="0"/>
-                <a:ea typeface="Fira Code Retina" pitchFamily="49" charset="0"/>
-                <a:cs typeface="Fira Code Retina" pitchFamily="49" charset="0"/>
-              </a:rPr>
-              <a:t>species_id</a:t>
-            </a:r>
-            <a:r>
-              <a:rPr lang="en-US" sz="1800" dirty="0">
-                <a:solidFill>
-                  <a:schemeClr val="accent1"/>
-                </a:solidFill>
-                <a:latin typeface="Fira Code Retina" pitchFamily="49" charset="0"/>
-                <a:ea typeface="Fira Code Retina" pitchFamily="49" charset="0"/>
-                <a:cs typeface="Fira Code Retina" pitchFamily="49" charset="0"/>
-              </a:rPr>
-              <a:t>”, “sex”)]</a:t>
-            </a:r>
-          </a:p>
-          <a:p>
-            <a:pPr marL="0" indent="0">
-              <a:buNone/>
-            </a:pPr>
-            <a:endParaRPr lang="en-US" dirty="0"/>
-          </a:p>
-          <a:p>
-            <a:pPr marL="0" indent="0">
-              <a:buNone/>
-            </a:pPr>
-            <a:endParaRPr lang="en-US" sz="2000" dirty="0">
-              <a:solidFill>
-                <a:schemeClr val="accent1"/>
-              </a:solidFill>
-              <a:latin typeface="Fira Code Retina" pitchFamily="49" charset="0"/>
-              <a:ea typeface="Fira Code Retina" pitchFamily="49" charset="0"/>
-              <a:cs typeface="Fira Code Retina" pitchFamily="49" charset="0"/>
-            </a:endParaRPr>
-          </a:p>
-        </p:txBody>
-      </p:sp>
-      <p:sp>
-        <p:nvSpPr>
-          <p:cNvPr id="4" name="Content Placeholder 2">
-            <a:extLst>
-              <a:ext uri="{FF2B5EF4-FFF2-40B4-BE49-F238E27FC236}">
-                <a16:creationId xmlns:a16="http://schemas.microsoft.com/office/drawing/2014/main" id="{D7D17D75-8498-CB64-33E3-833394E36BA5}"/>
-              </a:ext>
-            </a:extLst>
-          </p:cNvPr>
-          <p:cNvSpPr txBox="1">
-            <a:spLocks/>
-          </p:cNvSpPr>
-          <p:nvPr/>
-        </p:nvSpPr>
-        <p:spPr>
-          <a:xfrm>
-            <a:off x="6172200" y="1825625"/>
-            <a:ext cx="5181600" cy="4351338"/>
-          </a:xfrm>
-          <a:prstGeom prst="rect">
-            <a:avLst/>
-          </a:prstGeom>
-        </p:spPr>
-        <p:txBody>
-          <a:bodyPr/>
-          <a:lstStyle>
-            <a:lvl1pPr marL="228600" indent="-228600" algn="l" defTabSz="914400" rtl="0" eaLnBrk="1" latinLnBrk="0" hangingPunct="1">
-              <a:lnSpc>
-                <a:spcPct val="100000"/>
-              </a:lnSpc>
-              <a:spcBef>
-                <a:spcPts val="1000"/>
-              </a:spcBef>
-              <a:buFont typeface="Arial" panose="020B0604020202020204" pitchFamily="34" charset="0"/>
-              <a:buChar char="•"/>
-              <a:defRPr sz="2400" kern="1200">
-                <a:solidFill>
-                  <a:schemeClr val="tx1">
-                    <a:lumMod val="75000"/>
-                    <a:lumOff val="25000"/>
-                  </a:schemeClr>
-                </a:solidFill>
-                <a:latin typeface="Cambria" panose="02040503050406030204" pitchFamily="18" charset="0"/>
-                <a:ea typeface="+mn-ea"/>
-                <a:cs typeface="+mn-cs"/>
-              </a:defRPr>
-            </a:lvl1pPr>
-            <a:lvl2pPr marL="685800" indent="-228600" algn="l" defTabSz="914400" rtl="0" eaLnBrk="1" latinLnBrk="0" hangingPunct="1">
-              <a:lnSpc>
-                <a:spcPct val="100000"/>
-              </a:lnSpc>
-              <a:spcBef>
-                <a:spcPts val="500"/>
-              </a:spcBef>
-              <a:buFont typeface="Arial" panose="020B0604020202020204" pitchFamily="34" charset="0"/>
-              <a:buChar char="•"/>
-              <a:defRPr sz="2000" kern="1200">
-                <a:solidFill>
-                  <a:schemeClr val="tx1">
-                    <a:lumMod val="75000"/>
-                    <a:lumOff val="25000"/>
-                  </a:schemeClr>
-                </a:solidFill>
-                <a:latin typeface="Cambria" panose="02040503050406030204" pitchFamily="18" charset="0"/>
-                <a:ea typeface="+mn-ea"/>
-                <a:cs typeface="+mn-cs"/>
-              </a:defRPr>
-            </a:lvl2pPr>
-            <a:lvl3pPr marL="1143000" indent="-228600" algn="l" defTabSz="914400" rtl="0" eaLnBrk="1" latinLnBrk="0" hangingPunct="1">
-              <a:lnSpc>
-                <a:spcPct val="100000"/>
-              </a:lnSpc>
-              <a:spcBef>
-                <a:spcPts val="500"/>
-              </a:spcBef>
-              <a:buFont typeface="Arial" panose="020B0604020202020204" pitchFamily="34" charset="0"/>
-              <a:buChar char="•"/>
-              <a:defRPr sz="1800" kern="1200">
-                <a:solidFill>
-                  <a:schemeClr val="tx1">
-                    <a:lumMod val="75000"/>
-                    <a:lumOff val="25000"/>
-                  </a:schemeClr>
-                </a:solidFill>
-                <a:latin typeface="Cambria" panose="02040503050406030204" pitchFamily="18" charset="0"/>
-                <a:ea typeface="+mn-ea"/>
-                <a:cs typeface="+mn-cs"/>
-              </a:defRPr>
-            </a:lvl3pPr>
-            <a:lvl4pPr marL="1600200" indent="-228600" algn="l" defTabSz="914400" rtl="0" eaLnBrk="1" latinLnBrk="0" hangingPunct="1">
-              <a:lnSpc>
-                <a:spcPct val="100000"/>
-              </a:lnSpc>
-              <a:spcBef>
-                <a:spcPts val="500"/>
-              </a:spcBef>
-              <a:buFont typeface="Arial" panose="020B0604020202020204" pitchFamily="34" charset="0"/>
-              <a:buChar char="•"/>
-              <a:defRPr sz="1600" kern="1200">
-                <a:solidFill>
-                  <a:schemeClr val="tx1">
-                    <a:lumMod val="75000"/>
-                    <a:lumOff val="25000"/>
-                  </a:schemeClr>
-                </a:solidFill>
-                <a:latin typeface="Cambria" panose="02040503050406030204" pitchFamily="18" charset="0"/>
-                <a:ea typeface="+mn-ea"/>
-                <a:cs typeface="+mn-cs"/>
-              </a:defRPr>
-            </a:lvl4pPr>
-            <a:lvl5pPr marL="2057400" indent="-228600" algn="l" defTabSz="914400" rtl="0" eaLnBrk="1" latinLnBrk="0" hangingPunct="1">
-              <a:lnSpc>
-                <a:spcPct val="100000"/>
-              </a:lnSpc>
-              <a:spcBef>
-                <a:spcPts val="500"/>
-              </a:spcBef>
-              <a:buFont typeface="Arial" panose="020B0604020202020204" pitchFamily="34" charset="0"/>
-              <a:buChar char="•"/>
-              <a:defRPr sz="1600" kern="1200">
-                <a:solidFill>
-                  <a:schemeClr val="tx1">
-                    <a:lumMod val="75000"/>
-                    <a:lumOff val="25000"/>
-                  </a:schemeClr>
-                </a:solidFill>
-                <a:latin typeface="Cambria" panose="02040503050406030204" pitchFamily="18" charset="0"/>
-                <a:ea typeface="+mn-ea"/>
-                <a:cs typeface="+mn-cs"/>
-              </a:defRPr>
-            </a:lvl5pPr>
-            <a:lvl6pPr marL="2514600" indent="-228600" algn="l" defTabSz="914400" rtl="0" eaLnBrk="1" latinLnBrk="0" hangingPunct="1">
-              <a:lnSpc>
-                <a:spcPct val="90000"/>
-              </a:lnSpc>
-              <a:spcBef>
-                <a:spcPts val="500"/>
-              </a:spcBef>
-              <a:buFont typeface="Arial" panose="020B0604020202020204" pitchFamily="34" charset="0"/>
-              <a:buChar char="•"/>
-              <a:defRPr sz="1800" kern="1200">
-                <a:solidFill>
-                  <a:schemeClr val="tx1"/>
-                </a:solidFill>
-                <a:latin typeface="+mn-lt"/>
-                <a:ea typeface="+mn-ea"/>
-                <a:cs typeface="+mn-cs"/>
-              </a:defRPr>
-            </a:lvl6pPr>
-            <a:lvl7pPr marL="2971800" indent="-228600" algn="l" defTabSz="914400" rtl="0" eaLnBrk="1" latinLnBrk="0" hangingPunct="1">
-              <a:lnSpc>
-                <a:spcPct val="90000"/>
-              </a:lnSpc>
-              <a:spcBef>
-                <a:spcPts val="500"/>
-              </a:spcBef>
-              <a:buFont typeface="Arial" panose="020B0604020202020204" pitchFamily="34" charset="0"/>
-              <a:buChar char="•"/>
-              <a:defRPr sz="1800" kern="1200">
-                <a:solidFill>
-                  <a:schemeClr val="tx1"/>
-                </a:solidFill>
-                <a:latin typeface="+mn-lt"/>
-                <a:ea typeface="+mn-ea"/>
-                <a:cs typeface="+mn-cs"/>
-              </a:defRPr>
-            </a:lvl7pPr>
-            <a:lvl8pPr marL="3429000" indent="-228600" algn="l" defTabSz="914400" rtl="0" eaLnBrk="1" latinLnBrk="0" hangingPunct="1">
-              <a:lnSpc>
-                <a:spcPct val="90000"/>
-              </a:lnSpc>
-              <a:spcBef>
-                <a:spcPts val="500"/>
-              </a:spcBef>
-              <a:buFont typeface="Arial" panose="020B0604020202020204" pitchFamily="34" charset="0"/>
-              <a:buChar char="•"/>
-              <a:defRPr sz="1800" kern="1200">
-                <a:solidFill>
-                  <a:schemeClr val="tx1"/>
-                </a:solidFill>
-                <a:latin typeface="+mn-lt"/>
-                <a:ea typeface="+mn-ea"/>
-                <a:cs typeface="+mn-cs"/>
-              </a:defRPr>
-            </a:lvl8pPr>
-            <a:lvl9pPr marL="3886200" indent="-228600" algn="l" defTabSz="914400" rtl="0" eaLnBrk="1" latinLnBrk="0" hangingPunct="1">
-              <a:lnSpc>
-                <a:spcPct val="90000"/>
-              </a:lnSpc>
-              <a:spcBef>
-                <a:spcPts val="500"/>
-              </a:spcBef>
-              <a:buFont typeface="Arial" panose="020B0604020202020204" pitchFamily="34" charset="0"/>
-              <a:buChar char="•"/>
-              <a:defRPr sz="1800" kern="1200">
-                <a:solidFill>
-                  <a:schemeClr val="tx1"/>
-                </a:solidFill>
-                <a:latin typeface="+mn-lt"/>
-                <a:ea typeface="+mn-ea"/>
-                <a:cs typeface="+mn-cs"/>
-              </a:defRPr>
-            </a:lvl9pPr>
-          </a:lstStyle>
-          <a:p>
-            <a:pPr marL="0" indent="0">
-              <a:buFont typeface="Arial" panose="020B0604020202020204" pitchFamily="34" charset="0"/>
-              <a:buNone/>
-            </a:pPr>
-            <a:r>
-              <a:rPr lang="en-US" dirty="0">
-                <a:ea typeface="Fira Code Retina" pitchFamily="49" charset="0"/>
-                <a:cs typeface="Fira Code Retina" pitchFamily="49" charset="0"/>
-              </a:rPr>
-              <a:t>A few </a:t>
-            </a:r>
-            <a:r>
-              <a:rPr lang="en-US" sz="1800" dirty="0" err="1">
+              <a:t>() </a:t>
+            </a:r>
+            <a:r>
+              <a:rPr lang="en-US" dirty="0"/>
+              <a:t>stores data as </a:t>
+            </a:r>
+            <a:r>
+              <a:rPr lang="en-US" sz="2000" dirty="0" err="1">
                 <a:solidFill>
                   <a:schemeClr val="accent1"/>
                 </a:solidFill>
@@ -4980,89 +4509,91 @@
               <a:t>tibble</a:t>
             </a:r>
             <a:r>
-              <a:rPr lang="en-US" dirty="0">
-                <a:ea typeface="Fira Code Retina" pitchFamily="49" charset="0"/>
-                <a:cs typeface="Fira Code Retina" pitchFamily="49" charset="0"/>
-              </a:rPr>
-              <a:t> rules</a:t>
-            </a:r>
-          </a:p>
-          <a:p>
-            <a:r>
-              <a:rPr lang="en-US" sz="1800" dirty="0">
-                <a:solidFill>
-                  <a:schemeClr val="accent1"/>
-                </a:solidFill>
-                <a:latin typeface="Fira Code Retina" pitchFamily="49" charset="0"/>
-                <a:ea typeface="Fira Code Retina" pitchFamily="49" charset="0"/>
-                <a:cs typeface="Fira Code Retina" pitchFamily="49" charset="0"/>
-              </a:rPr>
-              <a:t>DF[“var”] </a:t>
-            </a:r>
-            <a:r>
               <a:rPr lang="en-US" dirty="0"/>
-              <a:t>single bracket always returns a </a:t>
-            </a:r>
-            <a:r>
-              <a:rPr lang="en-US" dirty="0" err="1"/>
-              <a:t>dataframe</a:t>
-            </a:r>
-            <a:endParaRPr lang="en-US" dirty="0"/>
-          </a:p>
-          <a:p>
-            <a:r>
-              <a:rPr lang="en-US" sz="1800" dirty="0">
-                <a:solidFill>
-                  <a:schemeClr val="accent1"/>
-                </a:solidFill>
-                <a:latin typeface="Fira Code Retina" pitchFamily="49" charset="0"/>
-                <a:ea typeface="Fira Code Retina" pitchFamily="49" charset="0"/>
-                <a:cs typeface="Fira Code Retina" pitchFamily="49" charset="0"/>
-              </a:rPr>
-              <a:t>DF[[“var”]] </a:t>
-            </a:r>
+              <a:t>, a special kind of data frame</a:t>
+            </a:r>
+          </a:p>
+          <a:p>
             <a:r>
               <a:rPr lang="en-US" dirty="0"/>
-              <a:t>double brackets always return a vector</a:t>
-            </a:r>
-          </a:p>
-          <a:p>
-            <a:r>
-              <a:rPr lang="en-US" sz="1800" dirty="0" err="1">
-                <a:solidFill>
-                  <a:schemeClr val="accent1"/>
-                </a:solidFill>
-                <a:latin typeface="Fira Code Retina" pitchFamily="49" charset="0"/>
-                <a:ea typeface="Fira Code Retina" pitchFamily="49" charset="0"/>
-                <a:cs typeface="Fira Code Retina" pitchFamily="49" charset="0"/>
-              </a:rPr>
-              <a:t>DF$var</a:t>
-            </a:r>
-            <a:r>
-              <a:rPr lang="en-US" sz="1800" dirty="0">
-                <a:solidFill>
-                  <a:schemeClr val="accent1"/>
-                </a:solidFill>
-                <a:latin typeface="Fira Code Retina" pitchFamily="49" charset="0"/>
-                <a:ea typeface="Fira Code Retina" pitchFamily="49" charset="0"/>
-                <a:cs typeface="Fira Code Retina" pitchFamily="49" charset="0"/>
-              </a:rPr>
-              <a:t> </a:t>
-            </a:r>
+              <a:t>De facto data structure for most tabular data</a:t>
+            </a:r>
+          </a:p>
+          <a:p>
             <a:r>
               <a:rPr lang="en-US" dirty="0"/>
-              <a:t>returns a vector</a:t>
-            </a:r>
-          </a:p>
-          <a:p>
-            <a:endParaRPr lang="en-US" dirty="0"/>
+              <a:t>Columns are vectors (logical, numeric, character)</a:t>
+            </a:r>
+          </a:p>
+          <a:p>
+            <a:r>
+              <a:rPr lang="en-US" dirty="0"/>
+              <a:t>All vectors have the same length</a:t>
+            </a:r>
+          </a:p>
+        </p:txBody>
+      </p:sp>
+      <p:pic>
+        <p:nvPicPr>
+          <p:cNvPr id="8" name="Content Placeholder 7">
+            <a:extLst>
+              <a:ext uri="{FF2B5EF4-FFF2-40B4-BE49-F238E27FC236}">
+                <a16:creationId xmlns:a16="http://schemas.microsoft.com/office/drawing/2014/main" id="{C00179DF-4262-AF64-ED46-CFABE682950E}"/>
+              </a:ext>
+            </a:extLst>
+          </p:cNvPr>
+          <p:cNvPicPr>
+            <a:picLocks noGrp="1" noChangeAspect="1"/>
+          </p:cNvPicPr>
+          <p:nvPr>
+            <p:ph sz="half" idx="2"/>
+          </p:nvPr>
+        </p:nvPicPr>
+        <p:blipFill>
+          <a:blip r:embed="rId2"/>
+          <a:stretch>
+            <a:fillRect/>
+          </a:stretch>
+        </p:blipFill>
+        <p:spPr>
+          <a:xfrm>
+            <a:off x="6725264" y="2122912"/>
+            <a:ext cx="4628535" cy="2673109"/>
+          </a:xfrm>
+        </p:spPr>
+      </p:pic>
+      <p:sp>
+        <p:nvSpPr>
+          <p:cNvPr id="4" name="Title 3">
+            <a:extLst>
+              <a:ext uri="{FF2B5EF4-FFF2-40B4-BE49-F238E27FC236}">
+                <a16:creationId xmlns:a16="http://schemas.microsoft.com/office/drawing/2014/main" id="{639C6A56-4CBA-CF73-584D-A7946BFF0FEB}"/>
+              </a:ext>
+            </a:extLst>
+          </p:cNvPr>
+          <p:cNvSpPr>
+            <a:spLocks noGrp="1"/>
+          </p:cNvSpPr>
+          <p:nvPr>
+            <p:ph type="title"/>
+          </p:nvPr>
+        </p:nvSpPr>
+        <p:spPr/>
+        <p:txBody>
+          <a:bodyPr/>
+          <a:lstStyle/>
+          <a:p>
+            <a:r>
+              <a:rPr lang="en-US" dirty="0"/>
+              <a:t>Data frames</a:t>
+            </a:r>
           </a:p>
         </p:txBody>
       </p:sp>
     </p:spTree>
     <p:extLst>
       <p:ext uri="{BB962C8B-B14F-4D97-AF65-F5344CB8AC3E}">
-        <p14:creationId xmlns:p14="http://schemas.microsoft.com/office/powerpoint/2010/main" val="793165381"/>
+        <p14:creationId xmlns:p14="http://schemas.microsoft.com/office/powerpoint/2010/main" val="3506141904"/>
       </p:ext>
     </p:extLst>
   </p:cSld>
@@ -5094,6 +4625,642 @@
           <p:cNvPr id="2" name="Title 1">
             <a:extLst>
               <a:ext uri="{FF2B5EF4-FFF2-40B4-BE49-F238E27FC236}">
+                <a16:creationId xmlns:a16="http://schemas.microsoft.com/office/drawing/2014/main" id="{203F859C-A883-940D-4E39-209D4D86BE97}"/>
+              </a:ext>
+            </a:extLst>
+          </p:cNvPr>
+          <p:cNvSpPr>
+            <a:spLocks noGrp="1"/>
+          </p:cNvSpPr>
+          <p:nvPr>
+            <p:ph type="title"/>
+          </p:nvPr>
+        </p:nvSpPr>
+        <p:spPr/>
+        <p:txBody>
+          <a:bodyPr/>
+          <a:lstStyle/>
+          <a:p>
+            <a:r>
+              <a:rPr lang="en-US" dirty="0" err="1"/>
+              <a:t>Subsetting</a:t>
+            </a:r>
+            <a:r>
+              <a:rPr lang="en-US" dirty="0"/>
+              <a:t> data frames</a:t>
+            </a:r>
+          </a:p>
+        </p:txBody>
+      </p:sp>
+      <p:sp>
+        <p:nvSpPr>
+          <p:cNvPr id="3" name="Content Placeholder 2">
+            <a:extLst>
+              <a:ext uri="{FF2B5EF4-FFF2-40B4-BE49-F238E27FC236}">
+                <a16:creationId xmlns:a16="http://schemas.microsoft.com/office/drawing/2014/main" id="{06C34019-9D82-E39D-AE68-ACFE3FB3D86A}"/>
+              </a:ext>
+            </a:extLst>
+          </p:cNvPr>
+          <p:cNvSpPr>
+            <a:spLocks noGrp="1"/>
+          </p:cNvSpPr>
+          <p:nvPr>
+            <p:ph idx="1"/>
+          </p:nvPr>
+        </p:nvSpPr>
+        <p:spPr/>
+        <p:txBody>
+          <a:bodyPr/>
+          <a:lstStyle/>
+          <a:p>
+            <a:pPr marL="0" indent="0">
+              <a:buNone/>
+            </a:pPr>
+            <a:r>
+              <a:rPr lang="en-US" dirty="0"/>
+              <a:t>Two ways of </a:t>
+            </a:r>
+            <a:r>
+              <a:rPr lang="en-US" dirty="0" err="1"/>
+              <a:t>subsetting</a:t>
+            </a:r>
+            <a:r>
+              <a:rPr lang="en-US" dirty="0"/>
+              <a:t> a </a:t>
+            </a:r>
+            <a:r>
+              <a:rPr lang="en-US" dirty="0" err="1"/>
+              <a:t>dataframe</a:t>
+            </a:r>
+            <a:r>
+              <a:rPr lang="en-US" dirty="0"/>
+              <a:t>:</a:t>
+            </a:r>
+          </a:p>
+          <a:p>
+            <a:pPr marL="457200" indent="-457200">
+              <a:buFont typeface="+mj-lt"/>
+              <a:buAutoNum type="arabicPeriod"/>
+            </a:pPr>
+            <a:r>
+              <a:rPr lang="en-US" dirty="0"/>
+              <a:t>By indices of rows and columns</a:t>
+            </a:r>
+          </a:p>
+          <a:p>
+            <a:pPr marL="0" indent="0">
+              <a:buNone/>
+            </a:pPr>
+            <a:r>
+              <a:rPr lang="en-US" sz="1800" dirty="0">
+                <a:solidFill>
+                  <a:schemeClr val="accent1"/>
+                </a:solidFill>
+                <a:latin typeface="Fira Code Retina" pitchFamily="49" charset="0"/>
+                <a:ea typeface="Fira Code Retina" pitchFamily="49" charset="0"/>
+                <a:cs typeface="Fira Code Retina" pitchFamily="49" charset="0"/>
+              </a:rPr>
+              <a:t>DF[row, column]</a:t>
+            </a:r>
+          </a:p>
+          <a:p>
+            <a:pPr marL="0" indent="0">
+              <a:buNone/>
+            </a:pPr>
+            <a:endParaRPr lang="en-US" sz="2000" dirty="0">
+              <a:solidFill>
+                <a:schemeClr val="accent1"/>
+              </a:solidFill>
+              <a:latin typeface="Fira Code Retina" pitchFamily="49" charset="0"/>
+              <a:ea typeface="Fira Code Retina" pitchFamily="49" charset="0"/>
+              <a:cs typeface="Fira Code Retina" pitchFamily="49" charset="0"/>
+            </a:endParaRPr>
+          </a:p>
+          <a:p>
+            <a:pPr marL="457200" indent="-457200">
+              <a:buFont typeface="+mj-lt"/>
+              <a:buAutoNum type="arabicPeriod" startAt="2"/>
+            </a:pPr>
+            <a:r>
+              <a:rPr lang="en-US" dirty="0"/>
+              <a:t>Column names</a:t>
+            </a:r>
+          </a:p>
+          <a:p>
+            <a:pPr marL="0" indent="0">
+              <a:buNone/>
+            </a:pPr>
+            <a:r>
+              <a:rPr lang="en-US" sz="1800" dirty="0">
+                <a:solidFill>
+                  <a:schemeClr val="accent1"/>
+                </a:solidFill>
+                <a:latin typeface="Fira Code Retina" pitchFamily="49" charset="0"/>
+                <a:ea typeface="Fira Code Retina" pitchFamily="49" charset="0"/>
+                <a:cs typeface="Fira Code Retina" pitchFamily="49" charset="0"/>
+              </a:rPr>
+              <a:t>surveys[“</a:t>
+            </a:r>
+            <a:r>
+              <a:rPr lang="en-US" sz="1800" dirty="0" err="1">
+                <a:solidFill>
+                  <a:schemeClr val="accent1"/>
+                </a:solidFill>
+                <a:latin typeface="Fira Code Retina" pitchFamily="49" charset="0"/>
+                <a:ea typeface="Fira Code Retina" pitchFamily="49" charset="0"/>
+                <a:cs typeface="Fira Code Retina" pitchFamily="49" charset="0"/>
+              </a:rPr>
+              <a:t>species_id</a:t>
+            </a:r>
+            <a:r>
+              <a:rPr lang="en-US" sz="1800" dirty="0">
+                <a:solidFill>
+                  <a:schemeClr val="accent1"/>
+                </a:solidFill>
+                <a:latin typeface="Fira Code Retina" pitchFamily="49" charset="0"/>
+                <a:ea typeface="Fira Code Retina" pitchFamily="49" charset="0"/>
+                <a:cs typeface="Fira Code Retina" pitchFamily="49" charset="0"/>
+              </a:rPr>
+              <a:t>”]</a:t>
+            </a:r>
+          </a:p>
+          <a:p>
+            <a:pPr marL="0" indent="0">
+              <a:buNone/>
+            </a:pPr>
+            <a:r>
+              <a:rPr lang="en-US" sz="1800" dirty="0">
+                <a:solidFill>
+                  <a:schemeClr val="accent1"/>
+                </a:solidFill>
+                <a:latin typeface="Fira Code Retina" pitchFamily="49" charset="0"/>
+                <a:ea typeface="Fira Code Retina" pitchFamily="49" charset="0"/>
+                <a:cs typeface="Fira Code Retina" pitchFamily="49" charset="0"/>
+              </a:rPr>
+              <a:t>surveys[, “</a:t>
+            </a:r>
+            <a:r>
+              <a:rPr lang="en-US" sz="1800" dirty="0" err="1">
+                <a:solidFill>
+                  <a:schemeClr val="accent1"/>
+                </a:solidFill>
+                <a:latin typeface="Fira Code Retina" pitchFamily="49" charset="0"/>
+                <a:ea typeface="Fira Code Retina" pitchFamily="49" charset="0"/>
+                <a:cs typeface="Fira Code Retina" pitchFamily="49" charset="0"/>
+              </a:rPr>
+              <a:t>species_id</a:t>
+            </a:r>
+            <a:r>
+              <a:rPr lang="en-US" sz="1800" dirty="0">
+                <a:solidFill>
+                  <a:schemeClr val="accent1"/>
+                </a:solidFill>
+                <a:latin typeface="Fira Code Retina" pitchFamily="49" charset="0"/>
+                <a:ea typeface="Fira Code Retina" pitchFamily="49" charset="0"/>
+                <a:cs typeface="Fira Code Retina" pitchFamily="49" charset="0"/>
+              </a:rPr>
+              <a:t>”]</a:t>
+            </a:r>
+          </a:p>
+          <a:p>
+            <a:pPr marL="0" indent="0">
+              <a:buNone/>
+            </a:pPr>
+            <a:r>
+              <a:rPr lang="en-US" sz="1800" dirty="0">
+                <a:solidFill>
+                  <a:schemeClr val="accent1"/>
+                </a:solidFill>
+                <a:latin typeface="Fira Code Retina" pitchFamily="49" charset="0"/>
+                <a:ea typeface="Fira Code Retina" pitchFamily="49" charset="0"/>
+                <a:cs typeface="Fira Code Retina" pitchFamily="49" charset="0"/>
+              </a:rPr>
+              <a:t>surveys[c(“</a:t>
+            </a:r>
+            <a:r>
+              <a:rPr lang="en-US" sz="1800" dirty="0" err="1">
+                <a:solidFill>
+                  <a:schemeClr val="accent1"/>
+                </a:solidFill>
+                <a:latin typeface="Fira Code Retina" pitchFamily="49" charset="0"/>
+                <a:ea typeface="Fira Code Retina" pitchFamily="49" charset="0"/>
+                <a:cs typeface="Fira Code Retina" pitchFamily="49" charset="0"/>
+              </a:rPr>
+              <a:t>species_id</a:t>
+            </a:r>
+            <a:r>
+              <a:rPr lang="en-US" sz="1800" dirty="0">
+                <a:solidFill>
+                  <a:schemeClr val="accent1"/>
+                </a:solidFill>
+                <a:latin typeface="Fira Code Retina" pitchFamily="49" charset="0"/>
+                <a:ea typeface="Fira Code Retina" pitchFamily="49" charset="0"/>
+                <a:cs typeface="Fira Code Retina" pitchFamily="49" charset="0"/>
+              </a:rPr>
+              <a:t>”, “sex”)]</a:t>
+            </a:r>
+          </a:p>
+          <a:p>
+            <a:pPr marL="0" indent="0">
+              <a:buNone/>
+            </a:pPr>
+            <a:r>
+              <a:rPr lang="en-US" sz="1800" dirty="0">
+                <a:solidFill>
+                  <a:schemeClr val="accent1"/>
+                </a:solidFill>
+                <a:latin typeface="Fira Code Retina" pitchFamily="49" charset="0"/>
+                <a:ea typeface="Fira Code Retina" pitchFamily="49" charset="0"/>
+                <a:cs typeface="Fira Code Retina" pitchFamily="49" charset="0"/>
+              </a:rPr>
+              <a:t>surveys[, c(“</a:t>
+            </a:r>
+            <a:r>
+              <a:rPr lang="en-US" sz="1800" dirty="0" err="1">
+                <a:solidFill>
+                  <a:schemeClr val="accent1"/>
+                </a:solidFill>
+                <a:latin typeface="Fira Code Retina" pitchFamily="49" charset="0"/>
+                <a:ea typeface="Fira Code Retina" pitchFamily="49" charset="0"/>
+                <a:cs typeface="Fira Code Retina" pitchFamily="49" charset="0"/>
+              </a:rPr>
+              <a:t>species_id</a:t>
+            </a:r>
+            <a:r>
+              <a:rPr lang="en-US" sz="1800" dirty="0">
+                <a:solidFill>
+                  <a:schemeClr val="accent1"/>
+                </a:solidFill>
+                <a:latin typeface="Fira Code Retina" pitchFamily="49" charset="0"/>
+                <a:ea typeface="Fira Code Retina" pitchFamily="49" charset="0"/>
+                <a:cs typeface="Fira Code Retina" pitchFamily="49" charset="0"/>
+              </a:rPr>
+              <a:t>”, “sex”)]</a:t>
+            </a:r>
+          </a:p>
+          <a:p>
+            <a:pPr marL="0" indent="0">
+              <a:buNone/>
+            </a:pPr>
+            <a:endParaRPr lang="en-US" dirty="0"/>
+          </a:p>
+          <a:p>
+            <a:pPr marL="0" indent="0">
+              <a:buNone/>
+            </a:pPr>
+            <a:endParaRPr lang="en-US" sz="2000" dirty="0">
+              <a:solidFill>
+                <a:schemeClr val="accent1"/>
+              </a:solidFill>
+              <a:latin typeface="Fira Code Retina" pitchFamily="49" charset="0"/>
+              <a:ea typeface="Fira Code Retina" pitchFamily="49" charset="0"/>
+              <a:cs typeface="Fira Code Retina" pitchFamily="49" charset="0"/>
+            </a:endParaRPr>
+          </a:p>
+        </p:txBody>
+      </p:sp>
+      <p:sp>
+        <p:nvSpPr>
+          <p:cNvPr id="4" name="Content Placeholder 2">
+            <a:extLst>
+              <a:ext uri="{FF2B5EF4-FFF2-40B4-BE49-F238E27FC236}">
+                <a16:creationId xmlns:a16="http://schemas.microsoft.com/office/drawing/2014/main" id="{D7D17D75-8498-CB64-33E3-833394E36BA5}"/>
+              </a:ext>
+            </a:extLst>
+          </p:cNvPr>
+          <p:cNvSpPr txBox="1">
+            <a:spLocks/>
+          </p:cNvSpPr>
+          <p:nvPr/>
+        </p:nvSpPr>
+        <p:spPr>
+          <a:xfrm>
+            <a:off x="6172200" y="1825625"/>
+            <a:ext cx="5181600" cy="4351338"/>
+          </a:xfrm>
+          <a:prstGeom prst="rect">
+            <a:avLst/>
+          </a:prstGeom>
+        </p:spPr>
+        <p:txBody>
+          <a:bodyPr/>
+          <a:lstStyle>
+            <a:lvl1pPr marL="228600" indent="-228600" algn="l" defTabSz="914400" rtl="0" eaLnBrk="1" latinLnBrk="0" hangingPunct="1">
+              <a:lnSpc>
+                <a:spcPct val="100000"/>
+              </a:lnSpc>
+              <a:spcBef>
+                <a:spcPts val="1000"/>
+              </a:spcBef>
+              <a:buFont typeface="Arial" panose="020B0604020202020204" pitchFamily="34" charset="0"/>
+              <a:buChar char="•"/>
+              <a:defRPr sz="2400" kern="1200">
+                <a:solidFill>
+                  <a:schemeClr val="tx1">
+                    <a:lumMod val="75000"/>
+                    <a:lumOff val="25000"/>
+                  </a:schemeClr>
+                </a:solidFill>
+                <a:latin typeface="Cambria" panose="02040503050406030204" pitchFamily="18" charset="0"/>
+                <a:ea typeface="+mn-ea"/>
+                <a:cs typeface="+mn-cs"/>
+              </a:defRPr>
+            </a:lvl1pPr>
+            <a:lvl2pPr marL="685800" indent="-228600" algn="l" defTabSz="914400" rtl="0" eaLnBrk="1" latinLnBrk="0" hangingPunct="1">
+              <a:lnSpc>
+                <a:spcPct val="100000"/>
+              </a:lnSpc>
+              <a:spcBef>
+                <a:spcPts val="500"/>
+              </a:spcBef>
+              <a:buFont typeface="Arial" panose="020B0604020202020204" pitchFamily="34" charset="0"/>
+              <a:buChar char="•"/>
+              <a:defRPr sz="2000" kern="1200">
+                <a:solidFill>
+                  <a:schemeClr val="tx1">
+                    <a:lumMod val="75000"/>
+                    <a:lumOff val="25000"/>
+                  </a:schemeClr>
+                </a:solidFill>
+                <a:latin typeface="Cambria" panose="02040503050406030204" pitchFamily="18" charset="0"/>
+                <a:ea typeface="+mn-ea"/>
+                <a:cs typeface="+mn-cs"/>
+              </a:defRPr>
+            </a:lvl2pPr>
+            <a:lvl3pPr marL="1143000" indent="-228600" algn="l" defTabSz="914400" rtl="0" eaLnBrk="1" latinLnBrk="0" hangingPunct="1">
+              <a:lnSpc>
+                <a:spcPct val="100000"/>
+              </a:lnSpc>
+              <a:spcBef>
+                <a:spcPts val="500"/>
+              </a:spcBef>
+              <a:buFont typeface="Arial" panose="020B0604020202020204" pitchFamily="34" charset="0"/>
+              <a:buChar char="•"/>
+              <a:defRPr sz="1800" kern="1200">
+                <a:solidFill>
+                  <a:schemeClr val="tx1">
+                    <a:lumMod val="75000"/>
+                    <a:lumOff val="25000"/>
+                  </a:schemeClr>
+                </a:solidFill>
+                <a:latin typeface="Cambria" panose="02040503050406030204" pitchFamily="18" charset="0"/>
+                <a:ea typeface="+mn-ea"/>
+                <a:cs typeface="+mn-cs"/>
+              </a:defRPr>
+            </a:lvl3pPr>
+            <a:lvl4pPr marL="1600200" indent="-228600" algn="l" defTabSz="914400" rtl="0" eaLnBrk="1" latinLnBrk="0" hangingPunct="1">
+              <a:lnSpc>
+                <a:spcPct val="100000"/>
+              </a:lnSpc>
+              <a:spcBef>
+                <a:spcPts val="500"/>
+              </a:spcBef>
+              <a:buFont typeface="Arial" panose="020B0604020202020204" pitchFamily="34" charset="0"/>
+              <a:buChar char="•"/>
+              <a:defRPr sz="1600" kern="1200">
+                <a:solidFill>
+                  <a:schemeClr val="tx1">
+                    <a:lumMod val="75000"/>
+                    <a:lumOff val="25000"/>
+                  </a:schemeClr>
+                </a:solidFill>
+                <a:latin typeface="Cambria" panose="02040503050406030204" pitchFamily="18" charset="0"/>
+                <a:ea typeface="+mn-ea"/>
+                <a:cs typeface="+mn-cs"/>
+              </a:defRPr>
+            </a:lvl4pPr>
+            <a:lvl5pPr marL="2057400" indent="-228600" algn="l" defTabSz="914400" rtl="0" eaLnBrk="1" latinLnBrk="0" hangingPunct="1">
+              <a:lnSpc>
+                <a:spcPct val="100000"/>
+              </a:lnSpc>
+              <a:spcBef>
+                <a:spcPts val="500"/>
+              </a:spcBef>
+              <a:buFont typeface="Arial" panose="020B0604020202020204" pitchFamily="34" charset="0"/>
+              <a:buChar char="•"/>
+              <a:defRPr sz="1600" kern="1200">
+                <a:solidFill>
+                  <a:schemeClr val="tx1">
+                    <a:lumMod val="75000"/>
+                    <a:lumOff val="25000"/>
+                  </a:schemeClr>
+                </a:solidFill>
+                <a:latin typeface="Cambria" panose="02040503050406030204" pitchFamily="18" charset="0"/>
+                <a:ea typeface="+mn-ea"/>
+                <a:cs typeface="+mn-cs"/>
+              </a:defRPr>
+            </a:lvl5pPr>
+            <a:lvl6pPr marL="2514600" indent="-228600" algn="l" defTabSz="914400" rtl="0" eaLnBrk="1" latinLnBrk="0" hangingPunct="1">
+              <a:lnSpc>
+                <a:spcPct val="90000"/>
+              </a:lnSpc>
+              <a:spcBef>
+                <a:spcPts val="500"/>
+              </a:spcBef>
+              <a:buFont typeface="Arial" panose="020B0604020202020204" pitchFamily="34" charset="0"/>
+              <a:buChar char="•"/>
+              <a:defRPr sz="1800" kern="1200">
+                <a:solidFill>
+                  <a:schemeClr val="tx1"/>
+                </a:solidFill>
+                <a:latin typeface="+mn-lt"/>
+                <a:ea typeface="+mn-ea"/>
+                <a:cs typeface="+mn-cs"/>
+              </a:defRPr>
+            </a:lvl6pPr>
+            <a:lvl7pPr marL="2971800" indent="-228600" algn="l" defTabSz="914400" rtl="0" eaLnBrk="1" latinLnBrk="0" hangingPunct="1">
+              <a:lnSpc>
+                <a:spcPct val="90000"/>
+              </a:lnSpc>
+              <a:spcBef>
+                <a:spcPts val="500"/>
+              </a:spcBef>
+              <a:buFont typeface="Arial" panose="020B0604020202020204" pitchFamily="34" charset="0"/>
+              <a:buChar char="•"/>
+              <a:defRPr sz="1800" kern="1200">
+                <a:solidFill>
+                  <a:schemeClr val="tx1"/>
+                </a:solidFill>
+                <a:latin typeface="+mn-lt"/>
+                <a:ea typeface="+mn-ea"/>
+                <a:cs typeface="+mn-cs"/>
+              </a:defRPr>
+            </a:lvl7pPr>
+            <a:lvl8pPr marL="3429000" indent="-228600" algn="l" defTabSz="914400" rtl="0" eaLnBrk="1" latinLnBrk="0" hangingPunct="1">
+              <a:lnSpc>
+                <a:spcPct val="90000"/>
+              </a:lnSpc>
+              <a:spcBef>
+                <a:spcPts val="500"/>
+              </a:spcBef>
+              <a:buFont typeface="Arial" panose="020B0604020202020204" pitchFamily="34" charset="0"/>
+              <a:buChar char="•"/>
+              <a:defRPr sz="1800" kern="1200">
+                <a:solidFill>
+                  <a:schemeClr val="tx1"/>
+                </a:solidFill>
+                <a:latin typeface="+mn-lt"/>
+                <a:ea typeface="+mn-ea"/>
+                <a:cs typeface="+mn-cs"/>
+              </a:defRPr>
+            </a:lvl8pPr>
+            <a:lvl9pPr marL="3886200" indent="-228600" algn="l" defTabSz="914400" rtl="0" eaLnBrk="1" latinLnBrk="0" hangingPunct="1">
+              <a:lnSpc>
+                <a:spcPct val="90000"/>
+              </a:lnSpc>
+              <a:spcBef>
+                <a:spcPts val="500"/>
+              </a:spcBef>
+              <a:buFont typeface="Arial" panose="020B0604020202020204" pitchFamily="34" charset="0"/>
+              <a:buChar char="•"/>
+              <a:defRPr sz="1800" kern="1200">
+                <a:solidFill>
+                  <a:schemeClr val="tx1"/>
+                </a:solidFill>
+                <a:latin typeface="+mn-lt"/>
+                <a:ea typeface="+mn-ea"/>
+                <a:cs typeface="+mn-cs"/>
+              </a:defRPr>
+            </a:lvl9pPr>
+          </a:lstStyle>
+          <a:p>
+            <a:pPr marL="0" indent="0">
+              <a:buFont typeface="Arial" panose="020B0604020202020204" pitchFamily="34" charset="0"/>
+              <a:buNone/>
+            </a:pPr>
+            <a:r>
+              <a:rPr lang="en-US" dirty="0">
+                <a:ea typeface="Fira Code Retina" pitchFamily="49" charset="0"/>
+                <a:cs typeface="Fira Code Retina" pitchFamily="49" charset="0"/>
+              </a:rPr>
+              <a:t>A few </a:t>
+            </a:r>
+            <a:r>
+              <a:rPr lang="en-US" sz="1800" dirty="0" err="1">
+                <a:solidFill>
+                  <a:schemeClr val="accent1"/>
+                </a:solidFill>
+                <a:latin typeface="Fira Code Retina" pitchFamily="49" charset="0"/>
+                <a:ea typeface="Fira Code Retina" pitchFamily="49" charset="0"/>
+                <a:cs typeface="Fira Code Retina" pitchFamily="49" charset="0"/>
+              </a:rPr>
+              <a:t>tibble</a:t>
+            </a:r>
+            <a:r>
+              <a:rPr lang="en-US" dirty="0">
+                <a:ea typeface="Fira Code Retina" pitchFamily="49" charset="0"/>
+                <a:cs typeface="Fira Code Retina" pitchFamily="49" charset="0"/>
+              </a:rPr>
+              <a:t> rules</a:t>
+            </a:r>
+          </a:p>
+          <a:p>
+            <a:r>
+              <a:rPr lang="en-US" sz="1800" dirty="0">
+                <a:solidFill>
+                  <a:schemeClr val="accent1"/>
+                </a:solidFill>
+                <a:latin typeface="Fira Code Retina" pitchFamily="49" charset="0"/>
+                <a:ea typeface="Fira Code Retina" pitchFamily="49" charset="0"/>
+                <a:cs typeface="Fira Code Retina" pitchFamily="49" charset="0"/>
+              </a:rPr>
+              <a:t>DF[“var”] </a:t>
+            </a:r>
+            <a:r>
+              <a:rPr lang="en-US" dirty="0"/>
+              <a:t>single bracket always returns a </a:t>
+            </a:r>
+            <a:r>
+              <a:rPr lang="en-US" dirty="0" err="1"/>
+              <a:t>dataframe</a:t>
+            </a:r>
+            <a:endParaRPr lang="en-US" dirty="0"/>
+          </a:p>
+          <a:p>
+            <a:r>
+              <a:rPr lang="en-US" sz="1800" dirty="0">
+                <a:solidFill>
+                  <a:schemeClr val="accent1"/>
+                </a:solidFill>
+                <a:latin typeface="Fira Code Retina" pitchFamily="49" charset="0"/>
+                <a:ea typeface="Fira Code Retina" pitchFamily="49" charset="0"/>
+                <a:cs typeface="Fira Code Retina" pitchFamily="49" charset="0"/>
+              </a:rPr>
+              <a:t>DF[[“var”]] </a:t>
+            </a:r>
+            <a:r>
+              <a:rPr lang="en-US" dirty="0"/>
+              <a:t>double brackets always return a vector</a:t>
+            </a:r>
+          </a:p>
+          <a:p>
+            <a:r>
+              <a:rPr lang="en-US" sz="1800" dirty="0" err="1">
+                <a:solidFill>
+                  <a:schemeClr val="accent1"/>
+                </a:solidFill>
+                <a:latin typeface="Fira Code Retina" pitchFamily="49" charset="0"/>
+                <a:ea typeface="Fira Code Retina" pitchFamily="49" charset="0"/>
+                <a:cs typeface="Fira Code Retina" pitchFamily="49" charset="0"/>
+              </a:rPr>
+              <a:t>DF$var</a:t>
+            </a:r>
+            <a:r>
+              <a:rPr lang="en-US" sz="1800" dirty="0">
+                <a:solidFill>
+                  <a:schemeClr val="accent1"/>
+                </a:solidFill>
+                <a:latin typeface="Fira Code Retina" pitchFamily="49" charset="0"/>
+                <a:ea typeface="Fira Code Retina" pitchFamily="49" charset="0"/>
+                <a:cs typeface="Fira Code Retina" pitchFamily="49" charset="0"/>
+              </a:rPr>
+              <a:t> </a:t>
+            </a:r>
+            <a:r>
+              <a:rPr lang="en-US" dirty="0"/>
+              <a:t>returns a vector</a:t>
+            </a:r>
+          </a:p>
+          <a:p>
+            <a:endParaRPr lang="en-US" dirty="0"/>
+          </a:p>
+        </p:txBody>
+      </p:sp>
+    </p:spTree>
+    <p:extLst>
+      <p:ext uri="{BB962C8B-B14F-4D97-AF65-F5344CB8AC3E}">
+        <p14:creationId xmlns:p14="http://schemas.microsoft.com/office/powerpoint/2010/main" val="793165381"/>
+      </p:ext>
+    </p:extLst>
+  </p:cSld>
+  <p:clrMapOvr>
+    <a:masterClrMapping/>
+  </p:clrMapOvr>
+</p:sld>
+</file>
+
+<file path=ppt/slides/slide6.xml><?xml version="1.0" encoding="utf-8"?>
+<p:sld xmlns:a="http://schemas.openxmlformats.org/drawingml/2006/main" xmlns:r="http://schemas.openxmlformats.org/officeDocument/2006/relationships" xmlns:p="http://schemas.openxmlformats.org/presentationml/2006/main">
+  <p:cSld>
+    <p:spTree>
+      <p:nvGrpSpPr>
+        <p:cNvPr id="1" name=""/>
+        <p:cNvGrpSpPr/>
+        <p:nvPr/>
+      </p:nvGrpSpPr>
+      <p:grpSpPr>
+        <a:xfrm>
+          <a:off x="0" y="0"/>
+          <a:ext cx="0" cy="0"/>
+          <a:chOff x="0" y="0"/>
+          <a:chExt cx="0" cy="0"/>
+        </a:xfrm>
+      </p:grpSpPr>
+      <p:sp>
+        <p:nvSpPr>
+          <p:cNvPr id="2" name="Title 1">
+            <a:extLst>
+              <a:ext uri="{FF2B5EF4-FFF2-40B4-BE49-F238E27FC236}">
                 <a16:creationId xmlns:a16="http://schemas.microsoft.com/office/drawing/2014/main" id="{D387C49B-A029-4FD0-09AD-145E3A8A7C2E}"/>
               </a:ext>
             </a:extLst>
@@ -5253,7 +5420,7 @@
 </p:sld>
 </file>
 
-<file path=ppt/slides/slide6.xml><?xml version="1.0" encoding="utf-8"?>
+<file path=ppt/slides/slide7.xml><?xml version="1.0" encoding="utf-8"?>
 <p:sld xmlns:a="http://schemas.openxmlformats.org/drawingml/2006/main" xmlns:r="http://schemas.openxmlformats.org/officeDocument/2006/relationships" xmlns:p="http://schemas.openxmlformats.org/presentationml/2006/main">
   <p:cSld>
     <p:spTree>

</xml_diff>

<commit_message>
update 02_starting_with_data after the zoom session
</commit_message>
<xml_diff>
--- a/ex/02_starting_with_data.pptx
+++ b/ex/02_starting_with_data.pptx
@@ -4011,7 +4011,16 @@
               <a:buNone/>
             </a:pPr>
             <a:r>
-              <a:t>R Clud: Starting with data</a:t>
+              <a:rPr dirty="0"/>
+              <a:t>R Clu</a:t>
+            </a:r>
+            <a:r>
+              <a:rPr lang="en-US" dirty="0"/>
+              <a:t>b</a:t>
+            </a:r>
+            <a:r>
+              <a:rPr dirty="0"/>
+              <a:t>: Starting with data</a:t>
             </a:r>
           </a:p>
         </p:txBody>

</xml_diff>

<commit_message>
update after the session on 20 March
</commit_message>
<xml_diff>
--- a/ex/02_starting_with_data.pptx
+++ b/ex/02_starting_with_data.pptx
@@ -339,7 +339,7 @@
           <a:p>
             <a:fld id="{5FCDCD17-B0B1-A244-9BB5-D7228F76BED7}" type="datetime3">
               <a:rPr lang="en-SG" smtClean="0"/>
-              <a:t>27 February 2023</a:t>
+              <a:t>6 March 2023</a:t>
             </a:fld>
             <a:endParaRPr lang="en-US" dirty="0"/>
           </a:p>
@@ -707,7 +707,7 @@
           <a:p>
             <a:fld id="{ADD28603-00EC-3A4D-B44A-BEF0A0F382C6}" type="datetime3">
               <a:rPr lang="en-SG" smtClean="0"/>
-              <a:t>27 February 2023</a:t>
+              <a:t>6 March 2023</a:t>
             </a:fld>
             <a:endParaRPr lang="en-US"/>
           </a:p>
@@ -1105,7 +1105,7 @@
           <a:p>
             <a:fld id="{E6645DC1-DD2E-5147-813A-145518F6A88E}" type="datetime3">
               <a:rPr lang="en-SG" smtClean="0"/>
-              <a:t>27 February 2023</a:t>
+              <a:t>6 March 2023</a:t>
             </a:fld>
             <a:endParaRPr lang="en-US"/>
           </a:p>
@@ -1406,7 +1406,7 @@
           <a:p>
             <a:fld id="{9CE5D27D-0906-C849-85EF-1698976BF415}" type="datetime3">
               <a:rPr lang="en-SG" smtClean="0"/>
-              <a:t>27 February 2023</a:t>
+              <a:t>6 March 2023</a:t>
             </a:fld>
             <a:endParaRPr lang="en-US"/>
           </a:p>
@@ -1984,7 +1984,7 @@
           <a:p>
             <a:fld id="{B644A007-AED7-CC4E-A6C9-9429041AE4C9}" type="datetime3">
               <a:rPr lang="en-SG" smtClean="0"/>
-              <a:t>27 February 2023</a:t>
+              <a:t>6 March 2023</a:t>
             </a:fld>
             <a:endParaRPr lang="en-US"/>
           </a:p>
@@ -2392,7 +2392,7 @@
           <a:p>
             <a:fld id="{06911E40-0033-E74E-A93D-D0B3F4840C2B}" type="datetime3">
               <a:rPr lang="en-SG" smtClean="0"/>
-              <a:t>27 February 2023</a:t>
+              <a:t>6 March 2023</a:t>
             </a:fld>
             <a:endParaRPr lang="en-US"/>
           </a:p>
@@ -2605,7 +2605,7 @@
           <a:p>
             <a:fld id="{FDD5ADF8-FB30-A140-BC76-B82B3346A618}" type="datetime3">
               <a:rPr lang="en-SG" smtClean="0"/>
-              <a:t>27 February 2023</a:t>
+              <a:t>6 March 2023</a:t>
             </a:fld>
             <a:endParaRPr lang="en-US"/>
           </a:p>
@@ -2948,7 +2948,7 @@
           <a:p>
             <a:fld id="{2EF13291-2998-1E45-BB6C-14491E304C83}" type="datetime3">
               <a:rPr lang="en-SG" smtClean="0"/>
-              <a:t>27 February 2023</a:t>
+              <a:t>6 March 2023</a:t>
             </a:fld>
             <a:endParaRPr lang="en-US"/>
           </a:p>
@@ -3267,7 +3267,7 @@
           <a:p>
             <a:fld id="{7BDC71DE-80FC-B640-A19E-6715081E17F0}" type="datetime3">
               <a:rPr lang="en-SG" smtClean="0"/>
-              <a:t>27 February 2023</a:t>
+              <a:t>6 March 2023</a:t>
             </a:fld>
             <a:endParaRPr lang="en-US"/>
           </a:p>
@@ -3542,7 +3542,7 @@
           <a:p>
             <a:fld id="{39E2CDA4-D7DD-D048-900A-DFEB5E81218B}" type="datetime3">
               <a:rPr lang="en-SG" smtClean="0"/>
-              <a:t>27 February 2023</a:t>
+              <a:t>6 March 2023</a:t>
             </a:fld>
             <a:endParaRPr lang="en-US" dirty="0"/>
           </a:p>
@@ -5476,10 +5476,42 @@
               <a:t>Installed as part of </a:t>
             </a:r>
             <a:r>
-              <a:rPr lang="en-US" dirty="0" err="1"/>
+              <a:rPr lang="en-US" dirty="0" err="1">
+                <a:solidFill>
+                  <a:schemeClr val="accent1"/>
+                </a:solidFill>
+                <a:latin typeface="Fira Code Retina" pitchFamily="49" charset="0"/>
+                <a:ea typeface="Fira Code Retina" pitchFamily="49" charset="0"/>
+                <a:cs typeface="Fira Code Retina" pitchFamily="49" charset="0"/>
+              </a:rPr>
               <a:t>tidyverse</a:t>
             </a:r>
-            <a:endParaRPr lang="en-US" dirty="0"/>
+            <a:r>
+              <a:rPr lang="en-US" dirty="0"/>
+              <a:t> </a:t>
+            </a:r>
+          </a:p>
+          <a:p>
+            <a:pPr lvl="1"/>
+            <a:r>
+              <a:rPr lang="en-US" dirty="0"/>
+              <a:t>Not loaded when loading </a:t>
+            </a:r>
+            <a:r>
+              <a:rPr lang="en-US" dirty="0" err="1">
+                <a:solidFill>
+                  <a:schemeClr val="accent1"/>
+                </a:solidFill>
+                <a:latin typeface="Fira Code Retina" pitchFamily="49" charset="0"/>
+                <a:ea typeface="Fira Code Retina" pitchFamily="49" charset="0"/>
+                <a:cs typeface="Fira Code Retina" pitchFamily="49" charset="0"/>
+              </a:rPr>
+              <a:t>tidyverse</a:t>
+            </a:r>
+            <a:r>
+              <a:rPr lang="en-US" dirty="0"/>
+              <a:t>, so have to load it separately</a:t>
+            </a:r>
           </a:p>
           <a:p>
             <a:pPr lvl="1"/>

</xml_diff>